<commit_message>
Live Lecture 20 - C00/D00
</commit_message>
<xml_diff>
--- a/lectures/lecture-20/Lecture-Live C00/Lecture 20 - Lecture.pptx
+++ b/lectures/lecture-20/Lecture-Live C00/Lecture 20 - Lecture.pptx
@@ -142,6 +142,1129 @@
     </p:ext>
   </p:extLst>
 </p:presentation>
+</file>
+
+<file path=ppt/ink/ink1.xml><?xml version="1.0" encoding="utf-8"?>
+<inkml:ink xmlns:inkml="http://www.w3.org/2003/InkML">
+  <inkml:definitions>
+    <inkml:context xml:id="ctx0">
+      <inkml:inkSource xml:id="inkSrc0">
+        <inkml:traceFormat>
+          <inkml:channel name="X" type="integer" min="-2.14748E9" max="2.14748E9" units="cm"/>
+          <inkml:channel name="Y" type="integer" min="-2.14748E9" max="2.14748E9" units="cm"/>
+          <inkml:channel name="F" type="integer" max="32767" units="dev"/>
+          <inkml:channel name="OA" type="integer" max="360" units="deg"/>
+          <inkml:channel name="OE" type="integer" max="90" units="deg"/>
+        </inkml:traceFormat>
+        <inkml:channelProperties>
+          <inkml:channelProperty channel="X" name="resolution" value="1000" units="1/cm"/>
+          <inkml:channelProperty channel="Y" name="resolution" value="1000" units="1/cm"/>
+          <inkml:channelProperty channel="F" name="resolution" value="0" units="1/dev"/>
+          <inkml:channelProperty channel="OA" name="resolution" value="1000" units="1/deg"/>
+          <inkml:channelProperty channel="OE" name="resolution" value="1000" units="1/deg"/>
+        </inkml:channelProperties>
+      </inkml:inkSource>
+      <inkml:timestamp xml:id="ts0" timeString="2021-02-24T19:00:33.202"/>
+    </inkml:context>
+    <inkml:brush xml:id="br0">
+      <inkml:brushProperty name="width" value="0.05" units="cm"/>
+      <inkml:brushProperty name="height" value="0.05" units="cm"/>
+      <inkml:brushProperty name="color" value="#004F8B"/>
+    </inkml:brush>
+  </inkml:definitions>
+  <inkml:trace contextRef="#ctx0" brushRef="#br0">60 2 3680 0 0,'0'0'477'0'0,"-2"1"31"0"0,-1 0 128 0 0,-1-1 0 0 0,0 0 0 0 0,1 1-1 0 0,-1-1 1 0 0,1-1 0 0 0,-1 1 0 0 0,-6-1 0 0 0,-12-2 3413 0 0,22 10-2458 0 0,0-6-1501 0 0,0 1 1 0 0,0-1 0 0 0,0 0-1 0 0,0 1 1 0 0,0-1 0 0 0,0 1 0 0 0,0-1-1 0 0,1 0 1 0 0,-1 1 0 0 0,1-1 0 0 0,-1 0-1 0 0,1 1 1 0 0,-1-1 0 0 0,1 0 0 0 0,0 0-1 0 0,1 2 1 0 0,0-1 171 0 0,0-1 1 0 0,0 1-1 0 0,1-1 0 0 0,-1 1 1 0 0,1-1-1 0 0,-1 0 0 0 0,4 1 1 0 0,-2 0-82 0 0,8 2-130 0 0,0-1 1 0 0,0 0-1 0 0,0-1 0 0 0,0-1 1 0 0,1 0-1 0 0,12 0 0 0 0,19 2 687 0 0,183 40 439 0 0,-164-29-1186 0 0,-47-11 2 0 0,28 0-1 0 0,-30-2 126 0 0,0 0 0 0 0,0 1 1 0 0,16 4-1 0 0,-9-2 96 0 0,1 0 0 0 0,42 2 0 0 0,77-3 670 0 0,-132-3-872 0 0,-1-1 0 0 0,14-3-1 0 0,-13 2-12 0 0,-1 1 0 0 0,15-1 0 0 0,-3 1 17 0 0,37-6 0 0 0,-50 5 6 0 0,5 1-12 0 0,0 0 1 0 0,0 1-1 0 0,0 1 1 0 0,17 1-1 0 0,18 2 23 0 0,60 4 8 0 0,-93-8-63 0 0,1 1 0 0 0,17-3 1 0 0,-20 1 22 0 0,0 0 0 0 0,1 1 1 0 0,19 2-1 0 0,-21-1-1 0 0,0 0 0 0 0,0-2 0 0 0,0 1 0 0 0,13-3 0 0 0,0 0 0 0 0,8 0 474 0 0,49-10 0 0 0,-61 9-32 0 0,35-2 0 0 0,2 0-766 0 0,41-7 760 0 0,-73 11-436 0 0,41-3 0 0 0,-52 3 0 0 0,15-3 0 0 0,21-5 214 0 0,-32 6-196 0 0,-14 4-24 0 0,-1 0 0 0 0,1-1 1 0 0,0 0-1 0 0,-1 1 0 0 0,1-1 1 0 0,0-1-1 0 0,-1 1 0 0 0,0-1 1 0 0,4-1-1 0 0,-2 1 13 0 0,-1 0 0 0 0,1 0 1 0 0,0 1-1 0 0,-1 0 0 0 0,1 0 0 0 0,8-1 1 0 0,-12 2 185 0 0,19-2 364 0 0,-16 2-493 0 0,-4-1-197 0 0,0 1-1 0 0,0-1 1 0 0,0 0-1 0 0,0 0 1 0 0,0 1-1 0 0,-1-1 1 0 0,1 0-1 0 0,0 1 1 0 0,0-1-1 0 0,0 0 1 0 0,-1 1-1 0 0,1-1 1 0 0,0 0-1 0 0,-1 1 1 0 0,1-1-1 0 0,-1 0 1 0 0,1 1-1 0 0,0-1 1 0 0,-1 1-1 0 0,1-1 1 0 0,-1 1-1 0 0,0-1 1 0 0,0 0-1 0 0</inkml:trace>
+</inkml:ink>
+</file>
+
+<file path=ppt/ink/ink10.xml><?xml version="1.0" encoding="utf-8"?>
+<inkml:ink xmlns:inkml="http://www.w3.org/2003/InkML">
+  <inkml:definitions>
+    <inkml:context xml:id="ctx0">
+      <inkml:inkSource xml:id="inkSrc0">
+        <inkml:traceFormat>
+          <inkml:channel name="X" type="integer" min="-2.14748E9" max="2.14748E9" units="cm"/>
+          <inkml:channel name="Y" type="integer" min="-2.14748E9" max="2.14748E9" units="cm"/>
+          <inkml:channel name="F" type="integer" max="32767" units="dev"/>
+          <inkml:channel name="OA" type="integer" max="360" units="deg"/>
+          <inkml:channel name="OE" type="integer" max="90" units="deg"/>
+        </inkml:traceFormat>
+        <inkml:channelProperties>
+          <inkml:channelProperty channel="X" name="resolution" value="1000" units="1/cm"/>
+          <inkml:channelProperty channel="Y" name="resolution" value="1000" units="1/cm"/>
+          <inkml:channelProperty channel="F" name="resolution" value="0" units="1/dev"/>
+          <inkml:channelProperty channel="OA" name="resolution" value="1000" units="1/deg"/>
+          <inkml:channelProperty channel="OE" name="resolution" value="1000" units="1/deg"/>
+        </inkml:channelProperties>
+      </inkml:inkSource>
+      <inkml:timestamp xml:id="ts0" timeString="2021-02-24T19:01:10.608"/>
+    </inkml:context>
+    <inkml:brush xml:id="br0">
+      <inkml:brushProperty name="width" value="0.05" units="cm"/>
+      <inkml:brushProperty name="height" value="0.05" units="cm"/>
+      <inkml:brushProperty name="color" value="#004F8B"/>
+    </inkml:brush>
+  </inkml:definitions>
+  <inkml:trace contextRef="#ctx0" brushRef="#br0">2 33 4144 0 0,'0'0'319'0'0,"1"-8"342"0"0,-2-7 4820 0 0,1 15-5285 0 0,0 0 0 0 0,0-1 1 0 0,-1 1-1 0 0,1 0 0 0 0,0-1 0 0 0,0 1 1 0 0,0 0-1 0 0,0-1 0 0 0,0 1 0 0 0,0-1 0 0 0,0 1 1 0 0,-1 0-1 0 0,1-1 0 0 0,0 1 0 0 0,0 0 1 0 0,1-1-1 0 0,-1 1 0 0 0,0 0 0 0 0,0-1 0 0 0,0 1 1 0 0,0-1-1 0 0,0 1 0 0 0,0 0 0 0 0,1-1 0 0 0,5 6 2144 0 0,8 18-1793 0 0,-7-4-493 0 0,-1 0 0 0 0,-1 1 0 0 0,4 34 0 0 0,17 115 43 0 0,12 105 600 0 0,-25-15 921 0 0,-13-258-1244 0 0,-7-49-229 0 0,2 21 538 0 0,-1-31 1 0 0,-3-172-529 0 0,7 193-225 0 0,1-1 0 0 0,9-72-1 0 0,-2 63 66 0 0,-3 26 39 0 0,0 1 1 0 0,7-25 0 0 0,-8 38 7 0 0,1 0 0 0 0,0 0 0 0 0,0 1-1 0 0,0-1 1 0 0,1 1 0 0 0,0 0 0 0 0,0 0 0 0 0,1 0 0 0 0,-1 0 0 0 0,7-5 0 0 0,-9 10-37 0 0,0-1 0 0 0,0 1 0 0 0,0 0 0 0 0,0 0 0 0 0,1 0 0 0 0,-1 0 0 0 0,0 0 0 0 0,0 1 0 0 0,1-1 0 0 0,-1 1 0 0 0,0 0 0 0 0,1-1 0 0 0,-1 1 0 0 0,0 0-1 0 0,1 0 1 0 0,-1 0 0 0 0,1 1 0 0 0,-1-1 0 0 0,0 1 0 0 0,0-1 0 0 0,1 1 0 0 0,-1 0 0 0 0,0 0 0 0 0,0 0 0 0 0,3 1 0 0 0,2 2 13 0 0,0-1 1 0 0,-1 1 0 0 0,1 0-1 0 0,-1 1 1 0 0,0 0-1 0 0,9 9 1 0 0,-8-7-23 0 0,-1 1 0 0 0,-1 0 0 0 0,1 1 0 0 0,-1-1 0 0 0,-1 1 0 0 0,0 0 0 0 0,0 0 0 0 0,-1 0 1 0 0,4 15-1 0 0,-3-7-8 0 0,-1 1 0 0 0,-1-1 0 0 0,-1 1 0 0 0,0 24 0 0 0,-2-32 12 0 0,-1 0 0 0 0,-2 14 0 0 0,-3 9 0 0 0,5-17 0 0 0,-2 0 0 0 0,0-1 0 0 0,-1 0 0 0 0,-11 26 0 0 0,14-38 31 0 0,1 0 0 0 0,-1 0 0 0 0,0 0 0 0 0,0-1 0 0 0,0 1 0 0 0,-1-1 0 0 0,1 1 0 0 0,0-1 0 0 0,-1 0 0 0 0,0 1 0 0 0,1-2 0 0 0,-1 1 0 0 0,0 0 0 0 0,0 0 0 0 0,0-1 0 0 0,0 0-1 0 0,-1 1 1 0 0,1-1 0 0 0,0 0 0 0 0,0-1 0 0 0,-1 1 0 0 0,1-1 0 0 0,0 1 0 0 0,-1-1 0 0 0,1 0 0 0 0,-1 0 0 0 0,-3-1 0 0 0,3 0-30 0 0,-1 0 0 0 0,1 0 0 0 0,0 0 0 0 0,0 0 0 0 0,0-1 0 0 0,0 0 0 0 0,0 0 1 0 0,1 0-1 0 0,-1 0 0 0 0,0 0 0 0 0,1-1 0 0 0,0 0 0 0 0,0 1 0 0 0,-1-1 0 0 0,2-1 0 0 0,-1 1 0 0 0,0 0 0 0 0,1-1 0 0 0,-1 1 1 0 0,-2-7-1 0 0,4 9-17 0 0,1 0 1 0 0,-1 1 0 0 0,1-1 0 0 0,-1 0 0 0 0,1 0 0 0 0,0 0 0 0 0,-1 0-1 0 0,1 0 1 0 0,0 1 0 0 0,0-1 0 0 0,0 0 0 0 0,-1 0 0 0 0,1 0-1 0 0,0 0 1 0 0,0 0 0 0 0,0 0 0 0 0,1 0 0 0 0,-1 0 0 0 0,0 0 0 0 0,0 1-1 0 0,0-1 1 0 0,1 0 0 0 0,-1 0 0 0 0,0 0 0 0 0,1 0 0 0 0,-1 0-1 0 0,1 1 1 0 0,-1-1 0 0 0,1 0 0 0 0,-1 0 0 0 0,1 1 0 0 0,0-1 0 0 0,-1 0-1 0 0,2 0 1 0 0,0 0 64 0 0,-1 0-1 0 0,1 0 0 0 0,0 1 1 0 0,0-1-1 0 0,-1 0 0 0 0,1 1 0 0 0,0-1 1 0 0,0 1-1 0 0,0 0 0 0 0,0 0 1 0 0,0 0-1 0 0,-1-1 0 0 0,1 2 1 0 0,0-1-1 0 0,4 1 0 0 0,-3 0-13 0 0,1 0 1 0 0,-1 0-1 0 0,1 0 0 0 0,-1 1 0 0 0,0-1 0 0 0,1 1 1 0 0,-1 0-1 0 0,0 0 0 0 0,0 0 0 0 0,4 5 0 0 0,1 1 4 0 0,0 1-1 0 0,6 10 0 0 0,2 1 67 0 0,-8-9-33 0 0,0 1 1 0 0,11 22-1 0 0,7 11-60 0 0,-21-37-37 0 0,0 1 0 0 0,-1-1 0 0 0,3 10 0 0 0,-3-8 126 0 0,0-1 0 0 0,0 1 0 0 0,10 14 0 0 0,-13-23-254 0 0,1 1-1 0 0,-1 0 0 0 0,1 0 1 0 0,-1 0-1 0 0,1-1 1 0 0,0 1-1 0 0,0-1 1 0 0,-1 1-1 0 0,1-1 0 0 0,0 0 1 0 0,0 0-1 0 0,1 0 1 0 0,-1 0-1 0 0,0 0 0 0 0,0 0 1 0 0,0 0-1 0 0,1-1 1 0 0,-1 1-1 0 0,0-1 1 0 0,5 0-1 0 0,4 0-5494 0 0,0-5-1670 0 0</inkml:trace>
+</inkml:ink>
+</file>
+
+<file path=ppt/ink/ink11.xml><?xml version="1.0" encoding="utf-8"?>
+<inkml:ink xmlns:inkml="http://www.w3.org/2003/InkML">
+  <inkml:definitions>
+    <inkml:context xml:id="ctx0">
+      <inkml:inkSource xml:id="inkSrc0">
+        <inkml:traceFormat>
+          <inkml:channel name="X" type="integer" min="-2.14748E9" max="2.14748E9" units="cm"/>
+          <inkml:channel name="Y" type="integer" min="-2.14748E9" max="2.14748E9" units="cm"/>
+          <inkml:channel name="F" type="integer" max="32767" units="dev"/>
+          <inkml:channel name="OA" type="integer" max="360" units="deg"/>
+          <inkml:channel name="OE" type="integer" max="90" units="deg"/>
+        </inkml:traceFormat>
+        <inkml:channelProperties>
+          <inkml:channelProperty channel="X" name="resolution" value="1000" units="1/cm"/>
+          <inkml:channelProperty channel="Y" name="resolution" value="1000" units="1/cm"/>
+          <inkml:channelProperty channel="F" name="resolution" value="0" units="1/dev"/>
+          <inkml:channelProperty channel="OA" name="resolution" value="1000" units="1/deg"/>
+          <inkml:channelProperty channel="OE" name="resolution" value="1000" units="1/deg"/>
+        </inkml:channelProperties>
+      </inkml:inkSource>
+      <inkml:timestamp xml:id="ts0" timeString="2021-02-24T19:01:10.969"/>
+    </inkml:context>
+    <inkml:brush xml:id="br0">
+      <inkml:brushProperty name="width" value="0.05" units="cm"/>
+      <inkml:brushProperty name="height" value="0.05" units="cm"/>
+      <inkml:brushProperty name="color" value="#004F8B"/>
+    </inkml:brush>
+  </inkml:definitions>
+  <inkml:trace contextRef="#ctx0" brushRef="#br0">0 246 13824 0 0,'0'0'1564'0'0,"15"-6"483"0"0,8-15-1017 0 0,-17 16-790 0 0,1-1-1 0 0,10-12 0 0 0,-4 2 231 0 0,-1-1 0 0 0,19-34 0 0 0,-24 34-51 0 0,8-33 0 0 0,-14 49-421 0 0,-1 0-1 0 0,0 0 1 0 0,1-1-1 0 0,-1 1 1 0 0,0 0-1 0 0,0 0 1 0 0,0 0-1 0 0,0-1 1 0 0,0 1-1 0 0,0 0 1 0 0,0 0-1 0 0,0-1 1 0 0,-1 1-1 0 0,1 0 1 0 0,0 0-1 0 0,-1 0 1 0 0,1 0-1 0 0,-1 0 1 0 0,1-1 0 0 0,-1 1-1 0 0,1 0 1 0 0,-1 0-1 0 0,0 0 1 0 0,0 0-1 0 0,1 1 1 0 0,-1-1-1 0 0,0 0 1 0 0,0 0-1 0 0,0 0 1 0 0,0 1-1 0 0,0-1 1 0 0,0 0-1 0 0,0 1 1 0 0,0-1-1 0 0,0 1 1 0 0,-1-1-1 0 0,1 1 1 0 0,0 0-1 0 0,0-1 1 0 0,0 1-1 0 0,-1 0 1 0 0,1 0-1 0 0,0 0 1 0 0,0 0-1 0 0,0 0 1 0 0,-1 0-1 0 0,1 0 1 0 0,0 0-1 0 0,0 1 1 0 0,0-1-1 0 0,-1 0 1 0 0,1 1-1 0 0,0-1 1 0 0,0 1-1 0 0,0-1 1 0 0,0 1-1 0 0,0 0 1 0 0,0-1-1 0 0,0 1 1 0 0,-1 1-1 0 0,-3 3 22 0 0,0 0 0 0 0,0 0-1 0 0,0 1 1 0 0,1-1 0 0 0,0 1-1 0 0,0 0 1 0 0,0 1 0 0 0,1-1-1 0 0,0 1 1 0 0,-4 11 0 0 0,-1 9 223 0 0,-7 38-1 0 0,14-60-202 0 0,0-1 12 0 0,-4 22 232 0 0,1 0 1 0 0,1 0-1 0 0,0 32 1 0 0,4-49-241 0 0,-1-1 0 0 0,2 0 1 0 0,-1 0-1 0 0,1 0 0 0 0,0 0 0 0 0,4 10 1 0 0,-4-14-47 0 0,0 1-1 0 0,0-1 1 0 0,1 0 0 0 0,0 0 0 0 0,-1 0 0 0 0,1-1 0 0 0,0 1 0 0 0,1-1-1 0 0,-1 1 1 0 0,1-1 0 0 0,-1 0 0 0 0,5 2 0 0 0,-6-4-2 0 0,1 0 1 0 0,-1 0-1 0 0,0 0 0 0 0,1 0 1 0 0,-1-1-1 0 0,1 1 0 0 0,-1-1 1 0 0,1 1-1 0 0,-1-1 0 0 0,0 0 1 0 0,1 0-1 0 0,-1 0 0 0 0,1-1 1 0 0,-1 1-1 0 0,1 0 0 0 0,-1-1 1 0 0,1 0-1 0 0,-1 1 0 0 0,0-1 1 0 0,1 0-1 0 0,-1 0 1 0 0,0-1-1 0 0,0 1 0 0 0,4-3 1 0 0,5-4-556 0 0,0-1 0 0 0,-1 1 1 0 0,12-15-1 0 0,-18 19 187 0 0,16-16-650 0 0</inkml:trace>
+</inkml:ink>
+</file>
+
+<file path=ppt/ink/ink12.xml><?xml version="1.0" encoding="utf-8"?>
+<inkml:ink xmlns:inkml="http://www.w3.org/2003/InkML">
+  <inkml:definitions>
+    <inkml:context xml:id="ctx0">
+      <inkml:inkSource xml:id="inkSrc0">
+        <inkml:traceFormat>
+          <inkml:channel name="X" type="integer" min="-2.14748E9" max="2.14748E9" units="cm"/>
+          <inkml:channel name="Y" type="integer" min="-2.14748E9" max="2.14748E9" units="cm"/>
+          <inkml:channel name="F" type="integer" max="32767" units="dev"/>
+          <inkml:channel name="OA" type="integer" max="360" units="deg"/>
+          <inkml:channel name="OE" type="integer" max="90" units="deg"/>
+        </inkml:traceFormat>
+        <inkml:channelProperties>
+          <inkml:channelProperty channel="X" name="resolution" value="1000" units="1/cm"/>
+          <inkml:channelProperty channel="Y" name="resolution" value="1000" units="1/cm"/>
+          <inkml:channelProperty channel="F" name="resolution" value="0" units="1/dev"/>
+          <inkml:channelProperty channel="OA" name="resolution" value="1000" units="1/deg"/>
+          <inkml:channelProperty channel="OE" name="resolution" value="1000" units="1/deg"/>
+        </inkml:channelProperties>
+      </inkml:inkSource>
+      <inkml:timestamp xml:id="ts0" timeString="2021-02-24T19:01:11.335"/>
+    </inkml:context>
+    <inkml:brush xml:id="br0">
+      <inkml:brushProperty name="width" value="0.05" units="cm"/>
+      <inkml:brushProperty name="height" value="0.05" units="cm"/>
+      <inkml:brushProperty name="color" value="#004F8B"/>
+    </inkml:brush>
+  </inkml:definitions>
+  <inkml:trace contextRef="#ctx0" brushRef="#br0">38 1 13824 0 0,'0'0'314'0'0,"-18"8"4631"0"0,15-4-4825 0 0,1 1-1 0 0,0-1 0 0 0,0 0 0 0 0,0 0 0 0 0,0 1 0 0 0,1-1 0 0 0,-1 1 0 0 0,1-1 0 0 0,0 1 0 0 0,0 8 0 0 0,0 6 51 0 0,3 27 0 0 0,-1-9-96 0 0,1-5-4 0 0,1 0-1 0 0,10 47 0 0 0,-10-69 48 0 0,0 1 0 0 0,9 18-1 0 0,-7-18-82 0 0,-5-10-35 0 0,1 0-1 0 0,0 1 0 0 0,0-1 0 0 0,0 0 1 0 0,0 1-1 0 0,0-1 0 0 0,0 0 1 0 0,0 0-1 0 0,3 2 0 0 0,-4-3 30 0 0,0 0 0 0 0,1 1 0 0 0,-1-1 0 0 0,1 0 0 0 0,-1 1-1 0 0,1-1 1 0 0,0 0 0 0 0,-1 0 0 0 0,1 1 0 0 0,-1-1 0 0 0,1 0 0 0 0,-1 0-1 0 0,1 0 1 0 0,0 0 0 0 0,-1 0 0 0 0,1 0 0 0 0,-1 0 0 0 0,1 0 0 0 0,-1 0 0 0 0,1 0-1 0 0,0 0 1 0 0,-1 0 0 0 0,1-1 0 0 0,-1 1 0 0 0,1 0 0 0 0,-1 0 0 0 0,1-1 0 0 0,-1 1-1 0 0,1 0 1 0 0,-1 0 0 0 0,2-1 0 0 0,8-10 284 0 0,-1 0 0 0 0,0-1 0 0 0,-1 0 0 0 0,12-21 0 0 0,4-5-196 0 0,-5 7-273 0 0,25-33-1114 0 0,-28 44 94 0 0,0 0-57 0 0</inkml:trace>
+</inkml:ink>
+</file>
+
+<file path=ppt/ink/ink13.xml><?xml version="1.0" encoding="utf-8"?>
+<inkml:ink xmlns:inkml="http://www.w3.org/2003/InkML">
+  <inkml:definitions>
+    <inkml:context xml:id="ctx0">
+      <inkml:inkSource xml:id="inkSrc0">
+        <inkml:traceFormat>
+          <inkml:channel name="X" type="integer" min="-2.14748E9" max="2.14748E9" units="cm"/>
+          <inkml:channel name="Y" type="integer" min="-2.14748E9" max="2.14748E9" units="cm"/>
+          <inkml:channel name="F" type="integer" max="32767" units="dev"/>
+          <inkml:channel name="OA" type="integer" max="360" units="deg"/>
+          <inkml:channel name="OE" type="integer" max="90" units="deg"/>
+        </inkml:traceFormat>
+        <inkml:channelProperties>
+          <inkml:channelProperty channel="X" name="resolution" value="1000" units="1/cm"/>
+          <inkml:channelProperty channel="Y" name="resolution" value="1000" units="1/cm"/>
+          <inkml:channelProperty channel="F" name="resolution" value="0" units="1/dev"/>
+          <inkml:channelProperty channel="OA" name="resolution" value="1000" units="1/deg"/>
+          <inkml:channelProperty channel="OE" name="resolution" value="1000" units="1/deg"/>
+        </inkml:channelProperties>
+      </inkml:inkSource>
+      <inkml:timestamp xml:id="ts0" timeString="2021-02-24T19:01:11.691"/>
+    </inkml:context>
+    <inkml:brush xml:id="br0">
+      <inkml:brushProperty name="width" value="0.05" units="cm"/>
+      <inkml:brushProperty name="height" value="0.05" units="cm"/>
+      <inkml:brushProperty name="color" value="#004F8B"/>
+    </inkml:brush>
+  </inkml:definitions>
+  <inkml:trace contextRef="#ctx0" brushRef="#br0">29 373 15664 0 0,'-9'16'696'0'0,"9"-7"135"0"0,0 2-663 0 0,0 3-168 0 0,-3 4 0 0 0,0 2 0 0 0,3 3 856 0 0,0 4 136 0 0,-2-2 24 0 0,2 3 8 0 0,-3-1-864 0 0,3-2-160 0 0,-6 0 0 0 0,6-2-80 0 0,-2-3 8 0 0,2-5 0 0 0,0 0 0 0 0,2-5-8383 0 0</inkml:trace>
+  <inkml:trace contextRef="#ctx0" brushRef="#br0" timeOffset="1">90 8 18111 0 0,'-5'-7'1768'0'0,"-3"7"-1576"0"0,5 5-736 0 0,-1 2-160 0 0,8 11-24 0 0,-4-3-8 0 0</inkml:trace>
+</inkml:ink>
+</file>
+
+<file path=ppt/ink/ink14.xml><?xml version="1.0" encoding="utf-8"?>
+<inkml:ink xmlns:inkml="http://www.w3.org/2003/InkML">
+  <inkml:definitions>
+    <inkml:context xml:id="ctx0">
+      <inkml:inkSource xml:id="inkSrc0">
+        <inkml:traceFormat>
+          <inkml:channel name="X" type="integer" min="-2.14748E9" max="2.14748E9" units="cm"/>
+          <inkml:channel name="Y" type="integer" min="-2.14748E9" max="2.14748E9" units="cm"/>
+          <inkml:channel name="F" type="integer" max="32767" units="dev"/>
+          <inkml:channel name="OA" type="integer" max="360" units="deg"/>
+          <inkml:channel name="OE" type="integer" max="90" units="deg"/>
+        </inkml:traceFormat>
+        <inkml:channelProperties>
+          <inkml:channelProperty channel="X" name="resolution" value="1000" units="1/cm"/>
+          <inkml:channelProperty channel="Y" name="resolution" value="1000" units="1/cm"/>
+          <inkml:channelProperty channel="F" name="resolution" value="0" units="1/dev"/>
+          <inkml:channelProperty channel="OA" name="resolution" value="1000" units="1/deg"/>
+          <inkml:channelProperty channel="OE" name="resolution" value="1000" units="1/deg"/>
+        </inkml:channelProperties>
+      </inkml:inkSource>
+      <inkml:timestamp xml:id="ts0" timeString="2021-02-24T19:01:12.052"/>
+    </inkml:context>
+    <inkml:brush xml:id="br0">
+      <inkml:brushProperty name="width" value="0.05" units="cm"/>
+      <inkml:brushProperty name="height" value="0.05" units="cm"/>
+      <inkml:brushProperty name="color" value="#004F8B"/>
+    </inkml:brush>
+  </inkml:definitions>
+  <inkml:trace contextRef="#ctx0" brushRef="#br0">1 152 17247 0 0,'0'0'396'0'0,"0"0"-312"0"0,0 1-1 0 0,0 0 0 0 0,0-1 1 0 0,-1 1-1 0 0,1-1 0 0 0,0 1 1 0 0,0 0-1 0 0,0 0 0 0 0,0-1 1 0 0,0 1-1 0 0,0 0 0 0 0,1-1 1 0 0,-1 1-1 0 0,0-1 0 0 0,0 1 1 0 0,0 0-1 0 0,1 0 0 0 0,5 5-3 0 0,-5-5 6 0 0,0-1 0 0 0,0 0 0 0 0,0 1 0 0 0,0-1-1 0 0,1 0 1 0 0,-1 0 0 0 0,0 1 0 0 0,0-1 0 0 0,0 0 0 0 0,0 0-1 0 0,0 0 1 0 0,0-1 0 0 0,0 1 0 0 0,2 0 0 0 0,1-1 172 0 0,1 1-169 0 0,1 0 0 0 0,0-1 0 0 0,-1 0 1 0 0,1 0-1 0 0,-1 0 0 0 0,1-1 0 0 0,-1 0 1 0 0,0 0-1 0 0,0 0 0 0 0,0-1 0 0 0,8-4 1 0 0,-3 0-63 0 0,-1-1 0 0 0,0 1 1 0 0,-1-2-1 0 0,12-13 1 0 0,-17 19-19 0 0,0-1 0 0 0,0 0-1 0 0,-1 0 1 0 0,0 0 0 0 0,1 0 0 0 0,-2 0 0 0 0,1 0 0 0 0,0 0 0 0 0,-1-1 0 0 0,0 1 0 0 0,0 0 0 0 0,0-1 0 0 0,0 1-1 0 0,-1-1 1 0 0,0-8 0 0 0,-1 9 84 0 0,-3-11 128 0 0,-1 13-183 0 0,-5 9-27 0 0,1 3 33 0 0,1 0 1 0 0,0 0-1 0 0,1 1 1 0 0,0-1-1 0 0,1 2 0 0 0,-7 15 1 0 0,-24 76 521 0 0,34-92-499 0 0,0 0 0 0 0,0 0 0 0 0,1 1 0 0 0,1-1-1 0 0,0 1 1 0 0,0-1 0 0 0,1 1 0 0 0,2 13 0 0 0,-2-23-74 0 0,1-1 1 0 0,-1 1-1 0 0,0 0 1 0 0,1 0-1 0 0,-1-1 1 0 0,1 1-1 0 0,-1-1 0 0 0,1 1 1 0 0,0-1-1 0 0,0 1 1 0 0,-1-1-1 0 0,1 1 1 0 0,0-1-1 0 0,1 1 1 0 0,-1-1-1 0 0,0 0 1 0 0,0 0-1 0 0,0 0 1 0 0,1 1-1 0 0,-1-1 1 0 0,1-1-1 0 0,-1 1 1 0 0,1 0-1 0 0,-1 0 1 0 0,1 0-1 0 0,-1-1 1 0 0,1 1-1 0 0,0-1 1 0 0,-1 1-1 0 0,1-1 1 0 0,0 0-1 0 0,-1 0 1 0 0,1 1-1 0 0,0-1 1 0 0,-1 0-1 0 0,1-1 1 0 0,0 1-1 0 0,0 0 1 0 0,-1 0-1 0 0,1-1 1 0 0,0 1-1 0 0,-1-1 1 0 0,3 0-1 0 0,3-2-859 0 0,1-1-1 0 0,0 1 1 0 0,-1-1-1 0 0,0 0 1 0 0,0-1-1 0 0,12-10 1 0 0,7-10-5791 0 0</inkml:trace>
+</inkml:ink>
+</file>
+
+<file path=ppt/ink/ink15.xml><?xml version="1.0" encoding="utf-8"?>
+<inkml:ink xmlns:inkml="http://www.w3.org/2003/InkML">
+  <inkml:definitions>
+    <inkml:context xml:id="ctx0">
+      <inkml:inkSource xml:id="inkSrc0">
+        <inkml:traceFormat>
+          <inkml:channel name="X" type="integer" min="-2.14748E9" max="2.14748E9" units="cm"/>
+          <inkml:channel name="Y" type="integer" min="-2.14748E9" max="2.14748E9" units="cm"/>
+          <inkml:channel name="F" type="integer" max="32767" units="dev"/>
+          <inkml:channel name="OA" type="integer" max="360" units="deg"/>
+          <inkml:channel name="OE" type="integer" max="90" units="deg"/>
+        </inkml:traceFormat>
+        <inkml:channelProperties>
+          <inkml:channelProperty channel="X" name="resolution" value="1000" units="1/cm"/>
+          <inkml:channelProperty channel="Y" name="resolution" value="1000" units="1/cm"/>
+          <inkml:channelProperty channel="F" name="resolution" value="0" units="1/dev"/>
+          <inkml:channelProperty channel="OA" name="resolution" value="1000" units="1/deg"/>
+          <inkml:channelProperty channel="OE" name="resolution" value="1000" units="1/deg"/>
+        </inkml:channelProperties>
+      </inkml:inkSource>
+      <inkml:timestamp xml:id="ts0" timeString="2021-02-24T19:01:12.453"/>
+    </inkml:context>
+    <inkml:brush xml:id="br0">
+      <inkml:brushProperty name="width" value="0.05" units="cm"/>
+      <inkml:brushProperty name="height" value="0.05" units="cm"/>
+      <inkml:brushProperty name="color" value="#004F8B"/>
+    </inkml:brush>
+  </inkml:definitions>
+  <inkml:trace contextRef="#ctx0" brushRef="#br0">15 1 16471 0 0,'-4'2'491'0'0,"-6"1"5362"0"0,13 12-5161 0 0,-2-13-618 0 0,5 18 10 0 0,-4-14-57 0 0,0 1 1 0 0,0 0 0 0 0,1 10-1 0 0,-1 9 5 0 0,2-1 0 0 0,1 1 0 0 0,16 47 0 0 0,-19-69-32 0 0,-1 0 0 0 0,1 0 0 0 0,0-1 0 0 0,5 7 0 0 0,-3-7 15 0 0,-3-3-10 0 0,-1 1 1 0 0,1-1-1 0 0,-1 0 0 0 0,1 0 1 0 0,-1 0-1 0 0,1 0 0 0 0,-1 0 1 0 0,1 0-1 0 0,0 0 0 0 0,-1 0 1 0 0,1 0-1 0 0,-1 0 0 0 0,1 0 1 0 0,-1 0-1 0 0,1 0 0 0 0,-1 0 0 0 0,1-1 1 0 0,-1 1-1 0 0,1 0 0 0 0,-1 0 1 0 0,1-1-1 0 0,-1 1 0 0 0,0 0 1 0 0,1 0-1 0 0,-1-1 0 0 0,1 1 1 0 0,-1-1-1 0 0,0 1 0 0 0,1 0 1 0 0,-1-1-1 0 0,1 0 0 0 0,9-17 158 0 0,-6 11-103 0 0,4-9 136 0 0,0-1 0 0 0,-1 1 0 0 0,9-33 0 0 0,-16 48-191 0 0,0 0 0 0 0,0 1 0 0 0,1-1 0 0 0,-1 0 0 0 0,0 1-1 0 0,0-1 1 0 0,1 0 0 0 0,-1 1 0 0 0,1-1 0 0 0,-1 0 0 0 0,0 1 0 0 0,1-1-1 0 0,-1 1 1 0 0,1-1 0 0 0,0 0 0 0 0,-1 1 0 0 0,2-1 0 0 0,-2 1-1 0 0,0 0 1 0 0,1 0-1 0 0,-1 0 1 0 0,0 0 0 0 0,1 0-1 0 0,-1-1 1 0 0,1 1-1 0 0,-1 1 1 0 0,0-1 0 0 0,1 0-1 0 0,-1 0 1 0 0,0 0-1 0 0,1 0 1 0 0,-1 0-1 0 0,1 0 1 0 0,-1 0 0 0 0,0 0-1 0 0,1 1 1 0 0,-1-1-1 0 0,0 0 1 0 0,1 0-1 0 0,-1 0 1 0 0,0 1 0 0 0,1-1-1 0 0,0 1 6 0 0,0 1 1 0 0,0-1-1 0 0,0 0 0 0 0,0 1 0 0 0,0-1 0 0 0,0 1 0 0 0,0-1 0 0 0,-1 1 1 0 0,1-1-1 0 0,0 1 0 0 0,-1 0 0 0 0,1-1 0 0 0,-1 4 0 0 0,9 40-10 0 0,-4-25 0 0 0,-2-10 45 0 0,0 0-1 0 0,1 0 1 0 0,0-1-1 0 0,1 1 1 0 0,0-1-1 0 0,0 0 1 0 0,11 13-1 0 0,-15-21-4 0 0,-1 0-1 0 0,1 1 0 0 0,0-1 1 0 0,0 0-1 0 0,1 0 0 0 0,-1 0 1 0 0,0 0-1 0 0,0-1 1 0 0,0 1-1 0 0,1 0 0 0 0,-1 0 1 0 0,0-1-1 0 0,1 1 0 0 0,-1-1 1 0 0,0 1-1 0 0,1-1 0 0 0,-1 1 1 0 0,1-1-1 0 0,-1 0 1 0 0,1 0-1 0 0,-1 0 0 0 0,1 0 1 0 0,-1 0-1 0 0,1 0 0 0 0,-1 0 1 0 0,0 0-1 0 0,1-1 1 0 0,-1 1-1 0 0,1-1 0 0 0,-1 1 1 0 0,1-1-1 0 0,-1 1 0 0 0,0-1 1 0 0,2-1-1 0 0,1-1 59 0 0,0 0 0 0 0,0 0 0 0 0,0 0 0 0 0,0-1 0 0 0,-1 0 0 0 0,1 0 0 0 0,-1 0 0 0 0,4-7 0 0 0,65-127 226 0 0,-62 117-668 0 0,12-22-2788 0 0,-13 20-5915 0 0</inkml:trace>
+</inkml:ink>
+</file>
+
+<file path=ppt/ink/ink16.xml><?xml version="1.0" encoding="utf-8"?>
+<inkml:ink xmlns:inkml="http://www.w3.org/2003/InkML">
+  <inkml:definitions>
+    <inkml:context xml:id="ctx0">
+      <inkml:inkSource xml:id="inkSrc0">
+        <inkml:traceFormat>
+          <inkml:channel name="X" type="integer" min="-2.14748E9" max="2.14748E9" units="cm"/>
+          <inkml:channel name="Y" type="integer" min="-2.14748E9" max="2.14748E9" units="cm"/>
+          <inkml:channel name="F" type="integer" max="32767" units="dev"/>
+          <inkml:channel name="OA" type="integer" max="360" units="deg"/>
+          <inkml:channel name="OE" type="integer" max="90" units="deg"/>
+        </inkml:traceFormat>
+        <inkml:channelProperties>
+          <inkml:channelProperty channel="X" name="resolution" value="1000" units="1/cm"/>
+          <inkml:channelProperty channel="Y" name="resolution" value="1000" units="1/cm"/>
+          <inkml:channelProperty channel="F" name="resolution" value="0" units="1/dev"/>
+          <inkml:channelProperty channel="OA" name="resolution" value="1000" units="1/deg"/>
+          <inkml:channelProperty channel="OE" name="resolution" value="1000" units="1/deg"/>
+        </inkml:channelProperties>
+      </inkml:inkSource>
+      <inkml:timestamp xml:id="ts0" timeString="2021-02-24T19:01:13.008"/>
+    </inkml:context>
+    <inkml:brush xml:id="br0">
+      <inkml:brushProperty name="width" value="0.05" units="cm"/>
+      <inkml:brushProperty name="height" value="0.05" units="cm"/>
+      <inkml:brushProperty name="color" value="#004F8B"/>
+    </inkml:brush>
+  </inkml:definitions>
+  <inkml:trace contextRef="#ctx0" brushRef="#br0">145 83 7368 0 0,'1'0'44'0'0,"0"0"0"0"0,0-1 0 0 0,0 1 0 0 0,0-1 0 0 0,0 0 1 0 0,0 1-1 0 0,0-1 0 0 0,0 0 0 0 0,0 1 0 0 0,0-1 0 0 0,0 0 0 0 0,-1 0 1 0 0,1 0-1 0 0,0 0 0 0 0,0 0 0 0 0,-1 0 0 0 0,1 0 0 0 0,-1 0 0 0 0,1 0 1 0 0,-1 0-1 0 0,1-2 0 0 0,0 0 334 0 0,1-1 1 0 0,-1 1-1 0 0,0-1 0 0 0,0 1 1 0 0,0-8-1 0 0,5-13 1861 0 0,-6 23-1775 0 0,0 0-238 0 0,-1 0 0 0 0,1 1 1 0 0,-1-1-1 0 0,1 0 0 0 0,-1 1 1 0 0,1-1-1 0 0,-1 1 0 0 0,0-1 1 0 0,1 1-1 0 0,-1 0 0 0 0,0-1 1 0 0,-1 0-1 0 0,0 1-99 0 0,1-1-1 0 0,-1 1 1 0 0,0-1-1 0 0,0 1 1 0 0,1 0 0 0 0,-1 0-1 0 0,0-1 1 0 0,0 1-1 0 0,0 1 1 0 0,1-1-1 0 0,-1 0 1 0 0,0 0 0 0 0,0 1-1 0 0,1-1 1 0 0,-1 1-1 0 0,0-1 1 0 0,1 1-1 0 0,-1 0 1 0 0,0-1 0 0 0,1 1-1 0 0,-1 0 1 0 0,1 0-1 0 0,-1 0 1 0 0,1 1-1 0 0,0-1 1 0 0,-1 0 0 0 0,0 2-1 0 0,-14 10 494 0 0,10-8-451 0 0,1-1 0 0 0,0 1 0 0 0,0-1 0 0 0,0 1 1 0 0,-4 7-1 0 0,-10 15 204 0 0,6-10 51 0 0,-11 21 1 0 0,22-34-375 0 0,0-1 0 0 0,1 1 0 0 0,-1-1 0 0 0,1 1 0 0 0,0 0 0 0 0,0 0 0 0 0,0 0 0 0 0,1 0 0 0 0,-1 5 0 0 0,1-6-29 0 0,0-1 0 0 0,0 1-1 0 0,1-1 1 0 0,-1 0 0 0 0,1 1-1 0 0,-1-1 1 0 0,1 0 0 0 0,0 0-1 0 0,0 1 1 0 0,0-1 0 0 0,0 0-1 0 0,0 0 1 0 0,0 0 0 0 0,1 0-1 0 0,-1 0 1 0 0,1 0 0 0 0,2 2-1 0 0,4 1 14 0 0,-1 0-1 0 0,1-1 0 0 0,0 0 1 0 0,0-1-1 0 0,1 1 0 0 0,-1-2 1 0 0,1 1-1 0 0,9 1 0 0 0,-3 0 37 0 0,24 5 219 0 0,31 9 318 0 0,-63-15-540 0 0,0-1 1 0 0,0 1 0 0 0,-1 1-1 0 0,1-1 1 0 0,0 1 0 0 0,-1 0-1 0 0,6 5 1 0 0,-10-6-48 0 0,0-1-1 0 0,0 0 1 0 0,0 1 0 0 0,-1-1 0 0 0,1 1 0 0 0,-1-1-1 0 0,1 1 1 0 0,-1 0 0 0 0,0-1 0 0 0,0 1-1 0 0,0 0 1 0 0,-1 0 0 0 0,1 0 0 0 0,-1 0-1 0 0,1 0 1 0 0,-1 0 0 0 0,0 0 0 0 0,0 0 0 0 0,0 0-1 0 0,-1 0 1 0 0,1 0 0 0 0,-2 4 0 0 0,0 1 18 0 0,0 0 0 0 0,-1-1 1 0 0,0 1-1 0 0,0-1 0 0 0,0 0 1 0 0,-1 0-1 0 0,-7 9 0 0 0,2-4-62 0 0,-1 0 0 0 0,0-1-1 0 0,-1 0 1 0 0,0 0 0 0 0,-1-1-1 0 0,0-1 1 0 0,-25 15 0 0 0,31-20-291 0 0,-1 0-565 0 0,-1 1 0 0 0,1-2 1 0 0,-1 1-1 0 0,-12 3 0 0 0,3-2-6939 0 0</inkml:trace>
+</inkml:ink>
+</file>
+
+<file path=ppt/ink/ink17.xml><?xml version="1.0" encoding="utf-8"?>
+<inkml:ink xmlns:inkml="http://www.w3.org/2003/InkML">
+  <inkml:definitions>
+    <inkml:context xml:id="ctx0">
+      <inkml:inkSource xml:id="inkSrc0">
+        <inkml:traceFormat>
+          <inkml:channel name="X" type="integer" min="-2.14748E9" max="2.14748E9" units="cm"/>
+          <inkml:channel name="Y" type="integer" min="-2.14748E9" max="2.14748E9" units="cm"/>
+          <inkml:channel name="F" type="integer" max="32767" units="dev"/>
+          <inkml:channel name="OA" type="integer" max="360" units="deg"/>
+          <inkml:channel name="OE" type="integer" max="90" units="deg"/>
+        </inkml:traceFormat>
+        <inkml:channelProperties>
+          <inkml:channelProperty channel="X" name="resolution" value="1000" units="1/cm"/>
+          <inkml:channelProperty channel="Y" name="resolution" value="1000" units="1/cm"/>
+          <inkml:channelProperty channel="F" name="resolution" value="0" units="1/dev"/>
+          <inkml:channelProperty channel="OA" name="resolution" value="1000" units="1/deg"/>
+          <inkml:channelProperty channel="OE" name="resolution" value="1000" units="1/deg"/>
+        </inkml:channelProperties>
+      </inkml:inkSource>
+      <inkml:timestamp xml:id="ts0" timeString="2021-02-24T19:01:13.381"/>
+    </inkml:context>
+    <inkml:brush xml:id="br0">
+      <inkml:brushProperty name="width" value="0.05" units="cm"/>
+      <inkml:brushProperty name="height" value="0.05" units="cm"/>
+      <inkml:brushProperty name="color" value="#004F8B"/>
+    </inkml:brush>
+  </inkml:definitions>
+  <inkml:trace contextRef="#ctx0" brushRef="#br0">0 139 17303 0 0,'0'0'396'0'0,"15"-3"944"0"0,-5 0-1333 0 0,-3 1 200 0 0,0 0 1 0 0,0-1 0 0 0,-1 0 0 0 0,1 0-1 0 0,-1 0 1 0 0,0-1 0 0 0,0 0 0 0 0,0 0 0 0 0,8-8-1 0 0,27-34 1265 0 0,-39 43-1409 0 0,0 1 0 0 0,-1-1 0 0 0,1 1-1 0 0,-1-1 1 0 0,0 1 0 0 0,2-7 0 0 0,-3 9-56 0 0,1-1 1 0 0,-1 0 0 0 0,0 0-1 0 0,0 0 1 0 0,0 0 0 0 0,0 1-1 0 0,0-1 1 0 0,0 0 0 0 0,0 0-1 0 0,0 0 1 0 0,0 0-1 0 0,0 0 1 0 0,0 1 0 0 0,-1-1-1 0 0,1 0 1 0 0,0 0 0 0 0,0 0-1 0 0,-1 1 1 0 0,1-1 0 0 0,-1 0-1 0 0,1 0 1 0 0,-1 1 0 0 0,1-1-1 0 0,-2-1 1 0 0,1 2 14 0 0,1 0-1 0 0,-1-1 1 0 0,0 1 0 0 0,1 0-1 0 0,-1 0 1 0 0,0 0 0 0 0,1 0-1 0 0,-1 0 1 0 0,0 0 0 0 0,1 0 0 0 0,-1 0-1 0 0,0 0 1 0 0,1 0 0 0 0,-1 0-1 0 0,0 0 1 0 0,1 0 0 0 0,-1 0-1 0 0,0 1 1 0 0,1-1 0 0 0,-1 0-1 0 0,0 1 1 0 0,1-1 0 0 0,-1 0-1 0 0,1 1 1 0 0,-2 0 0 0 0,-15 13 280 0 0,15-12-185 0 0,-8 7 76 0 0,0 0 0 0 0,1 1 0 0 0,1 0 1 0 0,-1 0-1 0 0,-7 14 0 0 0,14-20-183 0 0,-1 0 0 0 0,1 0 0 0 0,0 0-1 0 0,0 0 1 0 0,1 1 0 0 0,-1-1-1 0 0,1 1 1 0 0,0-1 0 0 0,0 1 0 0 0,0 0-1 0 0,1-1 1 0 0,0 1 0 0 0,0 0-1 0 0,0 0 1 0 0,0-1 0 0 0,1 1 0 0 0,1 7-1 0 0,9 12-22 0 0,-10-23-16 0 0,0 0 0 0 0,0 1 1 0 0,0-1-1 0 0,1 0 0 0 0,-1 0 1 0 0,0 0-1 0 0,1 0 0 0 0,-1 0 0 0 0,1-1 1 0 0,-1 1-1 0 0,1 0 0 0 0,2 0 1 0 0,2 1-224 0 0,1-1 0 0 0,-1-1 0 0 0,0 1 0 0 0,0-1 0 0 0,1 0 0 0 0,-1 0 0 0 0,0-1 0 0 0,1 1 0 0 0,-1-1 0 0 0,0-1 0 0 0,9-2 0 0 0,-6 1-134 0 0,16-4-634 0 0</inkml:trace>
+</inkml:ink>
+</file>
+
+<file path=ppt/ink/ink18.xml><?xml version="1.0" encoding="utf-8"?>
+<inkml:ink xmlns:inkml="http://www.w3.org/2003/InkML">
+  <inkml:definitions>
+    <inkml:context xml:id="ctx0">
+      <inkml:inkSource xml:id="inkSrc0">
+        <inkml:traceFormat>
+          <inkml:channel name="X" type="integer" min="-2.14748E9" max="2.14748E9" units="cm"/>
+          <inkml:channel name="Y" type="integer" min="-2.14748E9" max="2.14748E9" units="cm"/>
+          <inkml:channel name="F" type="integer" max="32767" units="dev"/>
+          <inkml:channel name="OA" type="integer" max="360" units="deg"/>
+          <inkml:channel name="OE" type="integer" max="90" units="deg"/>
+        </inkml:traceFormat>
+        <inkml:channelProperties>
+          <inkml:channelProperty channel="X" name="resolution" value="1000" units="1/cm"/>
+          <inkml:channelProperty channel="Y" name="resolution" value="1000" units="1/cm"/>
+          <inkml:channelProperty channel="F" name="resolution" value="0" units="1/dev"/>
+          <inkml:channelProperty channel="OA" name="resolution" value="1000" units="1/deg"/>
+          <inkml:channelProperty channel="OE" name="resolution" value="1000" units="1/deg"/>
+        </inkml:channelProperties>
+      </inkml:inkSource>
+      <inkml:timestamp xml:id="ts0" timeString="2021-02-24T19:01:13.756"/>
+    </inkml:context>
+    <inkml:brush xml:id="br0">
+      <inkml:brushProperty name="width" value="0.05" units="cm"/>
+      <inkml:brushProperty name="height" value="0.05" units="cm"/>
+      <inkml:brushProperty name="color" value="#004F8B"/>
+    </inkml:brush>
+  </inkml:definitions>
+  <inkml:trace contextRef="#ctx0" brushRef="#br0">107 0 9672 0 0,'0'0'748'0'0,"-9"1"-464"0"0,7-1-244 0 0,-3 1 1267 0 0,0 0-1 0 0,-1 0 1 0 0,1 1 0 0 0,0-1 0 0 0,0 1 0 0 0,0 0-1 0 0,-7 4 1 0 0,4-2 353 0 0,7-4-1624 0 0,1 1 0 0 0,-1-1 0 0 0,0 1-1 0 0,0-1 1 0 0,0 1 0 0 0,0-1 0 0 0,0 1 0 0 0,1-1 0 0 0,-1 1 0 0 0,0 0-1 0 0,0-1 1 0 0,1 1 0 0 0,-1 0 0 0 0,1 0 0 0 0,-1-1 0 0 0,1 1 0 0 0,-1 0 0 0 0,1 0-1 0 0,-1 1 1 0 0,1-2-8 0 0,0 1 0 0 0,0-1 0 0 0,0 1 0 0 0,0-1 0 0 0,0 1-1 0 0,0-1 1 0 0,0 0 0 0 0,0 1 0 0 0,1-1 0 0 0,-1 1 0 0 0,0-1-1 0 0,0 0 1 0 0,0 1 0 0 0,1-1 0 0 0,-1 1 0 0 0,0-1 0 0 0,0 0 0 0 0,1 0-1 0 0,-1 1 1 0 0,0-1 0 0 0,1 0 0 0 0,-1 1 0 0 0,0-1 0 0 0,1 0 0 0 0,-1 0-1 0 0,1 0 1 0 0,-1 1 0 0 0,0-1 0 0 0,1 0 0 0 0,-1 0 0 0 0,1 0-1 0 0,-1 0 1 0 0,1 0 0 0 0,-1 0 0 0 0,0 0 0 0 0,2 0 0 0 0,0 1 125 0 0,68 29 673 0 0,-63-26-746 0 0,1 0 1 0 0,-1 0 0 0 0,-1 0 0 0 0,1 1-1 0 0,-1 0 1 0 0,1 0 0 0 0,-1 1-1 0 0,10 11 1 0 0,-15-14-49 0 0,0 0-1 0 0,0-1 1 0 0,0 1 0 0 0,0 0-1 0 0,0 0 1 0 0,0 0-1 0 0,-1 0 1 0 0,1 0-1 0 0,-1 0 1 0 0,0 0 0 0 0,0 0-1 0 0,0 0 1 0 0,0 0-1 0 0,0 0 1 0 0,-1 0-1 0 0,1 0 1 0 0,-1-1 0 0 0,-1 5-1 0 0,-2 1 4 0 0,0 1 0 0 0,0-1 0 0 0,-1 0-1 0 0,0 0 1 0 0,0 0 0 0 0,-1 0 0 0 0,0-1 0 0 0,0 0-1 0 0,-1 0 1 0 0,0-1 0 0 0,0 0 0 0 0,0 0 0 0 0,-1-1-1 0 0,0 0 1 0 0,0 0 0 0 0,0 0 0 0 0,-1-1 0 0 0,-9 2-1 0 0,5-1-130 0 0,11-4-62 0 0,0 0 0 0 0,-1 0 0 0 0,1 0 0 0 0,-1 0 0 0 0,1 0 1 0 0,-1-1-1 0 0,1 1 0 0 0,-1-1 0 0 0,1 0 0 0 0,-1 0 0 0 0,1 0 1 0 0,-1 0-1 0 0,-3 0 0 0 0,7-2-300 0 0,0 1 1 0 0,0-1-1 0 0,0 1 1 0 0,0-1 0 0 0,0 1-1 0 0,0 0 1 0 0,1 0-1 0 0,0-2 1 0 0,9-7-1381 0 0</inkml:trace>
+</inkml:ink>
+</file>
+
+<file path=ppt/ink/ink19.xml><?xml version="1.0" encoding="utf-8"?>
+<inkml:ink xmlns:inkml="http://www.w3.org/2003/InkML">
+  <inkml:definitions>
+    <inkml:context xml:id="ctx0">
+      <inkml:inkSource xml:id="inkSrc0">
+        <inkml:traceFormat>
+          <inkml:channel name="X" type="integer" min="-2.14748E9" max="2.14748E9" units="cm"/>
+          <inkml:channel name="Y" type="integer" min="-2.14748E9" max="2.14748E9" units="cm"/>
+          <inkml:channel name="F" type="integer" max="32767" units="dev"/>
+          <inkml:channel name="OA" type="integer" max="360" units="deg"/>
+          <inkml:channel name="OE" type="integer" max="90" units="deg"/>
+        </inkml:traceFormat>
+        <inkml:channelProperties>
+          <inkml:channelProperty channel="X" name="resolution" value="1000" units="1/cm"/>
+          <inkml:channelProperty channel="Y" name="resolution" value="1000" units="1/cm"/>
+          <inkml:channelProperty channel="F" name="resolution" value="0" units="1/dev"/>
+          <inkml:channelProperty channel="OA" name="resolution" value="1000" units="1/deg"/>
+          <inkml:channelProperty channel="OE" name="resolution" value="1000" units="1/deg"/>
+        </inkml:channelProperties>
+      </inkml:inkSource>
+      <inkml:timestamp xml:id="ts0" timeString="2021-02-24T19:01:14.127"/>
+    </inkml:context>
+    <inkml:brush xml:id="br0">
+      <inkml:brushProperty name="width" value="0.05" units="cm"/>
+      <inkml:brushProperty name="height" value="0.05" units="cm"/>
+      <inkml:brushProperty name="color" value="#004F8B"/>
+    </inkml:brush>
+  </inkml:definitions>
+  <inkml:trace contextRef="#ctx0" brushRef="#br0">53 7 15664 0 0,'4'-2'-313'0'0,"4"-3"4192"0"0,-11 7-2884 0 0,-4 5 1215 0 0,6-6-2076 0 0,1-1 0 0 0,0 1 1 0 0,0 0-1 0 0,-1 0 0 0 0,1-1 0 0 0,0 1 0 0 0,0 0 0 0 0,0 0 0 0 0,0-1 1 0 0,0 1-1 0 0,0 0 0 0 0,0 0 0 0 0,0-1 0 0 0,0 3 0 0 0,1-2-42 0 0,-1 1 0 0 0,1-1 0 0 0,0 1 0 0 0,-1-1 0 0 0,1 1 0 0 0,0-1-1 0 0,0 1 1 0 0,0-1 0 0 0,0 0 0 0 0,0 0 0 0 0,1 2 0 0 0,17 22-75 0 0,-5-9 3 0 0,-11-12 133 0 0,0-1 1 0 0,0 1-1 0 0,0-1 1 0 0,5 4-1 0 0,-4-4-6 0 0,0 1 1 0 0,-1-1-1 0 0,1 1 1 0 0,-1-1-1 0 0,1 1 0 0 0,-1 0 1 0 0,5 9-1 0 0,-7-10-111 0 0,0-1-1 0 0,0 1 1 0 0,0-1 0 0 0,0 1-1 0 0,0-1 1 0 0,0 1 0 0 0,-1 0-1 0 0,1-1 1 0 0,-1 1-1 0 0,0 0 1 0 0,1 0 0 0 0,-1-1-1 0 0,-1 1 1 0 0,1 0 0 0 0,-1 5-1 0 0,-8 16 112 0 0,-1 0 0 0 0,-15 26 0 0 0,23-46-140 0 0,-1 1-53 0 0,0 1 0 0 0,-1-1-1 0 0,0 0 1 0 0,0-1 0 0 0,0 1 0 0 0,0-1-1 0 0,-1 0 1 0 0,0 0 0 0 0,0 0 0 0 0,0 0-1 0 0,-6 2 1 0 0,3-1-853 0 0,-1-1 0 0 0,0 0 0 0 0,-13 4 1 0 0,17-7-142 0 0,6-19-10369 0 0</inkml:trace>
+  <inkml:trace contextRef="#ctx0" brushRef="#br0" timeOffset="1">360 65 11976 0 0,'0'7'1244'0'0,"-7"43"2778"0"0,6-41-3160 0 0,-1 0 0 0 0,0 0 0 0 0,0-1 0 0 0,-1 1-1 0 0,-5 10 1 0 0,-7 23-142 0 0,-3 15-474 0 0,11-40-197 0 0,1 0 1 0 0,-5 26-1 0 0,11-35-1576 0 0</inkml:trace>
+</inkml:ink>
+</file>
+
+<file path=ppt/ink/ink2.xml><?xml version="1.0" encoding="utf-8"?>
+<inkml:ink xmlns:inkml="http://www.w3.org/2003/InkML">
+  <inkml:definitions>
+    <inkml:context xml:id="ctx0">
+      <inkml:inkSource xml:id="inkSrc0">
+        <inkml:traceFormat>
+          <inkml:channel name="X" type="integer" min="-2.14748E9" max="2.14748E9" units="cm"/>
+          <inkml:channel name="Y" type="integer" min="-2.14748E9" max="2.14748E9" units="cm"/>
+          <inkml:channel name="F" type="integer" max="32767" units="dev"/>
+          <inkml:channel name="OA" type="integer" max="360" units="deg"/>
+          <inkml:channel name="OE" type="integer" max="90" units="deg"/>
+        </inkml:traceFormat>
+        <inkml:channelProperties>
+          <inkml:channelProperty channel="X" name="resolution" value="1000" units="1/cm"/>
+          <inkml:channelProperty channel="Y" name="resolution" value="1000" units="1/cm"/>
+          <inkml:channelProperty channel="F" name="resolution" value="0" units="1/dev"/>
+          <inkml:channelProperty channel="OA" name="resolution" value="1000" units="1/deg"/>
+          <inkml:channelProperty channel="OE" name="resolution" value="1000" units="1/deg"/>
+        </inkml:channelProperties>
+      </inkml:inkSource>
+      <inkml:timestamp xml:id="ts0" timeString="2021-02-24T19:00:36.128"/>
+    </inkml:context>
+    <inkml:brush xml:id="br0">
+      <inkml:brushProperty name="width" value="0.05" units="cm"/>
+      <inkml:brushProperty name="height" value="0.05" units="cm"/>
+      <inkml:brushProperty name="color" value="#004F8B"/>
+    </inkml:brush>
+  </inkml:definitions>
+  <inkml:trace contextRef="#ctx0" brushRef="#br0">102 107 10368 0 0,'-13'0'792'0'0,"3"-2"-414"0"0,1 0 0 0 0,0-1 0 0 0,0 0 0 0 0,0 0 0 0 0,1-1 0 0 0,-15-8 0 0 0,22 11-643 0 0,-9-7 2924 0 0,9 5-438 0 0,8 2-1531 0 0,5 2-312 0 0,0 0 0 0 0,-1 1 1 0 0,1 1-1 0 0,0 0 0 0 0,-1 0 0 0 0,12 6 0 0 0,-6-3-167 0 0,-1 0 0 0 0,19 3 0 0 0,-26-8-197 0 0,117 17 140 0 0,124-8-90 0 0,-122-11 24 0 0,236 4 604 0 0,-206-6-255 0 0,-42-1-190 0 0,197-14 635 0 0,-229 11-344 0 0,-21-1-501 0 0,-42 4-7 0 0,1 2 0 0 0,36-1 0 0 0,56 3 30 0 0,-53 0 391 0 0,-39-1-88 0 0,-1-2 1 0 0,1 0 0 0 0,30-8-1 0 0,-51 11-362 0 0,1 0 0 0 0,0-1 1 0 0,-1 1-1 0 0,1 0 0 0 0,-1-1 0 0 0,1 0 0 0 0,0 1 0 0 0,-1-1 0 0 0,1 0 1 0 0,-1 1-1 0 0,1-1 0 0 0,-1 0 0 0 0,0 0 0 0 0,1 0 0 0 0,-1-1 0 0 0,0 1 1 0 0,0 0-1 0 0,0 0 0 0 0,0-1 0 0 0,2-2 0 0 0,-3 3-1 0 0,0-1 0 0 0,0 0 0 0 0,0 0 0 0 0,0 1 0 0 0,0-1 0 0 0,0 0 0 0 0,-1 0 0 0 0,1 1 0 0 0,-1-1 0 0 0,1 0 0 0 0,-1 1 0 0 0,1-1 0 0 0,-1 0 0 0 0,0 1 0 0 0,0-1 0 0 0,-1-1 0 0 0,-9-13-3572 0 0,6 10-438 0 0</inkml:trace>
+</inkml:ink>
+</file>
+
+<file path=ppt/ink/ink20.xml><?xml version="1.0" encoding="utf-8"?>
+<inkml:ink xmlns:inkml="http://www.w3.org/2003/InkML">
+  <inkml:definitions>
+    <inkml:context xml:id="ctx0">
+      <inkml:inkSource xml:id="inkSrc0">
+        <inkml:traceFormat>
+          <inkml:channel name="X" type="integer" min="-2.14748E9" max="2.14748E9" units="cm"/>
+          <inkml:channel name="Y" type="integer" min="-2.14748E9" max="2.14748E9" units="cm"/>
+          <inkml:channel name="F" type="integer" max="32767" units="dev"/>
+          <inkml:channel name="OA" type="integer" max="360" units="deg"/>
+          <inkml:channel name="OE" type="integer" max="90" units="deg"/>
+        </inkml:traceFormat>
+        <inkml:channelProperties>
+          <inkml:channelProperty channel="X" name="resolution" value="1000" units="1/cm"/>
+          <inkml:channelProperty channel="Y" name="resolution" value="1000" units="1/cm"/>
+          <inkml:channelProperty channel="F" name="resolution" value="0" units="1/dev"/>
+          <inkml:channelProperty channel="OA" name="resolution" value="1000" units="1/deg"/>
+          <inkml:channelProperty channel="OE" name="resolution" value="1000" units="1/deg"/>
+        </inkml:channelProperties>
+      </inkml:inkSource>
+      <inkml:timestamp xml:id="ts0" timeString="2021-02-24T19:01:14.510"/>
+    </inkml:context>
+    <inkml:brush xml:id="br0">
+      <inkml:brushProperty name="width" value="0.05" units="cm"/>
+      <inkml:brushProperty name="height" value="0.05" units="cm"/>
+      <inkml:brushProperty name="color" value="#004F8B"/>
+    </inkml:brush>
+  </inkml:definitions>
+  <inkml:trace contextRef="#ctx0" brushRef="#br0">54 6 13824 0 0,'-5'0'304'0'0,"-1"-2"64"0"0,-2-1 16 0 0,2 6 72 0 0,3 4-456 0 0,-14 3 0 0 0,9 3 0 0 0</inkml:trace>
+</inkml:ink>
+</file>
+
+<file path=ppt/ink/ink21.xml><?xml version="1.0" encoding="utf-8"?>
+<inkml:ink xmlns:inkml="http://www.w3.org/2003/InkML">
+  <inkml:definitions>
+    <inkml:context xml:id="ctx0">
+      <inkml:inkSource xml:id="inkSrc0">
+        <inkml:traceFormat>
+          <inkml:channel name="X" type="integer" min="-2.14748E9" max="2.14748E9" units="cm"/>
+          <inkml:channel name="Y" type="integer" min="-2.14748E9" max="2.14748E9" units="cm"/>
+          <inkml:channel name="F" type="integer" max="32767" units="dev"/>
+          <inkml:channel name="OA" type="integer" max="360" units="deg"/>
+          <inkml:channel name="OE" type="integer" max="90" units="deg"/>
+        </inkml:traceFormat>
+        <inkml:channelProperties>
+          <inkml:channelProperty channel="X" name="resolution" value="1000" units="1/cm"/>
+          <inkml:channelProperty channel="Y" name="resolution" value="1000" units="1/cm"/>
+          <inkml:channelProperty channel="F" name="resolution" value="0" units="1/dev"/>
+          <inkml:channelProperty channel="OA" name="resolution" value="1000" units="1/deg"/>
+          <inkml:channelProperty channel="OE" name="resolution" value="1000" units="1/deg"/>
+        </inkml:channelProperties>
+      </inkml:inkSource>
+      <inkml:timestamp xml:id="ts0" timeString="2021-02-24T19:01:14.892"/>
+    </inkml:context>
+    <inkml:brush xml:id="br0">
+      <inkml:brushProperty name="width" value="0.05" units="cm"/>
+      <inkml:brushProperty name="height" value="0.05" units="cm"/>
+      <inkml:brushProperty name="color" value="#004F8B"/>
+    </inkml:brush>
+  </inkml:definitions>
+  <inkml:trace contextRef="#ctx0" brushRef="#br0">182 1 5984 0 0,'0'0'464'0'0,"-4"15"1525"0"0,-3-1 6573 0 0,-10 2-6196 0 0,-3 6-1874 0 0,11-14 476 0 0,0 1 0 0 0,-14 15 0 0 0,2 0 176 0 0,8-10-608 0 0,1 1 1 0 0,-12 18-1 0 0,14-19-652 0 0,8-11 120 0 0,0 0-1 0 0,1 0 1 0 0,0 1 0 0 0,-1-1-1 0 0,1 0 1 0 0,0 0-1 0 0,1 1 1 0 0,-2 6 0 0 0,2-9 0 0 0,0 0 1 0 0,0 0 0 0 0,-1 0-1 0 0,1 1 1 0 0,0-1 0 0 0,0 0-1 0 0,1 0 1 0 0,-1 0 0 0 0,0 0-1 0 0,0 1 1 0 0,0-1 0 0 0,1 0-1 0 0,-1 0 1 0 0,1 0 0 0 0,-1 0-1 0 0,1 0 1 0 0,-1 0 0 0 0,1 0-1 0 0,0 0 1 0 0,-1 0 0 0 0,1 0-1 0 0,0 0 1 0 0,0-1 0 0 0,0 1-1 0 0,-1 0 1 0 0,1 0 0 0 0,0-1-1 0 0,0 1 1 0 0,0 0 0 0 0,1 0-1 0 0,3 0 7 0 0,0-1-1 0 0,0 1 1 0 0,0 0-1 0 0,0-1 1 0 0,1 0 0 0 0,-1-1-1 0 0,0 1 1 0 0,0-1-1 0 0,0 0 1 0 0,0 0-1 0 0,-1 0 1 0 0,1-1 0 0 0,0 1-1 0 0,8-5 1 0 0,5-3 538 0 0,-1-1 0 0 0,22-18 1 0 0,-24 17-1056 0 0,-1 0 1 0 0,0-1-1 0 0,12-15 1 0 0,-2-4-7392 0 0</inkml:trace>
+</inkml:ink>
+</file>
+
+<file path=ppt/ink/ink22.xml><?xml version="1.0" encoding="utf-8"?>
+<inkml:ink xmlns:inkml="http://www.w3.org/2003/InkML">
+  <inkml:definitions>
+    <inkml:context xml:id="ctx0">
+      <inkml:inkSource xml:id="inkSrc0">
+        <inkml:traceFormat>
+          <inkml:channel name="X" type="integer" min="-2.14748E9" max="2.14748E9" units="cm"/>
+          <inkml:channel name="Y" type="integer" min="-2.14748E9" max="2.14748E9" units="cm"/>
+          <inkml:channel name="F" type="integer" max="32767" units="dev"/>
+          <inkml:channel name="OA" type="integer" max="360" units="deg"/>
+          <inkml:channel name="OE" type="integer" max="90" units="deg"/>
+        </inkml:traceFormat>
+        <inkml:channelProperties>
+          <inkml:channelProperty channel="X" name="resolution" value="1000" units="1/cm"/>
+          <inkml:channelProperty channel="Y" name="resolution" value="1000" units="1/cm"/>
+          <inkml:channelProperty channel="F" name="resolution" value="0" units="1/dev"/>
+          <inkml:channelProperty channel="OA" name="resolution" value="1000" units="1/deg"/>
+          <inkml:channelProperty channel="OE" name="resolution" value="1000" units="1/deg"/>
+        </inkml:channelProperties>
+      </inkml:inkSource>
+      <inkml:timestamp xml:id="ts0" timeString="2021-02-24T19:01:15.242"/>
+    </inkml:context>
+    <inkml:brush xml:id="br0">
+      <inkml:brushProperty name="width" value="0.05" units="cm"/>
+      <inkml:brushProperty name="height" value="0.05" units="cm"/>
+      <inkml:brushProperty name="color" value="#004F8B"/>
+    </inkml:brush>
+  </inkml:definitions>
+  <inkml:trace contextRef="#ctx0" brushRef="#br0">1 294 9672 0 0,'0'0'748'0'0,"13"-13"5969"0"0,1-8-4362 0 0,-1 1 1 0 0,15-35 0 0 0,2-2-1025 0 0,-12 23-1350 0 0,-9 17 664 0 0,0 0-1 0 0,20-25 1 0 0,-29 42-641 0 0,1-1 1 0 0,-1 0-1 0 0,1 1 0 0 0,-1-1 1 0 0,1 1-1 0 0,-1-1 0 0 0,1 1 1 0 0,-1-1-1 0 0,1 1 0 0 0,-1-1 1 0 0,1 1-1 0 0,0 0 0 0 0,-1-1 1 0 0,1 1-1 0 0,0 0 0 0 0,-1 0 1 0 0,1-1-1 0 0,0 1 1 0 0,0 0-1 0 0,-1 0 0 0 0,1 0 1 0 0,0 0-1 0 0,0 0 0 0 0,-1 0 1 0 0,1 0-1 0 0,0 0 0 0 0,-1 0 1 0 0,1 0-1 0 0,0 0 0 0 0,0 1 1 0 0,-1-1-1 0 0,1 0 0 0 0,0 0 1 0 0,-1 1-1 0 0,1-1 0 0 0,0 1 1 0 0,0 0-1 0 0,2 3-4 0 0,-1 0 0 0 0,0 0 0 0 0,0 0 0 0 0,0 1 0 0 0,2 8 0 0 0,3 5 0 0 0,8 27 0 0 0,-11-31 0 0 0,0-1 0 0 0,1 0 0 0 0,10 19 0 0 0,-14-31 0 0 0,0 0 0 0 0,-1 1 0 0 0,1-1 0 0 0,0 0 0 0 0,0 0 0 0 0,-1 0 0 0 0,1 0 0 0 0,0 0 0 0 0,0 0 0 0 0,1 0 0 0 0,-1 0 0 0 0,0 0 0 0 0,0 0 0 0 0,0-1 0 0 0,0 1 0 0 0,1 0 0 0 0,-1-1 0 0 0,0 1 0 0 0,1-1 0 0 0,-1 1 0 0 0,0-1 0 0 0,1 0 0 0 0,-1 0 0 0 0,1 1 0 0 0,-1-1 0 0 0,0 0 0 0 0,1 0 0 0 0,-1 0 0 0 0,1-1 0 0 0,-1 1 0 0 0,0 0 0 0 0,2-1 0 0 0,0 0 0 0 0,-1 0 0 0 0,0 0 0 0 0,0-1 0 0 0,0 1 0 0 0,0-1 0 0 0,0 1 0 0 0,0-1 0 0 0,0 0 0 0 0,0 1 0 0 0,-1-1 0 0 0,1 0 0 0 0,-1 0 0 0 0,1 0 0 0 0,-1-1 0 0 0,0 1 0 0 0,0 0 0 0 0,2-5 0 0 0,9-31-414 0 0,13-66-1 0 0,-20 81-532 0 0</inkml:trace>
+</inkml:ink>
+</file>
+
+<file path=ppt/ink/ink23.xml><?xml version="1.0" encoding="utf-8"?>
+<inkml:ink xmlns:inkml="http://www.w3.org/2003/InkML">
+  <inkml:definitions>
+    <inkml:context xml:id="ctx0">
+      <inkml:inkSource xml:id="inkSrc0">
+        <inkml:traceFormat>
+          <inkml:channel name="X" type="integer" min="-2.14748E9" max="2.14748E9" units="cm"/>
+          <inkml:channel name="Y" type="integer" min="-2.14748E9" max="2.14748E9" units="cm"/>
+          <inkml:channel name="F" type="integer" max="32767" units="dev"/>
+          <inkml:channel name="OA" type="integer" max="360" units="deg"/>
+          <inkml:channel name="OE" type="integer" max="90" units="deg"/>
+        </inkml:traceFormat>
+        <inkml:channelProperties>
+          <inkml:channelProperty channel="X" name="resolution" value="1000" units="1/cm"/>
+          <inkml:channelProperty channel="Y" name="resolution" value="1000" units="1/cm"/>
+          <inkml:channelProperty channel="F" name="resolution" value="0" units="1/dev"/>
+          <inkml:channelProperty channel="OA" name="resolution" value="1000" units="1/deg"/>
+          <inkml:channelProperty channel="OE" name="resolution" value="1000" units="1/deg"/>
+        </inkml:channelProperties>
+      </inkml:inkSource>
+      <inkml:timestamp xml:id="ts0" timeString="2021-02-24T19:01:17.294"/>
+    </inkml:context>
+    <inkml:brush xml:id="br0">
+      <inkml:brushProperty name="width" value="0.05" units="cm"/>
+      <inkml:brushProperty name="height" value="0.05" units="cm"/>
+      <inkml:brushProperty name="color" value="#004F8B"/>
+    </inkml:brush>
+  </inkml:definitions>
+  <inkml:trace contextRef="#ctx0" brushRef="#br0">32 188 5064 0 0,'-16'2'273'0'0,"1"-1"10699"0"0,16-2-10844 0 0,1 1 1 0 0,-1-1-1 0 0,1 1 0 0 0,0-1 1 0 0,-1 1-1 0 0,1 0 0 0 0,-1 0 1 0 0,1 0-1 0 0,2 0 0 0 0,-3 0 14 0 0,44-5 1210 0 0,40-3-269 0 0,120 23-12 0 0,-130-7-920 0 0,64 0 297 0 0,-133-8-392 0 0,-1-1-1 0 0,1 1 0 0 0,-1-1 0 0 0,1 0 1 0 0,-1 0-1 0 0,1 0 0 0 0,-1-1 1 0 0,0 0-1 0 0,0 0 0 0 0,9-5 0 0 0,-13 6-33 0 0,-1 0 0 0 0,1 0 0 0 0,0 0 0 0 0,0-1 0 0 0,-1 1 0 0 0,1 0 0 0 0,-1 0 0 0 0,1-1 0 0 0,-1 1 0 0 0,1 0 0 0 0,-1-1 0 0 0,0 1 0 0 0,0 0 0 0 0,0-1 0 0 0,0 1 0 0 0,0-1 0 0 0,0 1 0 0 0,0 0 0 0 0,0-1 0 0 0,0 1-1 0 0,0 0 1 0 0,-1-1 0 0 0,1 1 0 0 0,-1 0 0 0 0,0-2 0 0 0,0-1 11 0 0,-1 1-1 0 0,0 0 1 0 0,1-1 0 0 0,-1 1-1 0 0,0 0 1 0 0,0 0-1 0 0,-1 0 1 0 0,-3-4-1 0 0,-37-27 108 0 0,-62-38 0 0 0,88 64-140 0 0,17 8-1 0 0,0 0 0 0 0,0 0 0 0 0,0-1 0 0 0,0 1 0 0 0,1 0 0 0 0,-1 0 0 0 0,0 0 0 0 0,0 0-1 0 0,0 0 1 0 0,0 0 0 0 0,0 0 0 0 0,0 0 0 0 0,0 0 0 0 0,0 0 0 0 0,0 0 0 0 0,0-1 0 0 0,0 1 0 0 0,1 0-1 0 0,-1 0 1 0 0,0 0 0 0 0,0 0 0 0 0,0 0 0 0 0,0 0 0 0 0,0 0 0 0 0,0-1 0 0 0,0 1 0 0 0,0 0 0 0 0,0 0-1 0 0,0 0 1 0 0,0 0 0 0 0,0 0 0 0 0,0 0 0 0 0,0 0 0 0 0,0-1 0 0 0,0 1 0 0 0,0 0 0 0 0,0 0 0 0 0,0 0-1 0 0,-1 0 1 0 0,1 0 0 0 0,0 0 0 0 0,0 0 0 0 0,0-1 0 0 0,0 1 0 0 0,0 0 0 0 0,0 0 0 0 0,0 0 0 0 0,0 0 0 0 0,22-1-15 0 0,0 2 0 0 0,-1 0 0 0 0,1 1 0 0 0,33 8 0 0 0,-7-1 28 0 0,-39-8 18 0 0,48 10 178 0 0,-50-9-143 0 0,-1-1-1 0 0,0 1 0 0 0,0 1 1 0 0,0-1-1 0 0,-1 1 1 0 0,10 7-1 0 0,-13-9-32 0 0,-1 0 0 0 0,0 1 0 0 0,1-1-1 0 0,-1 0 1 0 0,0 1 0 0 0,0 0 0 0 0,0-1-1 0 0,-1 1 1 0 0,1-1 0 0 0,0 1 0 0 0,-1 0-1 0 0,1 0 1 0 0,-1-1 0 0 0,1 1 0 0 0,-1 0-1 0 0,0 0 1 0 0,0 0 0 0 0,1 0 0 0 0,-2 0 0 0 0,1-1-1 0 0,0 1 1 0 0,0 0 0 0 0,0 0 0 0 0,-1 0-1 0 0,1-1 1 0 0,-1 1 0 0 0,0 0 0 0 0,0 2-1 0 0,-4 6 81 0 0,0 1 0 0 0,0 0 0 0 0,-9 11-1 0 0,9-12-39 0 0,-6 4-63 0 0,1 0 0 0 0,-1-1 0 0 0,-1 0 0 0 0,-1-1 1 0 0,-15 13-1 0 0,8-8 84 0 0,-77 64-2153 0 0</inkml:trace>
+</inkml:ink>
+</file>
+
+<file path=ppt/ink/ink24.xml><?xml version="1.0" encoding="utf-8"?>
+<inkml:ink xmlns:inkml="http://www.w3.org/2003/InkML">
+  <inkml:definitions>
+    <inkml:context xml:id="ctx0">
+      <inkml:inkSource xml:id="inkSrc0">
+        <inkml:traceFormat>
+          <inkml:channel name="X" type="integer" min="-2.14748E9" max="2.14748E9" units="cm"/>
+          <inkml:channel name="Y" type="integer" min="-2.14748E9" max="2.14748E9" units="cm"/>
+          <inkml:channel name="F" type="integer" max="32767" units="dev"/>
+          <inkml:channel name="OA" type="integer" max="360" units="deg"/>
+          <inkml:channel name="OE" type="integer" max="90" units="deg"/>
+        </inkml:traceFormat>
+        <inkml:channelProperties>
+          <inkml:channelProperty channel="X" name="resolution" value="1000" units="1/cm"/>
+          <inkml:channelProperty channel="Y" name="resolution" value="1000" units="1/cm"/>
+          <inkml:channelProperty channel="F" name="resolution" value="0" units="1/dev"/>
+          <inkml:channelProperty channel="OA" name="resolution" value="1000" units="1/deg"/>
+          <inkml:channelProperty channel="OE" name="resolution" value="1000" units="1/deg"/>
+        </inkml:channelProperties>
+      </inkml:inkSource>
+      <inkml:timestamp xml:id="ts0" timeString="2021-02-24T19:01:17.662"/>
+    </inkml:context>
+    <inkml:brush xml:id="br0">
+      <inkml:brushProperty name="width" value="0.05" units="cm"/>
+      <inkml:brushProperty name="height" value="0.05" units="cm"/>
+      <inkml:brushProperty name="color" value="#004F8B"/>
+    </inkml:brush>
+  </inkml:definitions>
+  <inkml:trace contextRef="#ctx0" brushRef="#br0">1 0 21191 0 0,'0'0'480'0'0,"6"5"646"0"0,-3-1-1035 0 0,1-1 0 0 0,0 0 0 0 0,0-1 0 0 0,0 1 0 0 0,0 0 0 0 0,0-1 0 0 0,0 0 0 0 0,0 0 0 0 0,1 0 0 0 0,-1-1 0 0 0,1 0 0 0 0,-1 0 0 0 0,7 1 0 0 0,7 0 346 0 0,1 0 1 0 0,19-2-1 0 0,-23 0-269 0 0,-13 0-164 0 0,31 0 133 0 0,39-5 0 0 0,-19 1 230 0 0,-40 4-265 0 0,1-1-1 0 0,0 0 0 0 0,-1-1 1 0 0,16-5-1 0 0,31-8-3555 0 0,-47 12-2369 0 0,-4 1-1699 0 0</inkml:trace>
+</inkml:ink>
+</file>
+
+<file path=ppt/ink/ink25.xml><?xml version="1.0" encoding="utf-8"?>
+<inkml:ink xmlns:inkml="http://www.w3.org/2003/InkML">
+  <inkml:definitions>
+    <inkml:context xml:id="ctx0">
+      <inkml:inkSource xml:id="inkSrc0">
+        <inkml:traceFormat>
+          <inkml:channel name="X" type="integer" min="-2.14748E9" max="2.14748E9" units="cm"/>
+          <inkml:channel name="Y" type="integer" min="-2.14748E9" max="2.14748E9" units="cm"/>
+          <inkml:channel name="F" type="integer" max="32767" units="dev"/>
+          <inkml:channel name="OA" type="integer" max="360" units="deg"/>
+          <inkml:channel name="OE" type="integer" max="90" units="deg"/>
+        </inkml:traceFormat>
+        <inkml:channelProperties>
+          <inkml:channelProperty channel="X" name="resolution" value="1000" units="1/cm"/>
+          <inkml:channelProperty channel="Y" name="resolution" value="1000" units="1/cm"/>
+          <inkml:channelProperty channel="F" name="resolution" value="0" units="1/dev"/>
+          <inkml:channelProperty channel="OA" name="resolution" value="1000" units="1/deg"/>
+          <inkml:channelProperty channel="OE" name="resolution" value="1000" units="1/deg"/>
+        </inkml:channelProperties>
+      </inkml:inkSource>
+      <inkml:timestamp xml:id="ts0" timeString="2021-02-24T19:01:18.046"/>
+    </inkml:context>
+    <inkml:brush xml:id="br0">
+      <inkml:brushProperty name="width" value="0.05" units="cm"/>
+      <inkml:brushProperty name="height" value="0.05" units="cm"/>
+      <inkml:brushProperty name="color" value="#004F8B"/>
+    </inkml:brush>
+  </inkml:definitions>
+  <inkml:trace contextRef="#ctx0" brushRef="#br0">152 1 17503 0 0,'-1'1'110'0'0,"0"0"-1"0"0,0 0 1 0 0,0 0-1 0 0,-1 0 0 0 0,1 0 1 0 0,1 1-1 0 0,-1-1 1 0 0,0 0-1 0 0,0 0 0 0 0,0 1 1 0 0,1-1-1 0 0,-1 1 1 0 0,1-1-1 0 0,-1 0 0 0 0,0 3 1 0 0,-3 27 49 0 0,2-11-22 0 0,-4 32 2143 0 0,4-31-1464 0 0,-4 22 0 0 0,-2 3-780 0 0,4-23-37 0 0,-6 22-1 0 0,7-34 2 0 0,-25 100 0 0 0,25-98 11 0 0,-1 0-1 0 0,-7 19 1 0 0,-5 15-852 0 0,13-35 188 0 0,-1 0-1 0 0,-8 19 1 0 0,0-10-370 0 0</inkml:trace>
+</inkml:ink>
+</file>
+
+<file path=ppt/ink/ink26.xml><?xml version="1.0" encoding="utf-8"?>
+<inkml:ink xmlns:inkml="http://www.w3.org/2003/InkML">
+  <inkml:definitions>
+    <inkml:context xml:id="ctx0">
+      <inkml:inkSource xml:id="inkSrc0">
+        <inkml:traceFormat>
+          <inkml:channel name="X" type="integer" min="-2.14748E9" max="2.14748E9" units="cm"/>
+          <inkml:channel name="Y" type="integer" min="-2.14748E9" max="2.14748E9" units="cm"/>
+          <inkml:channel name="F" type="integer" max="32767" units="dev"/>
+          <inkml:channel name="OA" type="integer" max="360" units="deg"/>
+          <inkml:channel name="OE" type="integer" max="90" units="deg"/>
+        </inkml:traceFormat>
+        <inkml:channelProperties>
+          <inkml:channelProperty channel="X" name="resolution" value="1000" units="1/cm"/>
+          <inkml:channelProperty channel="Y" name="resolution" value="1000" units="1/cm"/>
+          <inkml:channelProperty channel="F" name="resolution" value="0" units="1/dev"/>
+          <inkml:channelProperty channel="OA" name="resolution" value="1000" units="1/deg"/>
+          <inkml:channelProperty channel="OE" name="resolution" value="1000" units="1/deg"/>
+        </inkml:channelProperties>
+      </inkml:inkSource>
+      <inkml:timestamp xml:id="ts0" timeString="2021-02-24T19:01:18.433"/>
+    </inkml:context>
+    <inkml:brush xml:id="br0">
+      <inkml:brushProperty name="width" value="0.05" units="cm"/>
+      <inkml:brushProperty name="height" value="0.05" units="cm"/>
+      <inkml:brushProperty name="color" value="#004F8B"/>
+    </inkml:brush>
+  </inkml:definitions>
+  <inkml:trace contextRef="#ctx0" brushRef="#br0">1 0 6912 0 0,'0'0'12303'0'0,"1"1"-11699"0"0,2 1-508 0 0,0 0-1 0 0,0 1 0 0 0,-1-1 0 0 0,1 1 0 0 0,-1-1 1 0 0,0 1-1 0 0,1 0 0 0 0,-1 0 0 0 0,0 0 0 0 0,-1 0 1 0 0,1 1-1 0 0,0-1 0 0 0,-1 0 0 0 0,0 1 0 0 0,0-1 1 0 0,1 5-1 0 0,2 9-98 0 0,-2 1 0 0 0,2 17 0 0 0,-3-26 67 0 0,0 152 82 0 0,-2-138-159 0 0,-4 58-57 0 0,0 16 73 0 0,3-50 106 0 0,0-33 149 0 0,1-1 0 0 0,1 0 0 0 0,0 0 0 0 0,1 0-1 0 0,5 23 1 0 0,-5-36-278 0 0,1-1 1 0 0,0 0-1 0 0,0 1 0 0 0,-1-1 0 0 0,1 0 0 0 0,0 0 0 0 0,-1 0 0 0 0,1 0 0 0 0,1-2 1 0 0,3-4 89 0 0,1 0 0 0 0,-1 0 1 0 0,0-1-1 0 0,-1 0 0 0 0,0 0 0 0 0,5-10 1 0 0,6-10-69 0 0,8-12 101 0 0,-12 20 543 0 0,1-1 0 0 0,26-30-1 0 0,-35 48-593 0 0,-1 0 0 0 0,0 0 0 0 0,1 0-1 0 0,-1 0 1 0 0,1 1 0 0 0,0-1 0 0 0,0 1 0 0 0,0 0 0 0 0,0 1-1 0 0,0-1 1 0 0,0 0 0 0 0,9-1 0 0 0,-11 3-35 0 0,0 0 1 0 0,0 0-1 0 0,0-1 0 0 0,0 2 1 0 0,1-1-1 0 0,-1 0 1 0 0,0 0-1 0 0,0 1 1 0 0,0-1-1 0 0,0 1 0 0 0,0-1 1 0 0,0 1-1 0 0,0 0 1 0 0,0 0-1 0 0,0 0 0 0 0,0 0 1 0 0,0 0-1 0 0,-1 0 1 0 0,1 1-1 0 0,0-1 1 0 0,-1 1-1 0 0,1-1 0 0 0,-1 1 1 0 0,1-1-1 0 0,-1 1 1 0 0,0 0-1 0 0,0 0 0 0 0,2 3 1 0 0,-1 0-80 0 0,1 1 1 0 0,-1 0-1 0 0,0 0 0 0 0,-1 1 1 0 0,1-1-1 0 0,-1 0 0 0 0,0 12 1 0 0,-3 46 1432 0 0,1-51-1380 0 0,-13 75 25 0 0,10-57-588 0 0,0 13-876 0 0,16-52-3758 0 0,-2 1-2367 0 0</inkml:trace>
+</inkml:ink>
+</file>
+
+<file path=ppt/ink/ink27.xml><?xml version="1.0" encoding="utf-8"?>
+<inkml:ink xmlns:inkml="http://www.w3.org/2003/InkML">
+  <inkml:definitions>
+    <inkml:context xml:id="ctx0">
+      <inkml:inkSource xml:id="inkSrc0">
+        <inkml:traceFormat>
+          <inkml:channel name="X" type="integer" min="-2.14748E9" max="2.14748E9" units="cm"/>
+          <inkml:channel name="Y" type="integer" min="-2.14748E9" max="2.14748E9" units="cm"/>
+          <inkml:channel name="F" type="integer" max="32767" units="dev"/>
+          <inkml:channel name="OA" type="integer" max="360" units="deg"/>
+          <inkml:channel name="OE" type="integer" max="90" units="deg"/>
+        </inkml:traceFormat>
+        <inkml:channelProperties>
+          <inkml:channelProperty channel="X" name="resolution" value="1000" units="1/cm"/>
+          <inkml:channelProperty channel="Y" name="resolution" value="1000" units="1/cm"/>
+          <inkml:channelProperty channel="F" name="resolution" value="0" units="1/dev"/>
+          <inkml:channelProperty channel="OA" name="resolution" value="1000" units="1/deg"/>
+          <inkml:channelProperty channel="OE" name="resolution" value="1000" units="1/deg"/>
+        </inkml:channelProperties>
+      </inkml:inkSource>
+      <inkml:timestamp xml:id="ts0" timeString="2021-02-24T19:01:18.810"/>
+    </inkml:context>
+    <inkml:brush xml:id="br0">
+      <inkml:brushProperty name="width" value="0.05" units="cm"/>
+      <inkml:brushProperty name="height" value="0.05" units="cm"/>
+      <inkml:brushProperty name="color" value="#004F8B"/>
+    </inkml:brush>
+  </inkml:definitions>
+  <inkml:trace contextRef="#ctx0" brushRef="#br0">46 1 9672 0 0,'0'0'7066'0'0,"-11"2"-3243"0"0,8 0-3690 0 0,1 0 0 0 0,0 0 0 0 0,0 0 0 0 0,0 0 0 0 0,0 0 0 0 0,1 0 0 0 0,-1 1 0 0 0,0-1 0 0 0,1 0-1 0 0,0 1 1 0 0,-1 0 0 0 0,1-1 0 0 0,0 1 0 0 0,-1 4 0 0 0,0 5-51 0 0,-1-1-1 0 0,0 15 1 0 0,3-21 13 0 0,-1 10-76 0 0,1 0 0 0 0,1 0-1 0 0,0 1 1 0 0,1-1 0 0 0,1-1-1 0 0,0 1 1 0 0,1 0 0 0 0,0-1-1 0 0,10 21 1 0 0,-13-32-12 0 0,1 0 0 0 0,-1-1 0 0 0,1 1 0 0 0,0 0 0 0 0,0-1 0 0 0,-1 0 0 0 0,2 1 0 0 0,-1-1 0 0 0,0 0 0 0 0,0 0 0 0 0,1 0 0 0 0,4 3 0 0 0,-5-5 2 0 0,-1 1 1 0 0,1 0-1 0 0,-1-1 1 0 0,1 1-1 0 0,-1-1 1 0 0,1 1 0 0 0,0-1-1 0 0,-1 0 1 0 0,1 0-1 0 0,0 0 1 0 0,-1 0-1 0 0,1 0 1 0 0,0 0-1 0 0,-1 0 1 0 0,1 0-1 0 0,0 0 1 0 0,-1-1 0 0 0,1 1-1 0 0,-1-1 1 0 0,1 0-1 0 0,0 1 1 0 0,-1-1-1 0 0,3-1 1 0 0,5-5 109 0 0,0 0 0 0 0,0 0 0 0 0,-1-1 0 0 0,0 0 0 0 0,8-11 1 0 0,29-47 801 0 0,-13 17-416 0 0,-23 32-518 0 0,-8 16 91 0 0,0-1-1 0 0,-1 1 1 0 0,1-1 0 0 0,0 1 0 0 0,-1 0-1 0 0,1-1 1 0 0,0 1 0 0 0,0 0 0 0 0,0 0-1 0 0,0 0 1 0 0,0 0 0 0 0,1 0 0 0 0,-1 0-1 0 0,0 0 1 0 0,0 0 0 0 0,1 0 0 0 0,-1 0-1 0 0,3-1 1 0 0,-3 2-60 0 0,-1 0 0 0 0,1 0-1 0 0,-1 0 1 0 0,0 0 0 0 0,1 0 0 0 0,-1 0-1 0 0,1 0 1 0 0,-1 1 0 0 0,1-1-1 0 0,-1 0 1 0 0,0 0 0 0 0,1 0 0 0 0,-1 0-1 0 0,1 1 1 0 0,-1-1 0 0 0,0 0-1 0 0,1 0 1 0 0,-1 0 0 0 0,1 1 0 0 0,-1-1-1 0 0,0 0 1 0 0,0 1 0 0 0,1-1 0 0 0,-1 0-1 0 0,0 1 1 0 0,1-1 0 0 0,-1 0-1 0 0,0 1 1 0 0,0 0 0 0 0,7 12-204 0 0,-7-12 191 0 0,4 10-7 0 0,0 1 0 0 0,-1 0 0 0 0,-1 1 0 0 0,0-1 0 0 0,0 13 0 0 0,-1-12-11 0 0,0-1-1 0 0,1 1 0 0 0,0 0 1 0 0,1-1-1 0 0,5 14 1 0 0,-7-25-38 0 0,-1-1 1 0 0,0 1-1 0 0,0 0 1 0 0,0-1 0 0 0,1 1-1 0 0,-1 0 1 0 0,0-1 0 0 0,1 1-1 0 0,-1 0 1 0 0,1-1 0 0 0,-1 1-1 0 0,0-1 1 0 0,1 1 0 0 0,0-1-1 0 0,-1 1 1 0 0,1-1 0 0 0,-1 1-1 0 0,1-1 1 0 0,-1 0 0 0 0,1 1-1 0 0,0-1 1 0 0,-1 0 0 0 0,1 1-1 0 0,0-1 1 0 0,-1 0 0 0 0,1 0-1 0 0,0 0 1 0 0,0 0 0 0 0,-1 1-1 0 0,1-1 1 0 0,0 0 0 0 0,-1 0-1 0 0,1 0 1 0 0,0-1 0 0 0,0 1-1 0 0,-1 0 1 0 0,1 0 0 0 0,0 0-1 0 0,-1 0 1 0 0,2-1 0 0 0,2-1-433 0 0,-1 0 0 0 0,1-1 0 0 0,-1 1 0 0 0,0-1 0 0 0,0 0 1 0 0,3-3-1 0 0,9-10-1395 0 0</inkml:trace>
+</inkml:ink>
+</file>
+
+<file path=ppt/ink/ink28.xml><?xml version="1.0" encoding="utf-8"?>
+<inkml:ink xmlns:inkml="http://www.w3.org/2003/InkML">
+  <inkml:definitions>
+    <inkml:context xml:id="ctx0">
+      <inkml:inkSource xml:id="inkSrc0">
+        <inkml:traceFormat>
+          <inkml:channel name="X" type="integer" min="-2.14748E9" max="2.14748E9" units="cm"/>
+          <inkml:channel name="Y" type="integer" min="-2.14748E9" max="2.14748E9" units="cm"/>
+          <inkml:channel name="F" type="integer" max="32767" units="dev"/>
+          <inkml:channel name="OA" type="integer" max="360" units="deg"/>
+          <inkml:channel name="OE" type="integer" max="90" units="deg"/>
+        </inkml:traceFormat>
+        <inkml:channelProperties>
+          <inkml:channelProperty channel="X" name="resolution" value="1000" units="1/cm"/>
+          <inkml:channelProperty channel="Y" name="resolution" value="1000" units="1/cm"/>
+          <inkml:channelProperty channel="F" name="resolution" value="0" units="1/dev"/>
+          <inkml:channelProperty channel="OA" name="resolution" value="1000" units="1/deg"/>
+          <inkml:channelProperty channel="OE" name="resolution" value="1000" units="1/deg"/>
+        </inkml:channelProperties>
+      </inkml:inkSource>
+      <inkml:timestamp xml:id="ts0" timeString="2021-02-24T19:01:19.177"/>
+    </inkml:context>
+    <inkml:brush xml:id="br0">
+      <inkml:brushProperty name="width" value="0.05" units="cm"/>
+      <inkml:brushProperty name="height" value="0.05" units="cm"/>
+      <inkml:brushProperty name="color" value="#004F8B"/>
+    </inkml:brush>
+  </inkml:definitions>
+  <inkml:trace contextRef="#ctx0" brushRef="#br0">0 0 6912 0 0,'1'0'9324'0'0,"6"2"-7699"0"0,-5-1-1415 0 0,0 0 0 0 0,-1 0 0 0 0,1 0 0 0 0,-1 0 0 0 0,1 1-1 0 0,-1-1 1 0 0,0 0 0 0 0,1 1 0 0 0,-1-1 0 0 0,0 1 0 0 0,0-1 0 0 0,0 1 0 0 0,0 0 0 0 0,0-1 0 0 0,-1 1 0 0 0,1 0 0 0 0,0 2 0 0 0,10 35 1179 0 0,-9-33-1071 0 0,2 17-144 0 0,2 46 0 0 0,-2-20 226 0 0,-3-7-306 0 0,0 8-485 0 0,3-28 261 0 0,-2-1 731 0 0,9 30 0 0 0,-11-50-312 0 0,1-5-180 0 0,-1 0-1 0 0,1 0 1 0 0,0 0-1 0 0,0 0 0 0 0,0 1 1 0 0,1-1-1 0 0,3-6 1 0 0,3-9 231 0 0,2-5-99 0 0,1 0-1 0 0,1 1 1 0 0,1 0-1 0 0,21-27 1 0 0,-27 40 87 0 0,1 0 0 0 0,1 1 1 0 0,17-17-1 0 0,-20 22-248 0 0,-1-1-1 0 0,1 1 1 0 0,0 0-1 0 0,0 1 1 0 0,0-1-1 0 0,1 1 1 0 0,-1 0 0 0 0,11-2-1 0 0,-16 4-177 0 0,1 1 0 0 0,0-1 1 0 0,0 1-1 0 0,0 0 0 0 0,0 0 0 0 0,0 0 0 0 0,0 0 0 0 0,0 0 0 0 0,0 0 0 0 0,0 0 1 0 0,0 1-1 0 0,0-1 0 0 0,0 1 0 0 0,3 1 0 0 0,-2-1-436 0 0,-1 1-1 0 0,1 0 1 0 0,-1 0 0 0 0,1 1-1 0 0,-1-1 1 0 0,1 0 0 0 0,-1 1-1 0 0,2 3 1 0 0,4 4-7996 0 0</inkml:trace>
+</inkml:ink>
+</file>
+
+<file path=ppt/ink/ink29.xml><?xml version="1.0" encoding="utf-8"?>
+<inkml:ink xmlns:inkml="http://www.w3.org/2003/InkML">
+  <inkml:definitions>
+    <inkml:context xml:id="ctx0">
+      <inkml:inkSource xml:id="inkSrc0">
+        <inkml:traceFormat>
+          <inkml:channel name="X" type="integer" min="-2.14748E9" max="2.14748E9" units="cm"/>
+          <inkml:channel name="Y" type="integer" min="-2.14748E9" max="2.14748E9" units="cm"/>
+          <inkml:channel name="F" type="integer" max="32767" units="dev"/>
+          <inkml:channel name="OA" type="integer" max="360" units="deg"/>
+          <inkml:channel name="OE" type="integer" max="90" units="deg"/>
+        </inkml:traceFormat>
+        <inkml:channelProperties>
+          <inkml:channelProperty channel="X" name="resolution" value="1000" units="1/cm"/>
+          <inkml:channelProperty channel="Y" name="resolution" value="1000" units="1/cm"/>
+          <inkml:channelProperty channel="F" name="resolution" value="0" units="1/dev"/>
+          <inkml:channelProperty channel="OA" name="resolution" value="1000" units="1/deg"/>
+          <inkml:channelProperty channel="OE" name="resolution" value="1000" units="1/deg"/>
+        </inkml:channelProperties>
+      </inkml:inkSource>
+      <inkml:timestamp xml:id="ts0" timeString="2021-02-24T19:01:21.549"/>
+    </inkml:context>
+    <inkml:brush xml:id="br0">
+      <inkml:brushProperty name="width" value="0.05" units="cm"/>
+      <inkml:brushProperty name="height" value="0.05" units="cm"/>
+      <inkml:brushProperty name="color" value="#004F8B"/>
+    </inkml:brush>
+  </inkml:definitions>
+  <inkml:trace contextRef="#ctx0" brushRef="#br0">114 1 17503 0 0,'0'0'1338'0'0,"-1"0"-917"0"0,0-1-341 0 0,0 1 0 0 0,-1 0 0 0 0,1 1 0 0 0,0-1-1 0 0,-1 0 1 0 0,1 0 0 0 0,0 1 0 0 0,0-1 0 0 0,-1 0 0 0 0,1 1 0 0 0,0-1 0 0 0,0 1 0 0 0,0 0-1 0 0,-1-1 1 0 0,1 1 0 0 0,0 0 0 0 0,0 0 0 0 0,0 0 0 0 0,0-1 0 0 0,-1 3 0 0 0,0 0 2 0 0,1 0 0 0 0,-1 0 0 0 0,1 0 0 0 0,0 0 0 0 0,0 0 0 0 0,-1 5 0 0 0,-4 10 806 0 0,2-9-597 0 0,1 0 0 0 0,-4 14 0 0 0,-3 9-744 0 0,2-7 347 0 0,2 0 1 0 0,-7 51-1 0 0,7-37 96 0 0,1-13 169 0 0,1-1-1 0 0,2 1 0 0 0,0 0 0 0 0,2 0 0 0 0,4 37 1 0 0,-3-53-140 0 0,0-4-53 0 0,0 0 1 0 0,0 0-1 0 0,1 0 1 0 0,2 7-1 0 0,-2-10 48 0 0,-1 0 0 0 0,1 0-1 0 0,0 0 1 0 0,0-1-1 0 0,0 1 1 0 0,1-1 0 0 0,-1 1-1 0 0,0-1 1 0 0,1 0-1 0 0,3 3 1 0 0,0-2 3 0 0,-1 1 0 0 0,1-1 1 0 0,0 0-1 0 0,1-1 0 0 0,-1 1 0 0 0,0-1 0 0 0,1 0 1 0 0,11 1-1 0 0,59 3 413 0 0,-55-5-246 0 0,7-2 91 0 0,1-1 0 0 0,56-11 0 0 0,-12 2-58 0 0,-63 10-188 0 0,0 0 6 0 0,0-1 0 0 0,0 0 0 0 0,14-4 0 0 0,-24 5 34 0 0,-1 0-15 0 0,-4-4-7 0 0,0 0 1 0 0,0 0 0 0 0,-1 0 0 0 0,1 1 0 0 0,-1-1 0 0 0,0 1 0 0 0,-1 0 0 0 0,1 1-1 0 0,-1-1 1 0 0,1 1 0 0 0,-9-4 0 0 0,-20-13-324 0 0,21 12 140 0 0,7 5 114 0 0,1-1 0 0 0,-1 1 0 0 0,-7-8 0 0 0,16 10 24 0 0,7 1-9 0 0,8 2-41 0 0,17 6-94 0 0,-21-4 162 0 0,1-1 0 0 0,-1 0 0 0 0,23 0 1 0 0,-35-3-15 0 0,0 0 0 0 0,0 1 0 0 0,0-1 0 0 0,-1 0 1 0 0,1 1-1 0 0,0 0 0 0 0,0-1 0 0 0,2 2 1 0 0,-3-1-4 0 0,-1-1 0 0 0,0 0 0 0 0,0 0 0 0 0,1 0 0 0 0,-1 0 0 0 0,0 0 0 0 0,0 0 0 0 0,0 0 1 0 0,1 1-1 0 0,-1-1 0 0 0,0 0 0 0 0,0 0 0 0 0,0 0 0 0 0,0 1 0 0 0,1-1 0 0 0,-1 0 0 0 0,0 0 0 0 0,0 0 1 0 0,0 1-1 0 0,0-1 0 0 0,0 0 0 0 0,0 0 0 0 0,0 1 0 0 0,1-1 0 0 0,-1 0 0 0 0,0 0 0 0 0,0 1 0 0 0,0-1 1 0 0,0 0-1 0 0,0 0 0 0 0,0 1 0 0 0,0-1 0 0 0,0 0 0 0 0,0 0 0 0 0,0 1 0 0 0,-1-1 0 0 0,1 0 1 0 0,0 0-1 0 0,0 1 0 0 0,0-1 0 0 0,0 0 0 0 0,0 0 0 0 0,0 0 0 0 0,0 1 0 0 0,-1-1 0 0 0,1 0 0 0 0,0 0 1 0 0,0 0-1 0 0,0 1 0 0 0,-1-1 0 0 0,1 0 0 0 0,0 0 0 0 0,0 0 0 0 0,0 0 0 0 0,-1 0 0 0 0,1 0 0 0 0,0 1 1 0 0,0-1-1 0 0,-1 0 0 0 0,1 0 0 0 0,0 0 0 0 0,0 0 0 0 0,-1 0 0 0 0,-30 25 471 0 0,-14 8-1064 0 0,34-27 231 0 0,0-1 0 0 0,1 1 0 0 0,0 1 0 0 0,1 0-1 0 0,-1 0 1 0 0,1 1 0 0 0,-13 14 0 0 0,13-8-664 0 0</inkml:trace>
+</inkml:ink>
+</file>
+
+<file path=ppt/ink/ink3.xml><?xml version="1.0" encoding="utf-8"?>
+<inkml:ink xmlns:inkml="http://www.w3.org/2003/InkML">
+  <inkml:definitions>
+    <inkml:context xml:id="ctx0">
+      <inkml:inkSource xml:id="inkSrc0">
+        <inkml:traceFormat>
+          <inkml:channel name="X" type="integer" min="-2.14748E9" max="2.14748E9" units="cm"/>
+          <inkml:channel name="Y" type="integer" min="-2.14748E9" max="2.14748E9" units="cm"/>
+          <inkml:channel name="F" type="integer" max="32767" units="dev"/>
+          <inkml:channel name="OA" type="integer" max="360" units="deg"/>
+          <inkml:channel name="OE" type="integer" max="90" units="deg"/>
+        </inkml:traceFormat>
+        <inkml:channelProperties>
+          <inkml:channelProperty channel="X" name="resolution" value="1000" units="1/cm"/>
+          <inkml:channelProperty channel="Y" name="resolution" value="1000" units="1/cm"/>
+          <inkml:channelProperty channel="F" name="resolution" value="0" units="1/dev"/>
+          <inkml:channelProperty channel="OA" name="resolution" value="1000" units="1/deg"/>
+          <inkml:channelProperty channel="OE" name="resolution" value="1000" units="1/deg"/>
+        </inkml:channelProperties>
+      </inkml:inkSource>
+      <inkml:timestamp xml:id="ts0" timeString="2021-02-24T19:00:41.206"/>
+    </inkml:context>
+    <inkml:brush xml:id="br0">
+      <inkml:brushProperty name="width" value="0.05" units="cm"/>
+      <inkml:brushProperty name="height" value="0.05" units="cm"/>
+      <inkml:brushProperty name="color" value="#004F8B"/>
+    </inkml:brush>
+  </inkml:definitions>
+  <inkml:trace contextRef="#ctx0" brushRef="#br0">48 143 1840 0 0,'-4'-13'663'0'0,"0"12"-128"0"0,0 0 447 0 0,3 0-700 0 0,-1-1 1 0 0,1 1 0 0 0,-1 0-1 0 0,0 0 1 0 0,1 1-1 0 0,-1-1 1 0 0,0 0-1 0 0,0 1 1 0 0,0-1-1 0 0,1 1 1 0 0,-1-1 0 0 0,-3 1-1 0 0,4-1-156 0 0,1 1 1 0 0,-1 0-1 0 0,0-1 1 0 0,1 1-1 0 0,-1 0 0 0 0,1-1 1 0 0,-1 1-1 0 0,1-1 0 0 0,-1 1 1 0 0,1-1-1 0 0,-1 1 0 0 0,1-1 1 0 0,-1 1-1 0 0,1-1 0 0 0,-1 0 1 0 0,1 1-1 0 0,0-1 0 0 0,-1 0 1 0 0,1 1-1 0 0,0-1 1 0 0,0 0-1 0 0,0 1 0 0 0,-1-1 1 0 0,1 0-1 0 0,0 0 0 0 0,0 1 1 0 0,0-1-1 0 0,0 0 0 0 0,0 1 1 0 0,0-1-1 0 0,0 0 0 0 0,0 0 1 0 0,1 1-1 0 0,-1-2 1 0 0,0 0 161 0 0,1 0 1 0 0,-1 0 0 0 0,1 0 0 0 0,-1 0 0 0 0,1 0 0 0 0,0 0-1 0 0,0 0 1 0 0,0 0 0 0 0,0 0 0 0 0,2-3 0 0 0,-2 5-107 0 0,-1-1 0 0 0,1 1 1 0 0,-1-1-1 0 0,1 1 0 0 0,0 0 0 0 0,-1 0 1 0 0,1-1-1 0 0,0 1 0 0 0,-1 0 0 0 0,1 0 1 0 0,0 0-1 0 0,-1 0 0 0 0,1 0 0 0 0,0 0 1 0 0,-1 0-1 0 0,1 0 0 0 0,0 0 0 0 0,-1 0 1 0 0,1 0-1 0 0,0 0 0 0 0,-1 0 0 0 0,1 1 1 0 0,0-1-1 0 0,20 10-272 0 0,-7-3 884 0 0,5-3-549 0 0,-1 0 1 0 0,1 0-1 0 0,0-2 0 0 0,36 0 0 0 0,78-11 442 0 0,-106 7-470 0 0,30-2 59 0 0,1 2 1 0 0,102 10-1 0 0,-9 7-15 0 0,2 5-55 0 0,-122-16 175 0 0,6 3-70 0 0,0-3 1 0 0,0-1-1 0 0,69-3 0 0 0,12-5-135 0 0,-6 2 456 0 0,39-6 574 0 0,41-4-1068 0 0,-52 2 504 0 0,-58 7-311 0 0,62-9 224 0 0,-76 6 20 0 0,-9 2-291 0 0,-37 3-135 0 0,32 3-1 0 0,-20-1-64 0 0,-2-4 63 0 0,-18-7-31 0 0,-12 9-107 0 0,0-1-150 0 0,-1 0 0 0 0,1 0 0 0 0,-1 0-1 0 0,0-1 1 0 0,1 1 0 0 0,-2 0 0 0 0,2-5 0 0 0,0-20-7800 0 0</inkml:trace>
+</inkml:ink>
+</file>
+
+<file path=ppt/ink/ink30.xml><?xml version="1.0" encoding="utf-8"?>
+<inkml:ink xmlns:inkml="http://www.w3.org/2003/InkML">
+  <inkml:definitions>
+    <inkml:context xml:id="ctx0">
+      <inkml:inkSource xml:id="inkSrc0">
+        <inkml:traceFormat>
+          <inkml:channel name="X" type="integer" min="-2.14748E9" max="2.14748E9" units="cm"/>
+          <inkml:channel name="Y" type="integer" min="-2.14748E9" max="2.14748E9" units="cm"/>
+          <inkml:channel name="F" type="integer" max="32767" units="dev"/>
+          <inkml:channel name="OA" type="integer" max="360" units="deg"/>
+          <inkml:channel name="OE" type="integer" max="90" units="deg"/>
+        </inkml:traceFormat>
+        <inkml:channelProperties>
+          <inkml:channelProperty channel="X" name="resolution" value="1000" units="1/cm"/>
+          <inkml:channelProperty channel="Y" name="resolution" value="1000" units="1/cm"/>
+          <inkml:channelProperty channel="F" name="resolution" value="0" units="1/dev"/>
+          <inkml:channelProperty channel="OA" name="resolution" value="1000" units="1/deg"/>
+          <inkml:channelProperty channel="OE" name="resolution" value="1000" units="1/deg"/>
+        </inkml:channelProperties>
+      </inkml:inkSource>
+      <inkml:timestamp xml:id="ts0" timeString="2021-02-24T19:01:22.043"/>
+    </inkml:context>
+    <inkml:brush xml:id="br0">
+      <inkml:brushProperty name="width" value="0.05" units="cm"/>
+      <inkml:brushProperty name="height" value="0.05" units="cm"/>
+      <inkml:brushProperty name="color" value="#004F8B"/>
+    </inkml:brush>
+  </inkml:definitions>
+  <inkml:trace contextRef="#ctx0" brushRef="#br0">60 93 5984 0 0,'-2'1'100'0'0,"0"0"0"0"0,0 0 0 0 0,0 0 0 0 0,0 0 0 0 0,0 1 0 0 0,0-1 0 0 0,-2 3 0 0 0,3-3 413 0 0,-1 1 0 0 0,1-1 0 0 0,-1 0 0 0 0,1 0 0 0 0,-1 0 0 0 0,0 0 0 0 0,0 0 0 0 0,-7 7 6734 0 0,9 1-5726 0 0,3 9-1111 0 0,4 5-293 0 0,-1 1 1 0 0,-1-1-1 0 0,-1 1 0 0 0,-1 0 1 0 0,-1 1-1 0 0,-1 26 0 0 0,-3 2 388 0 0,-15 96 0 0 0,7-116 227 0 0,10-33-726 0 0,0 0 1 0 0,0 0 0 0 0,0 1 0 0 0,0-1 0 0 0,0 0-1 0 0,0 0 1 0 0,0 0 0 0 0,0 0 0 0 0,0 0-1 0 0,0 0 1 0 0,0 1 0 0 0,0-1 0 0 0,0 0 0 0 0,0 0-1 0 0,0 0 1 0 0,0 0 0 0 0,0 0 0 0 0,0 1-1 0 0,0-1 1 0 0,0 0 0 0 0,0 0 0 0 0,0 0 0 0 0,0 0-1 0 0,-1 0 1 0 0,1 0 0 0 0,0 0 0 0 0,0 0-1 0 0,0 1 1 0 0,0-1 0 0 0,0 0 0 0 0,0 0 0 0 0,0 0-1 0 0,-1 0 1 0 0,1 0 0 0 0,0 0 0 0 0,0 0-1 0 0,0 0 1 0 0,0 0 0 0 0,0 0 0 0 0,0 0 0 0 0,-1 0-1 0 0,1 0 1 0 0,0 0 0 0 0,0 0 0 0 0,0 0-1 0 0,0 0 1 0 0,0 0 0 0 0,0 0 0 0 0,-1 0 0 0 0,1 0-1 0 0,0 0 1 0 0,0 0 0 0 0,0 0 0 0 0,0 0-1 0 0,0 0 1 0 0,-1 0 0 0 0,1 0 0 0 0,0 0 0 0 0,0 0-1 0 0,0-1 1 0 0,0 1 0 0 0,-5-8 359 0 0,1-12-162 0 0,1 1 0 0 0,0-1-1 0 0,2-25 1 0 0,1 31-161 0 0,3-96 118 0 0,-1 93-143 0 0,0 0 1 0 0,2 0 0 0 0,0 0 0 0 0,9-24-1 0 0,-11 37-21 0 0,8-23 238 0 0,1 1 0 0 0,1 1 0 0 0,30-48 0 0 0,-37 66-224 0 0,0 1 1 0 0,0 0 0 0 0,0 0-1 0 0,1 1 1 0 0,0-1-1 0 0,0 1 1 0 0,0 0-1 0 0,1 1 1 0 0,0 0 0 0 0,-1 0-1 0 0,2 0 1 0 0,-1 1-1 0 0,0 0 1 0 0,1 0-1 0 0,-1 1 1 0 0,1 0 0 0 0,-1 0-1 0 0,1 1 1 0 0,11-1-1 0 0,-11 2 135 0 0,0 0 0 0 0,0 0 0 0 0,-1 1 0 0 0,1 0 0 0 0,0 1-1 0 0,0-1 1 0 0,0 1 0 0 0,8 4 0 0 0,-12-4-119 0 0,0 0 0 0 0,0 0 0 0 0,-1 0 0 0 0,1 0 0 0 0,-1 1 0 0 0,1-1 0 0 0,-1 1 1 0 0,0 0-1 0 0,0 0 0 0 0,0 0 0 0 0,-1 0 0 0 0,1 1 0 0 0,-1-1 0 0 0,1 1 0 0 0,-1-1 0 0 0,0 1 0 0 0,1 4 0 0 0,-2-4-16 0 0,1 0 0 0 0,-1 0 0 0 0,0 0 1 0 0,0 0-1 0 0,-1 0 0 0 0,1 0 0 0 0,-1 0 0 0 0,0 0 0 0 0,0 0 0 0 0,0 0 0 0 0,-1 0 0 0 0,0 0 0 0 0,1 0 0 0 0,-1 0 0 0 0,-1 0 1 0 0,1-1-1 0 0,0 1 0 0 0,-1 0 0 0 0,0 0 0 0 0,0-1 0 0 0,0 1 0 0 0,0-1 0 0 0,-1 0 0 0 0,1 0 0 0 0,-1 0 0 0 0,0 0 1 0 0,0 0-1 0 0,0 0 0 0 0,0-1 0 0 0,0 1 0 0 0,0-1 0 0 0,-1 0 0 0 0,1 0 0 0 0,-1 0 0 0 0,0-1 0 0 0,0 1 0 0 0,-5 1 0 0 0,-14 3 15 0 0,3 0-164 0 0,0-1 1 0 0,-1-1-1 0 0,-25 3 0 0 0,23-6-497 0 0,-22 1-1597 0 0,15-8-5221 0 0,19 1 78 0 0</inkml:trace>
+</inkml:ink>
+</file>
+
+<file path=ppt/ink/ink31.xml><?xml version="1.0" encoding="utf-8"?>
+<inkml:ink xmlns:inkml="http://www.w3.org/2003/InkML">
+  <inkml:definitions>
+    <inkml:context xml:id="ctx0">
+      <inkml:inkSource xml:id="inkSrc0">
+        <inkml:traceFormat>
+          <inkml:channel name="X" type="integer" min="-2.14748E9" max="2.14748E9" units="cm"/>
+          <inkml:channel name="Y" type="integer" min="-2.14748E9" max="2.14748E9" units="cm"/>
+          <inkml:channel name="F" type="integer" max="32767" units="dev"/>
+          <inkml:channel name="OA" type="integer" max="360" units="deg"/>
+          <inkml:channel name="OE" type="integer" max="90" units="deg"/>
+        </inkml:traceFormat>
+        <inkml:channelProperties>
+          <inkml:channelProperty channel="X" name="resolution" value="1000" units="1/cm"/>
+          <inkml:channelProperty channel="Y" name="resolution" value="1000" units="1/cm"/>
+          <inkml:channelProperty channel="F" name="resolution" value="0" units="1/dev"/>
+          <inkml:channelProperty channel="OA" name="resolution" value="1000" units="1/deg"/>
+          <inkml:channelProperty channel="OE" name="resolution" value="1000" units="1/deg"/>
+        </inkml:channelProperties>
+      </inkml:inkSource>
+      <inkml:timestamp xml:id="ts0" timeString="2021-02-24T19:01:22.414"/>
+    </inkml:context>
+    <inkml:brush xml:id="br0">
+      <inkml:brushProperty name="width" value="0.05" units="cm"/>
+      <inkml:brushProperty name="height" value="0.05" units="cm"/>
+      <inkml:brushProperty name="color" value="#004F8B"/>
+    </inkml:brush>
+  </inkml:definitions>
+  <inkml:trace contextRef="#ctx0" brushRef="#br0">63 301 21191 0 0,'0'1'55'0'0,"1"-1"-1"0"0,0 0 1 0 0,-1 1-1 0 0,1-1 0 0 0,0 1 1 0 0,-1-1-1 0 0,1 1 1 0 0,-1-1-1 0 0,1 1 1 0 0,-1-1-1 0 0,1 1 0 0 0,-1-1 1 0 0,1 1-1 0 0,-1 0 1 0 0,1-1-1 0 0,-1 1 1 0 0,0 0-1 0 0,0-1 0 0 0,1 1 1 0 0,-1 0-1 0 0,0-1 1 0 0,0 1-1 0 0,0 0 1 0 0,1 0-1 0 0,-1-1 0 0 0,0 1 1 0 0,0 0-1 0 0,0 0 1 0 0,0 0-1 0 0,-1 1 1 0 0,-4 28 658 0 0,3-21-786 0 0,-7 27-167 0 0,-17 48-1 0 0,18-63 210 0 0,-14 48-2206 0 0,21-64 1018 0 0</inkml:trace>
+  <inkml:trace contextRef="#ctx0" brushRef="#br0" timeOffset="1">150 4 13824 0 0,'0'0'1224'0'0,"-3"-3"-976"0"0,-3 3-248 0 0</inkml:trace>
+</inkml:ink>
+</file>
+
+<file path=ppt/ink/ink32.xml><?xml version="1.0" encoding="utf-8"?>
+<inkml:ink xmlns:inkml="http://www.w3.org/2003/InkML">
+  <inkml:definitions>
+    <inkml:context xml:id="ctx0">
+      <inkml:inkSource xml:id="inkSrc0">
+        <inkml:traceFormat>
+          <inkml:channel name="X" type="integer" min="-2.14748E9" max="2.14748E9" units="cm"/>
+          <inkml:channel name="Y" type="integer" min="-2.14748E9" max="2.14748E9" units="cm"/>
+          <inkml:channel name="F" type="integer" max="32767" units="dev"/>
+          <inkml:channel name="OA" type="integer" max="360" units="deg"/>
+          <inkml:channel name="OE" type="integer" max="90" units="deg"/>
+        </inkml:traceFormat>
+        <inkml:channelProperties>
+          <inkml:channelProperty channel="X" name="resolution" value="1000" units="1/cm"/>
+          <inkml:channelProperty channel="Y" name="resolution" value="1000" units="1/cm"/>
+          <inkml:channelProperty channel="F" name="resolution" value="0" units="1/dev"/>
+          <inkml:channelProperty channel="OA" name="resolution" value="1000" units="1/deg"/>
+          <inkml:channelProperty channel="OE" name="resolution" value="1000" units="1/deg"/>
+        </inkml:channelProperties>
+      </inkml:inkSource>
+      <inkml:timestamp xml:id="ts0" timeString="2021-02-24T19:01:22.934"/>
+    </inkml:context>
+    <inkml:brush xml:id="br0">
+      <inkml:brushProperty name="width" value="0.05" units="cm"/>
+      <inkml:brushProperty name="height" value="0.05" units="cm"/>
+      <inkml:brushProperty name="color" value="#004F8B"/>
+    </inkml:brush>
+  </inkml:definitions>
+  <inkml:trace contextRef="#ctx0" brushRef="#br0">212 9 17503 0 0,'-3'2'-182'0'0,"2"-2"257"0"0,1 1 0 0 0,-1-1 0 0 0,0 1 0 0 0,1-1 0 0 0,-1 0 0 0 0,0 1 0 0 0,1-1 1 0 0,-1 0-1 0 0,0 1 0 0 0,0-1 0 0 0,1 0 0 0 0,-1 0 0 0 0,0 0 0 0 0,0 0 0 0 0,0 1 0 0 0,1-1 0 0 0,-1 0 0 0 0,0-1 1 0 0,0 1-1 0 0,0 0 0 0 0,1 0 0 0 0,-1 0 0 0 0,0 0 0 0 0,0 0 0 0 0,1-1 0 0 0,-1 1 0 0 0,-1-1 0 0 0,-8-4-129 0 0,9 4 109 0 0,-1 0 0 0 0,0 0-1 0 0,1 0 1 0 0,-1 1 0 0 0,0-1 0 0 0,0 0-1 0 0,1 1 1 0 0,-1-1 0 0 0,0 1-1 0 0,0 0 1 0 0,0-1 0 0 0,0 1-1 0 0,1 0 1 0 0,-1 0 0 0 0,0 0 0 0 0,0 1-1 0 0,0-1 1 0 0,0 0 0 0 0,-2 2-1 0 0,-3 0-2 0 0,0 1 0 0 0,0 0-1 0 0,0 1 1 0 0,1-1 0 0 0,-1 1-1 0 0,1 1 1 0 0,0-1-1 0 0,0 1 1 0 0,1 0 0 0 0,-1 1-1 0 0,1-1 1 0 0,0 1 0 0 0,1 0-1 0 0,0 0 1 0 0,-1 1 0 0 0,2-1-1 0 0,-1 1 1 0 0,1 0-1 0 0,0 0 1 0 0,1 0 0 0 0,-3 10-1 0 0,-6 5 104 0 0,10-19-132 0 0,-1 0 0 0 0,1-1 0 0 0,-1 1 0 0 0,1 0 0 0 0,0 0 0 0 0,0 0 0 0 0,0 0 1 0 0,0 0-1 0 0,0 4 0 0 0,2 8 0 0 0,-1-12-24 0 0,0 1 1 0 0,0-1 0 0 0,0 1 0 0 0,0-1 0 0 0,0 1 0 0 0,-2 6 0 0 0,1-9 4 0 0,1 1-1 0 0,0-1 1 0 0,0 1-1 0 0,-1 0 1 0 0,1-1-1 0 0,0 1 1 0 0,0 0-1 0 0,1-1 1 0 0,-1 1-1 0 0,0-1 1 0 0,0 1-1 0 0,1 0 1 0 0,0 2-1 0 0,0-4 5 0 0,-1 1 0 0 0,0 0 0 0 0,1 0-1 0 0,-1-1 1 0 0,1 1 0 0 0,-1 0-1 0 0,1 0 1 0 0,-1-1 0 0 0,1 1-1 0 0,0 0 1 0 0,-1-1 0 0 0,1 1 0 0 0,0-1-1 0 0,0 1 1 0 0,-1-1 0 0 0,1 1-1 0 0,0-1 1 0 0,0 0 0 0 0,0 1-1 0 0,-1-1 1 0 0,1 0 0 0 0,0 0 0 0 0,0 0-1 0 0,0 1 1 0 0,1-1 0 0 0,2-1 41 0 0,0 0 0 0 0,-1 0 0 0 0,1 0 0 0 0,0-1 0 0 0,-1 0 0 0 0,0 1 0 0 0,1-1 1 0 0,-1 0-1 0 0,0 0 0 0 0,0-1 0 0 0,0 1 0 0 0,0-1 0 0 0,3-3 0 0 0,-1 2 22 0 0,0-1-6 0 0,-1 0-1 0 0,1 0 1 0 0,-1 0-1 0 0,4-7 0 0 0,-5 7-13 0 0,1-1 0 0 0,0 1 0 0 0,0 1 1 0 0,6-7-1 0 0,-4 6 44 0 0,0 0 1 0 0,-1 0 0 0 0,0-1 0 0 0,7-10-1 0 0,-10 13 3 0 0,1 0 1 0 0,-1 0-1 0 0,0 1 0 0 0,1-1 0 0 0,0 1 0 0 0,0-1 0 0 0,5-3 1 0 0,-6 5 227 0 0,-4 2 29 0 0,-1 0-319 0 0,6 3-35 0 0,0-2 4 0 0,0 1-1 0 0,0 0 1 0 0,-1 0-1 0 0,1 0 1 0 0,-1 1-1 0 0,0-1 1 0 0,0 1-1 0 0,0-1 1 0 0,0 1-1 0 0,1 4 1 0 0,0 2 26 0 0,1-1 1 0 0,-2 1 0 0 0,2 11-1 0 0,-3-12-35 0 0,0 1-1 0 0,-2 17 0 0 0,0-19-11 0 0,1 0-1 0 0,0 0 1 0 0,2 14-1 0 0,0-10 17 0 0,0 1 0 0 0,0 22 0 0 0,-2-32-16 0 0,0 0-1 0 0,0-1 1 0 0,1 1-1 0 0,0 0 1 0 0,-1-1 0 0 0,1 1-1 0 0,0-1 1 0 0,0 1-1 0 0,0-1 1 0 0,1 1-1 0 0,-1-1 1 0 0,0 0-1 0 0,4 4 1 0 0,-4-5-59 0 0,-1 0 0 0 0,1-1 0 0 0,0 1 0 0 0,-1-1 0 0 0,1 1 0 0 0,0-1 0 0 0,-1 1 0 0 0,1-1 0 0 0,0 1 0 0 0,0-1 1 0 0,0 1-1 0 0,-1-1 0 0 0,1 0 0 0 0,0 0 0 0 0,0 1 0 0 0,0-1 0 0 0,0 0 0 0 0,0 0 0 0 0,0 0 0 0 0,0 0 0 0 0,0 0 0 0 0,-1 0 0 0 0,1 0 0 0 0,0 0 0 0 0,0 0 0 0 0,0-1 0 0 0,0 1 0 0 0,0 0 1 0 0,0 0-1 0 0,-1-1 0 0 0,1 1 0 0 0,0-1 0 0 0,0 1 0 0 0,0-1 0 0 0,-1 1 0 0 0,1-1 0 0 0,0 1 0 0 0,-1-1 0 0 0,1 0 0 0 0,-1 1 0 0 0,1-1 0 0 0,0 0 0 0 0,0 0 0 0 0,10-15-1621 0 0</inkml:trace>
+</inkml:ink>
+</file>
+
+<file path=ppt/ink/ink33.xml><?xml version="1.0" encoding="utf-8"?>
+<inkml:ink xmlns:inkml="http://www.w3.org/2003/InkML">
+  <inkml:definitions>
+    <inkml:context xml:id="ctx0">
+      <inkml:inkSource xml:id="inkSrc0">
+        <inkml:traceFormat>
+          <inkml:channel name="X" type="integer" min="-2.14748E9" max="2.14748E9" units="cm"/>
+          <inkml:channel name="Y" type="integer" min="-2.14748E9" max="2.14748E9" units="cm"/>
+          <inkml:channel name="F" type="integer" max="32767" units="dev"/>
+          <inkml:channel name="OA" type="integer" max="360" units="deg"/>
+          <inkml:channel name="OE" type="integer" max="90" units="deg"/>
+        </inkml:traceFormat>
+        <inkml:channelProperties>
+          <inkml:channelProperty channel="X" name="resolution" value="1000" units="1/cm"/>
+          <inkml:channelProperty channel="Y" name="resolution" value="1000" units="1/cm"/>
+          <inkml:channelProperty channel="F" name="resolution" value="0" units="1/dev"/>
+          <inkml:channelProperty channel="OA" name="resolution" value="1000" units="1/deg"/>
+          <inkml:channelProperty channel="OE" name="resolution" value="1000" units="1/deg"/>
+        </inkml:channelProperties>
+      </inkml:inkSource>
+      <inkml:timestamp xml:id="ts0" timeString="2021-02-24T19:01:23.314"/>
+    </inkml:context>
+    <inkml:brush xml:id="br0">
+      <inkml:brushProperty name="width" value="0.05" units="cm"/>
+      <inkml:brushProperty name="height" value="0.05" units="cm"/>
+      <inkml:brushProperty name="color" value="#004F8B"/>
+    </inkml:brush>
+  </inkml:definitions>
+  <inkml:trace contextRef="#ctx0" brushRef="#br0">5 1 18543 0 0,'-2'2'190'0'0,"2"-1"-123"0"0,0-1 0 0 0,-1 0 1 0 0,1 0-1 0 0,0 1 0 0 0,0-1 0 0 0,0 0 0 0 0,-1 1 1 0 0,1-1-1 0 0,0 1 0 0 0,0-1 0 0 0,0 0 0 0 0,0 1 1 0 0,0-1-1 0 0,0 0 0 0 0,0 1 0 0 0,0-1 1 0 0,0 1-1 0 0,0-1 0 0 0,0 0 0 0 0,0 1 0 0 0,0 0 1 0 0,1-1-43 0 0,-1 1 0 0 0,1-1 0 0 0,0 1 0 0 0,0 0 0 0 0,0-1 0 0 0,0 0 1 0 0,0 1-1 0 0,0-1 0 0 0,0 0 0 0 0,0 1 0 0 0,0-1 0 0 0,0 0 0 0 0,0 0 1 0 0,1 0-1 0 0,6 1 277 0 0,-1-1 0 0 0,0 0 0 0 0,0-1 0 0 0,0 0 1 0 0,1 0-1 0 0,9-3 0 0 0,-7 1-98 0 0,0 1 0 0 0,0 1-1 0 0,12-1 1 0 0,-11 2-204 0 0,-1 1 0 0 0,1-1 0 0 0,0 2 0 0 0,17 4 0 0 0,-26-5 0 0 0,1-1 0 0 0,-1 1 0 0 0,1 1 0 0 0,-1-1 0 0 0,1 0 0 0 0,-1 0 0 0 0,0 1 0 0 0,0 0 0 0 0,0-1 0 0 0,4 5 0 0 0,-5-5 0 0 0,0 0 0 0 0,0 0 0 0 0,-1 1 0 0 0,1-1 0 0 0,0 1 0 0 0,-1-1 0 0 0,1 0 0 0 0,-1 1 0 0 0,1-1 0 0 0,-1 1 0 0 0,0-1 0 0 0,0 1 0 0 0,0 0 0 0 0,1-1 0 0 0,-1 1 0 0 0,-1-1 0 0 0,1 1 0 0 0,0-1 0 0 0,0 1 0 0 0,-1 2 0 0 0,-13 31 0 0 0,9-25 0 0 0,0-1 0 0 0,-1 1 0 0 0,0-1 0 0 0,0 0 0 0 0,-1-1 0 0 0,-12 13 0 0 0,-3 1 46 0 0,-20 24-119 0 0,37-40 210 0 0,1 0 0 0 0,-1 0-1 0 0,2 1 1 0 0,-1-1 0 0 0,1 1 0 0 0,-3 7 0 0 0,5-14-112 0 0,1 1 0 0 0,0-1 0 0 0,0 1 0 0 0,0-1 0 0 0,0 1 1 0 0,0-1-1 0 0,-1 1 0 0 0,1-1 0 0 0,0 1 0 0 0,0-1 0 0 0,0 1 0 0 0,0-1 0 0 0,0 1 0 0 0,0-1 0 0 0,1 1 1 0 0,-1-1-1 0 0,0 1 0 0 0,0-1 0 0 0,0 1 0 0 0,0-1 0 0 0,1 0 0 0 0,-1 1 0 0 0,0-1 0 0 0,0 1 1 0 0,1-1-1 0 0,-1 0 0 0 0,0 1 0 0 0,0-1 0 0 0,1 1 0 0 0,-1-1 0 0 0,1 0 0 0 0,-1 1 0 0 0,0-1 0 0 0,1 0 1 0 0,-1 0-1 0 0,1 1 0 0 0,-1-1 0 0 0,1 0 0 0 0,0 0 0 0 0,1 1-9 0 0,-1-1 0 0 0,1 0 0 0 0,0 1 0 0 0,0-1 0 0 0,0 0 0 0 0,0 0 0 0 0,0 0 0 0 0,0 0 0 0 0,2-1 0 0 0,14-3 260 0 0,0 0 0 0 0,0-2 1 0 0,0 0-1 0 0,-1-1 0 0 0,28-15 0 0 0,-38 18-211 0 0,1 1 0 0 0,0 0-1 0 0,0 0 1 0 0,16-3 0 0 0,18-6-997 0 0,-14-4-1913 0 0,-9 5-3111 0 0,-19 10 5653 0 0,17-8-7280 0 0</inkml:trace>
+</inkml:ink>
+</file>
+
+<file path=ppt/ink/ink34.xml><?xml version="1.0" encoding="utf-8"?>
+<inkml:ink xmlns:inkml="http://www.w3.org/2003/InkML">
+  <inkml:definitions>
+    <inkml:context xml:id="ctx0">
+      <inkml:inkSource xml:id="inkSrc0">
+        <inkml:traceFormat>
+          <inkml:channel name="X" type="integer" min="-2.14748E9" max="2.14748E9" units="cm"/>
+          <inkml:channel name="Y" type="integer" min="-2.14748E9" max="2.14748E9" units="cm"/>
+          <inkml:channel name="F" type="integer" max="32767" units="dev"/>
+          <inkml:channel name="OA" type="integer" max="360" units="deg"/>
+          <inkml:channel name="OE" type="integer" max="90" units="deg"/>
+        </inkml:traceFormat>
+        <inkml:channelProperties>
+          <inkml:channelProperty channel="X" name="resolution" value="1000" units="1/cm"/>
+          <inkml:channelProperty channel="Y" name="resolution" value="1000" units="1/cm"/>
+          <inkml:channelProperty channel="F" name="resolution" value="0" units="1/dev"/>
+          <inkml:channelProperty channel="OA" name="resolution" value="1000" units="1/deg"/>
+          <inkml:channelProperty channel="OE" name="resolution" value="1000" units="1/deg"/>
+        </inkml:channelProperties>
+      </inkml:inkSource>
+      <inkml:timestamp xml:id="ts0" timeString="2021-02-24T19:01:23.680"/>
+    </inkml:context>
+    <inkml:brush xml:id="br0">
+      <inkml:brushProperty name="width" value="0.05" units="cm"/>
+      <inkml:brushProperty name="height" value="0.05" units="cm"/>
+      <inkml:brushProperty name="color" value="#004F8B"/>
+    </inkml:brush>
+  </inkml:definitions>
+  <inkml:trace contextRef="#ctx0" brushRef="#br0">1 67 21103 0 0,'0'0'1604'0'0,"14"-5"-888"0"0,-10 3-659 0 0,-1 0 0 0 0,0 0-1 0 0,0 0 1 0 0,0 0 0 0 0,4-4 0 0 0,-4 3 175 0 0,0 0 1 0 0,1 0 0 0 0,-1 1 0 0 0,6-4-1 0 0,3 1-93 0 0,0 0 0 0 0,0 0 1 0 0,1 1-1 0 0,15-2 0 0 0,-21 4-146 0 0,1 1 1 0 0,-1 1-1 0 0,1-1 0 0 0,-1 2 1 0 0,0-1-1 0 0,1 1 0 0 0,-1 0 1 0 0,0 0-1 0 0,8 3 1 0 0,-13-3-7 0 0,0-1 1 0 0,0 2 0 0 0,-1-1-1 0 0,1 0 1 0 0,0 0-1 0 0,-1 1 1 0 0,1-1 0 0 0,-1 1-1 0 0,1-1 1 0 0,-1 1 0 0 0,0-1-1 0 0,0 1 1 0 0,0 0 0 0 0,0 0-1 0 0,0 0 1 0 0,0 0 0 0 0,0-1-1 0 0,0 1 1 0 0,-1 0 0 0 0,1 0-1 0 0,-1 0 1 0 0,0 1 0 0 0,1-1-1 0 0,-1 0 1 0 0,0 3 0 0 0,0 4-55 0 0,0-1 1 0 0,-1 0 0 0 0,1 0-1 0 0,-2 0 1 0 0,-2 11 0 0 0,1-8-1 0 0,-1 0 1 0 0,0-1-1 0 0,0 1 1 0 0,-1-1-1 0 0,-1-1 1 0 0,0 1-1 0 0,0-1 1 0 0,-11 13-1 0 0,-22 23 51 0 0,38-44 23 0 0,0 0-1 0 0,0 0 0 0 0,0 1 0 0 0,0-1 1 0 0,0 0-1 0 0,1 1 0 0 0,-1-1 1 0 0,0 0-1 0 0,1 1 0 0 0,-1 2 0 0 0,-1-1 1 0 0,2-2 527 0 0,5-1-461 0 0,0 0 0 0 0,0 0 0 0 0,0-1 0 0 0,0 0 0 0 0,-1 0 0 0 0,1 0 0 0 0,0 0 0 0 0,0-1 0 0 0,4-2 0 0 0,7-2 99 0 0,1 0 0 0 0,20-3 0 0 0,-22 6-673 0 0,1-2 1 0 0,-1 1-1 0 0,21-11 1 0 0,33-27-4109 0 0,-41 24 3242 0 0,10-4-830 0 0</inkml:trace>
+</inkml:ink>
+</file>
+
+<file path=ppt/ink/ink35.xml><?xml version="1.0" encoding="utf-8"?>
+<inkml:ink xmlns:inkml="http://www.w3.org/2003/InkML">
+  <inkml:definitions>
+    <inkml:context xml:id="ctx0">
+      <inkml:inkSource xml:id="inkSrc0">
+        <inkml:traceFormat>
+          <inkml:channel name="X" type="integer" min="-2.14748E9" max="2.14748E9" units="cm"/>
+          <inkml:channel name="Y" type="integer" min="-2.14748E9" max="2.14748E9" units="cm"/>
+          <inkml:channel name="F" type="integer" max="32767" units="dev"/>
+          <inkml:channel name="OA" type="integer" max="360" units="deg"/>
+          <inkml:channel name="OE" type="integer" max="90" units="deg"/>
+        </inkml:traceFormat>
+        <inkml:channelProperties>
+          <inkml:channelProperty channel="X" name="resolution" value="1000" units="1/cm"/>
+          <inkml:channelProperty channel="Y" name="resolution" value="1000" units="1/cm"/>
+          <inkml:channelProperty channel="F" name="resolution" value="0" units="1/dev"/>
+          <inkml:channelProperty channel="OA" name="resolution" value="1000" units="1/deg"/>
+          <inkml:channelProperty channel="OE" name="resolution" value="1000" units="1/deg"/>
+        </inkml:channelProperties>
+      </inkml:inkSource>
+      <inkml:timestamp xml:id="ts0" timeString="2021-02-24T19:01:24.045"/>
+    </inkml:context>
+    <inkml:brush xml:id="br0">
+      <inkml:brushProperty name="width" value="0.05" units="cm"/>
+      <inkml:brushProperty name="height" value="0.05" units="cm"/>
+      <inkml:brushProperty name="color" value="#004F8B"/>
+    </inkml:brush>
+  </inkml:definitions>
+  <inkml:trace contextRef="#ctx0" brushRef="#br0">210 4 9672 0 0,'-10'-4'9872'0'0,"8"4"-9255"0"0,-14 3 2323 0 0,-13 10-2102 0 0,14-2-690 0 0,0 0 0 0 0,1 1 0 0 0,0 0 0 0 0,1 1 0 0 0,1 1 0 0 0,0 0 0 0 0,1 0 0 0 0,0 1 0 0 0,1 1 0 0 0,-12 24 0 0 0,22-39-151 0 0,-1 0 0 0 0,1-1 0 0 0,0 1 0 0 0,-1 0 0 0 0,1-1 0 0 0,0 1 0 0 0,0 0 0 0 0,-1-1 0 0 0,1 1 0 0 0,0 0 0 0 0,0-1 0 0 0,0 1 0 0 0,0 0 0 0 0,0 0 0 0 0,0-1 0 0 0,0 1 0 0 0,0 0 0 0 0,0 0 0 0 0,0-1 0 0 0,0 1 0 0 0,1 0 0 0 0,-1-1 0 0 0,0 1 0 0 0,0 0-1 0 0,1 0 1 0 0,0 0 31 0 0,0-1-1 0 0,-1 1 0 0 0,1-1 1 0 0,0 1-1 0 0,0-1 0 0 0,0 0 1 0 0,0 1-1 0 0,-1-1 0 0 0,1 0 0 0 0,0 0 1 0 0,0 1-1 0 0,0-1 0 0 0,0 0 1 0 0,0 0-1 0 0,0 0 0 0 0,0 0 1 0 0,1-1-1 0 0,4 1 267 0 0,0-1 0 0 0,0-1 0 0 0,0 1 0 0 0,10-5 0 0 0,-2-2-270 0 0,-1 0 0 0 0,0 0 0 0 0,-1-1 0 0 0,0-1 0 0 0,0 0 0 0 0,14-17 0 0 0,13-10-27 0 0,-38 36 40 0 0,1-1-1 0 0,-1 1 1 0 0,1-1-1 0 0,0 1 1 0 0,-1 0 0 0 0,1 0-1 0 0,0 0 1 0 0,0 0-1 0 0,0 0 1 0 0,0 1-1 0 0,0-1 1 0 0,0 0 0 0 0,0 1-1 0 0,0-1 1 0 0,0 1-1 0 0,0 0 1 0 0,0 0-1 0 0,0 0 1 0 0,0 0 0 0 0,0 0-1 0 0,1 0 1 0 0,-1 1-1 0 0,0-1 1 0 0,0 0-1 0 0,0 1 1 0 0,0 0 0 0 0,3 1-1 0 0,-1 1 67 0 0,1 0-1 0 0,-1 0 0 0 0,0 1 1 0 0,1-1-1 0 0,-2 1 1 0 0,1 0-1 0 0,0 0 0 0 0,-1 1 1 0 0,5 6-1 0 0,7 14-102 0 0,-2 0 0 0 0,13 30 0 0 0,-26-53-2 0 0,1 0-1 0 0,0 0 1 0 0,0-1 0 0 0,0 1-1 0 0,0 0 1 0 0,0-1 0 0 0,1 1-1 0 0,-1-1 1 0 0,0 0 0 0 0,1 1-1 0 0,-1-1 1 0 0,0 0 0 0 0,1 0-1 0 0,0 0 1 0 0,-1 0 0 0 0,1 0-1 0 0,2 1 1 0 0,13 3-2749 0 0,-11-2 1728 0 0</inkml:trace>
+</inkml:ink>
+</file>
+
+<file path=ppt/ink/ink4.xml><?xml version="1.0" encoding="utf-8"?>
+<inkml:ink xmlns:inkml="http://www.w3.org/2003/InkML">
+  <inkml:definitions>
+    <inkml:context xml:id="ctx0">
+      <inkml:inkSource xml:id="inkSrc0">
+        <inkml:traceFormat>
+          <inkml:channel name="X" type="integer" min="-2.14748E9" max="2.14748E9" units="cm"/>
+          <inkml:channel name="Y" type="integer" min="-2.14748E9" max="2.14748E9" units="cm"/>
+          <inkml:channel name="F" type="integer" max="32767" units="dev"/>
+          <inkml:channel name="OA" type="integer" max="360" units="deg"/>
+          <inkml:channel name="OE" type="integer" max="90" units="deg"/>
+        </inkml:traceFormat>
+        <inkml:channelProperties>
+          <inkml:channelProperty channel="X" name="resolution" value="1000" units="1/cm"/>
+          <inkml:channelProperty channel="Y" name="resolution" value="1000" units="1/cm"/>
+          <inkml:channelProperty channel="F" name="resolution" value="0" units="1/dev"/>
+          <inkml:channelProperty channel="OA" name="resolution" value="1000" units="1/deg"/>
+          <inkml:channelProperty channel="OE" name="resolution" value="1000" units="1/deg"/>
+        </inkml:channelProperties>
+      </inkml:inkSource>
+      <inkml:timestamp xml:id="ts0" timeString="2021-02-24T19:00:44.742"/>
+    </inkml:context>
+    <inkml:brush xml:id="br0">
+      <inkml:brushProperty name="width" value="0.05" units="cm"/>
+      <inkml:brushProperty name="height" value="0.05" units="cm"/>
+      <inkml:brushProperty name="color" value="#004F8B"/>
+    </inkml:brush>
+  </inkml:definitions>
+  <inkml:trace contextRef="#ctx0" brushRef="#br0">40 194 5584 0 0,'-2'1'12724'0'0,"11"2"-12061"0"0,-1-1 0 0 0,0 1-1 0 0,8 5 1 0 0,-10-6-474 0 0,0 1 0 0 0,0-1 0 0 0,1 0-1 0 0,10 2 1 0 0,-2 0-9 0 0,10 1 236 0 0,0-1 0 0 0,45 1-1 0 0,-19-2-50 0 0,164 0 996 0 0,-111-5-898 0 0,57-6 104 0 0,-94 3 74 0 0,112 5-1 0 0,-141 6-374 0 0,73 18 0 0 0,-75-11 71 0 0,-35-13-251 0 0,5-1 130 0 0,-6-1-226 0 0,-1 0 1 0 0,1 0-1 0 0,-1 0 1 0 0,0 0-1 0 0,1 0 1 0 0,-1 1-1 0 0,0-1 1 0 0,0 0-1 0 0,0 1 1 0 0,-1-1-1 0 0,1 0 0 0 0,0 1 1 0 0,-1 0-1 0 0,1-1 1 0 0,-1 1-1 0 0,1 0 1 0 0,-1-1-1 0 0,1 1 1 0 0,-1 0-1 0 0,0 0 1 0 0,0 0-1 0 0,-1 0 1 0 0,-9-4 255 0 0,1 0-1 0 0,-15-4 1 0 0,25 9-288 0 0,-231-54-23 0 0,171 42-74 0 0,-22-3-142 0 0,-2 3 0 0 0,1 4 1 0 0,-134 3-1 0 0,162 9 281 0 0,-38 0 0 0 0,121 1 0 0 0,92 5 576 0 0,1 0 27 0 0,59 0-393 0 0,-40-1-42 0 0,6 0 131 0 0,-82 0 33 0 0,-73-10-248 0 0,-161-27-179 0 0,-44-13-241 0 0,103 22-41 0 0,40 6-8 0 0,-90-5 0 0 0,137 17 301 0 0,0 1 1 0 0,0 1-1 0 0,1 1 0 0 0,-1 1 0 0 0,1 1 1 0 0,0 1-1 0 0,-39 14 0 0 0,37-6 84 0 0,24-12 0 0 0,0 1 0 0 0,0-1 0 0 0,0 0 0 0 0,1 1 0 0 0,-1-1 0 0 0,0 1 0 0 0,1-1 0 0 0,-1 1 0 0 0,1 0 0 0 0,-3 3 0 0 0,4 2 0 0 0,1-6 0 0 0,-1 0 0 0 0,1 0 0 0 0,0 0 0 0 0,0 0 0 0 0,0 0-1 0 0,0 0 1 0 0,0 0 0 0 0,0 0 0 0 0,0-1 0 0 0,0 1 0 0 0,0 0 0 0 0,0-1 0 0 0,0 1 0 0 0,0-1-1 0 0,0 1 1 0 0,1-1 0 0 0,-1 0 0 0 0,0 1 0 0 0,0-1 0 0 0,0 0 0 0 0,1 0 0 0 0,0 0-1 0 0,31 1 15 0 0,266-31 767 0 0,-210 18-653 0 0,190-20 189 0 0,-206 28-197 0 0,132 7 0 0 0,-157-1-59 0 0,-33-2-7 0 0,0 1 0 0 0,0 0 0 0 0,-1 1 0 0 0,16 4 0 0 0,-26-5-40 0 0,12 1 75 0 0,-14-2-4 0 0,0-3 72 0 0,-2 3-152 0 0,0 0 0 0 0,1 0 0 0 0,-1-1 0 0 0,0 1 0 0 0,1 0 0 0 0,-1-1 0 0 0,0 1 0 0 0,0 0 0 0 0,1-1 0 0 0,-1 1 0 0 0,0 0 0 0 0,0-1 0 0 0,0 1 0 0 0,0-1 0 0 0,1 1 0 0 0,-1 0 0 0 0,0-1 0 0 0,0 0 0 0 0,0-4-63 0 0,-1-1 1 0 0,0 1-1 0 0,0 0 0 0 0,0 0 1 0 0,-1 0-1 0 0,-2-6 0 0 0,-3-12-1890 0 0,6 11-356 0 0,1 6 536 0 0</inkml:trace>
+</inkml:ink>
+</file>
+
+<file path=ppt/ink/ink5.xml><?xml version="1.0" encoding="utf-8"?>
+<inkml:ink xmlns:inkml="http://www.w3.org/2003/InkML">
+  <inkml:definitions>
+    <inkml:context xml:id="ctx0">
+      <inkml:inkSource xml:id="inkSrc0">
+        <inkml:traceFormat>
+          <inkml:channel name="X" type="integer" min="-2.14748E9" max="2.14748E9" units="cm"/>
+          <inkml:channel name="Y" type="integer" min="-2.14748E9" max="2.14748E9" units="cm"/>
+          <inkml:channel name="F" type="integer" max="32767" units="dev"/>
+          <inkml:channel name="OA" type="integer" max="360" units="deg"/>
+          <inkml:channel name="OE" type="integer" max="90" units="deg"/>
+        </inkml:traceFormat>
+        <inkml:channelProperties>
+          <inkml:channelProperty channel="X" name="resolution" value="1000" units="1/cm"/>
+          <inkml:channelProperty channel="Y" name="resolution" value="1000" units="1/cm"/>
+          <inkml:channelProperty channel="F" name="resolution" value="0" units="1/dev"/>
+          <inkml:channelProperty channel="OA" name="resolution" value="1000" units="1/deg"/>
+          <inkml:channelProperty channel="OE" name="resolution" value="1000" units="1/deg"/>
+        </inkml:channelProperties>
+      </inkml:inkSource>
+      <inkml:timestamp xml:id="ts0" timeString="2021-02-24T19:00:49.637"/>
+    </inkml:context>
+    <inkml:brush xml:id="br0">
+      <inkml:brushProperty name="width" value="0.05" units="cm"/>
+      <inkml:brushProperty name="height" value="0.05" units="cm"/>
+      <inkml:brushProperty name="color" value="#004F8B"/>
+    </inkml:brush>
+  </inkml:definitions>
+  <inkml:trace contextRef="#ctx0" brushRef="#br0">1 83 7368 0 0,'0'0'2934'0'0,"13"-7"1378"0"0,-9 6-3536 0 0,1 1-1 0 0,-1-1 0 0 0,1 0 1 0 0,8-3-1 0 0,-10 3-735 0 0,1-1 0 0 0,0 1 0 0 0,0 1 0 0 0,0-1-1 0 0,1 0 1 0 0,-1 1 0 0 0,5 0 0 0 0,74 15 1343 0 0,-30-4-647 0 0,93 6 1334 0 0,272-19 234 0 0,-225-8-1571 0 0,81-5 774 0 0,-108 7-1171 0 0,-84 10 109 0 0,-24 1-153 0 0,-31-3-96 0 0,4 0 146 0 0,52-5-1 0 0,-69 3-284 0 0,-1 2-1 0 0,1 0 1 0 0,-1 0-1 0 0,14 3 1 0 0,-12-1 32 0 0,-1-1 0 0 0,29-1-1 0 0,-40 0-64 0 0,1-1 0 0 0,-1 0-1 0 0,0 0 1 0 0,1-1-1 0 0,-1 1 1 0 0,4-3 0 0 0,-5 3-12 0 0,1 0 0 0 0,-1-1 0 0 0,1 1 0 0 0,0 0 0 0 0,0 0 1 0 0,-1 1-1 0 0,1-1 0 0 0,5 0 0 0 0,-7-1-66 0 0,-1 0 0 0 0,1 1-1 0 0,-1-1 1 0 0,1 0 0 0 0,-1 0-1 0 0,0 1 1 0 0,0-1 0 0 0,0-4 0 0 0,0 1-34 0 0,6-20-2586 0 0,-4 20 1116 0 0</inkml:trace>
+</inkml:ink>
+</file>
+
+<file path=ppt/ink/ink6.xml><?xml version="1.0" encoding="utf-8"?>
+<inkml:ink xmlns:inkml="http://www.w3.org/2003/InkML">
+  <inkml:definitions>
+    <inkml:context xml:id="ctx0">
+      <inkml:inkSource xml:id="inkSrc0">
+        <inkml:traceFormat>
+          <inkml:channel name="X" type="integer" min="-2.14748E9" max="2.14748E9" units="cm"/>
+          <inkml:channel name="Y" type="integer" min="-2.14748E9" max="2.14748E9" units="cm"/>
+          <inkml:channel name="F" type="integer" max="32767" units="dev"/>
+          <inkml:channel name="OA" type="integer" max="360" units="deg"/>
+          <inkml:channel name="OE" type="integer" max="90" units="deg"/>
+        </inkml:traceFormat>
+        <inkml:channelProperties>
+          <inkml:channelProperty channel="X" name="resolution" value="1000" units="1/cm"/>
+          <inkml:channelProperty channel="Y" name="resolution" value="1000" units="1/cm"/>
+          <inkml:channelProperty channel="F" name="resolution" value="0" units="1/dev"/>
+          <inkml:channelProperty channel="OA" name="resolution" value="1000" units="1/deg"/>
+          <inkml:channelProperty channel="OE" name="resolution" value="1000" units="1/deg"/>
+        </inkml:channelProperties>
+      </inkml:inkSource>
+      <inkml:timestamp xml:id="ts0" timeString="2021-02-24T19:00:52.562"/>
+    </inkml:context>
+    <inkml:brush xml:id="br0">
+      <inkml:brushProperty name="width" value="0.05" units="cm"/>
+      <inkml:brushProperty name="height" value="0.05" units="cm"/>
+      <inkml:brushProperty name="color" value="#004F8B"/>
+    </inkml:brush>
+  </inkml:definitions>
+  <inkml:trace contextRef="#ctx0" brushRef="#br0">35 108 5064 0 0,'-6'3'528'0'0,"0"-3"1782"0"0,6 0-2175 0 0,-1 1-1 0 0,0-1 0 0 0,1 0 0 0 0,-1-1 0 0 0,1 1 0 0 0,-1 0 0 0 0,0 0 0 0 0,1 0 0 0 0,-1 0 0 0 0,1 0 1 0 0,-1-1-1 0 0,0 1 0 0 0,1 0 0 0 0,-1 0 0 0 0,1-1 0 0 0,-1 1 0 0 0,1 0 0 0 0,-1-1 0 0 0,1 1 0 0 0,-1-1 0 0 0,1 1 1 0 0,0 0-1 0 0,-1-1 0 0 0,1 1 0 0 0,0-1 0 0 0,-1 1 0 0 0,1-1 0 0 0,0 0 0 0 0,-1 1 0 0 0,1-1 0 0 0,0 1 1 0 0,0-1-1 0 0,0 1 0 0 0,-1-2 0 0 0,-6-8 2332 0 0,7-4 241 0 0,0 8 1294 0 0,1 5-3972 0 0,-1 1 1 0 0,0 0-1 0 0,0 0 1 0 0,1 0-1 0 0,-1-1 1 0 0,0 1-1 0 0,1 0 0 0 0,-1 0 1 0 0,0 0-1 0 0,1 0 1 0 0,-1 0-1 0 0,0-1 1 0 0,1 1-1 0 0,-1 0 0 0 0,0 0 1 0 0,1 0-1 0 0,-1 0 1 0 0,0 0-1 0 0,1 0 1 0 0,-1 0-1 0 0,0 0 0 0 0,1 0 1 0 0,-1 0-1 0 0,1 1 1 0 0,-1-1-1 0 0,11 2 224 0 0,-10-2-234 0 0,10 1 294 0 0,-1 0-1 0 0,19-1 0 0 0,13 2 553 0 0,12 3-406 0 0,77-4 1 0 0,-68-2-413 0 0,3-1 301 0 0,17-1 736 0 0,-22 6-870 0 0,151 0 180 0 0,-164-4 511 0 0,48 5 0 0 0,-57-1-667 0 0,-22-3-238 0 0,0-1 0 0 0,28-5 0 0 0,-25 4 0 0 0,19-8 1883 0 0,-25 2-1718 0 0,-13 8-208 0 0,-1 0-1 0 0,1 0 1 0 0,0 0 0 0 0,0-1-1 0 0,0 1 1 0 0,-1 0 0 0 0,1-1-1 0 0,0 1 1 0 0,-1-1-1 0 0,1 1 1 0 0,0-1 0 0 0,-1 1-1 0 0,1-1 1 0 0,0 1 0 0 0,-1-1-1 0 0,1 1 1 0 0,-1-1 0 0 0,1 0-1 0 0,-1 0 1 0 0,1 1-1 0 0,-1-1 1 0 0,0 0 0 0 0,1 1-1 0 0,-1-2 1 0 0,1-1-300 0 0,-1 1 1 0 0,0 0-1 0 0,0 0 0 0 0,0-1 0 0 0,-1 1 1 0 0,1 0-1 0 0,-1-3 0 0 0,0 2-189 0 0,1 0-1 0 0,-1 0 1 0 0,1 1-1 0 0,0-1 1 0 0,0 0-1 0 0,0-3 1 0 0</inkml:trace>
+</inkml:ink>
+</file>
+
+<file path=ppt/ink/ink7.xml><?xml version="1.0" encoding="utf-8"?>
+<inkml:ink xmlns:inkml="http://www.w3.org/2003/InkML">
+  <inkml:definitions>
+    <inkml:context xml:id="ctx0">
+      <inkml:inkSource xml:id="inkSrc0">
+        <inkml:traceFormat>
+          <inkml:channel name="X" type="integer" min="-2.14748E9" max="2.14748E9" units="cm"/>
+          <inkml:channel name="Y" type="integer" min="-2.14748E9" max="2.14748E9" units="cm"/>
+          <inkml:channel name="F" type="integer" max="32767" units="dev"/>
+          <inkml:channel name="OA" type="integer" max="360" units="deg"/>
+          <inkml:channel name="OE" type="integer" max="90" units="deg"/>
+        </inkml:traceFormat>
+        <inkml:channelProperties>
+          <inkml:channelProperty channel="X" name="resolution" value="1000" units="1/cm"/>
+          <inkml:channelProperty channel="Y" name="resolution" value="1000" units="1/cm"/>
+          <inkml:channelProperty channel="F" name="resolution" value="0" units="1/dev"/>
+          <inkml:channelProperty channel="OA" name="resolution" value="1000" units="1/deg"/>
+          <inkml:channelProperty channel="OE" name="resolution" value="1000" units="1/deg"/>
+        </inkml:channelProperties>
+      </inkml:inkSource>
+      <inkml:timestamp xml:id="ts0" timeString="2021-02-24T19:00:53.980"/>
+    </inkml:context>
+    <inkml:brush xml:id="br0">
+      <inkml:brushProperty name="width" value="0.05" units="cm"/>
+      <inkml:brushProperty name="height" value="0.05" units="cm"/>
+      <inkml:brushProperty name="color" value="#004F8B"/>
+    </inkml:brush>
+  </inkml:definitions>
+  <inkml:trace contextRef="#ctx0" brushRef="#br0">107 69 7600 0 0,'-17'0'824'0'0,"12"-1"-508"0"0,-1 0 0 0 0,1 0 0 0 0,0 0 0 0 0,-6-2 0 0 0,8 1 55 0 0,0 1-1 0 0,-1 0 1 0 0,1 0-1 0 0,0 0 1 0 0,-1 1-1 0 0,1-1 1 0 0,-1 1-1 0 0,1 0 1 0 0,0 0-1 0 0,-1 0 1 0 0,-5 1-1 0 0,8-1 77 0 0,-9-5 5536 0 0,10 5-5925 0 0,10-2 2755 0 0,-1 2-3726 0 0,38 5 1872 0 0,201 15 853 0 0,-106-12-1184 0 0,33-1-354 0 0,-68-6-26 0 0,313-9 567 0 0,-190-1-410 0 0,-80 5 8 0 0,-71 3 251 0 0,125 13-1 0 0,-115-6-311 0 0,-14-1-192 0 0,-57-11 123 0 0,-17 5-253 0 0,0-2-340 0 0,-1-1 0 0 0,0 1-1 0 0,0-1 1 0 0,0 1 0 0 0,0-1-1 0 0,0 1 1 0 0,-2-6 0 0 0,2 2-1208 0 0,1 6 1273 0 0,-1 1 0 0 0,0-1 0 0 0,0 0 0 0 0,0 0 0 0 0,0 1 0 0 0,0-1 0 0 0,0 0 0 0 0,0 0 0 0 0,0 0 0 0 0,0 1 0 0 0,0-1 0 0 0,-1 0 0 0 0,1-1 0 0 0,-6-13-1672 0 0,2-1-17 0 0</inkml:trace>
+</inkml:ink>
+</file>
+
+<file path=ppt/ink/ink8.xml><?xml version="1.0" encoding="utf-8"?>
+<inkml:ink xmlns:inkml="http://www.w3.org/2003/InkML">
+  <inkml:definitions>
+    <inkml:context xml:id="ctx0">
+      <inkml:inkSource xml:id="inkSrc0">
+        <inkml:traceFormat>
+          <inkml:channel name="X" type="integer" min="-2.14748E9" max="2.14748E9" units="cm"/>
+          <inkml:channel name="Y" type="integer" min="-2.14748E9" max="2.14748E9" units="cm"/>
+          <inkml:channel name="F" type="integer" max="32767" units="dev"/>
+          <inkml:channel name="OA" type="integer" max="360" units="deg"/>
+          <inkml:channel name="OE" type="integer" max="90" units="deg"/>
+        </inkml:traceFormat>
+        <inkml:channelProperties>
+          <inkml:channelProperty channel="X" name="resolution" value="1000" units="1/cm"/>
+          <inkml:channelProperty channel="Y" name="resolution" value="1000" units="1/cm"/>
+          <inkml:channelProperty channel="F" name="resolution" value="0" units="1/dev"/>
+          <inkml:channelProperty channel="OA" name="resolution" value="1000" units="1/deg"/>
+          <inkml:channelProperty channel="OE" name="resolution" value="1000" units="1/deg"/>
+        </inkml:channelProperties>
+      </inkml:inkSource>
+      <inkml:timestamp xml:id="ts0" timeString="2021-02-24T19:00:56.751"/>
+    </inkml:context>
+    <inkml:brush xml:id="br0">
+      <inkml:brushProperty name="width" value="0.05" units="cm"/>
+      <inkml:brushProperty name="height" value="0.05" units="cm"/>
+      <inkml:brushProperty name="color" value="#004F8B"/>
+    </inkml:brush>
+  </inkml:definitions>
+  <inkml:trace contextRef="#ctx0" brushRef="#br0">5 7 6160 0 0,'-5'-7'15985'0'0,"22"14"-15073"0"0,0-6-674 0 0,-2-1-76 0 0,158 29 920 0 0,-123-24-486 0 0,10 1-166 0 0,99 11-416 0 0,-108-13 53 0 0,-6-2 344 0 0,-1-2 1 0 0,0-2-1 0 0,1-1 1 0 0,43-11-1 0 0,-61 12-411 0 0,-23 2 3 0 0,1 0 1 0 0,0-1-1 0 0,-1 1 0 0 0,1-1 0 0 0,-1 0 1 0 0,1 0-1 0 0,-1 0 0 0 0,8-4 0 0 0,-11 5 680 0 0,-1-1-450 0 0,2 0-214 0 0,-1 1-174 0 0</inkml:trace>
+</inkml:ink>
+</file>
+
+<file path=ppt/ink/ink9.xml><?xml version="1.0" encoding="utf-8"?>
+<inkml:ink xmlns:inkml="http://www.w3.org/2003/InkML">
+  <inkml:definitions>
+    <inkml:context xml:id="ctx0">
+      <inkml:inkSource xml:id="inkSrc0">
+        <inkml:traceFormat>
+          <inkml:channel name="X" type="integer" min="-2.14748E9" max="2.14748E9" units="cm"/>
+          <inkml:channel name="Y" type="integer" min="-2.14748E9" max="2.14748E9" units="cm"/>
+          <inkml:channel name="F" type="integer" max="32767" units="dev"/>
+          <inkml:channel name="OA" type="integer" max="360" units="deg"/>
+          <inkml:channel name="OE" type="integer" max="90" units="deg"/>
+        </inkml:traceFormat>
+        <inkml:channelProperties>
+          <inkml:channelProperty channel="X" name="resolution" value="1000" units="1/cm"/>
+          <inkml:channelProperty channel="Y" name="resolution" value="1000" units="1/cm"/>
+          <inkml:channelProperty channel="F" name="resolution" value="0" units="1/dev"/>
+          <inkml:channelProperty channel="OA" name="resolution" value="1000" units="1/deg"/>
+          <inkml:channelProperty channel="OE" name="resolution" value="1000" units="1/deg"/>
+        </inkml:channelProperties>
+      </inkml:inkSource>
+      <inkml:timestamp xml:id="ts0" timeString="2021-02-24T19:01:05.990"/>
+    </inkml:context>
+    <inkml:brush xml:id="br0">
+      <inkml:brushProperty name="width" value="0.05" units="cm"/>
+      <inkml:brushProperty name="height" value="0.05" units="cm"/>
+      <inkml:brushProperty name="color" value="#004F8B"/>
+    </inkml:brush>
+  </inkml:definitions>
+  <inkml:trace contextRef="#ctx0" brushRef="#br0">128 0 1840 0 0,'-17'5'5168'0'0,"8"0"-4312"0"0,9-4-766 0 0,-1-1 0 0 0,1 1 0 0 0,-1-1 1 0 0,1 1-1 0 0,-1-1 0 0 0,1 0 0 0 0,-1 1 0 0 0,0-1 0 0 0,1 0 1 0 0,-1 0-1 0 0,0 1 0 0 0,1-1 0 0 0,-1 0 0 0 0,1 0 0 0 0,-1 0 1 0 0,0 0-1 0 0,0 1 0 0 0,1-1 0 0 0,-1 0 0 0 0,0-1 1 0 0,0 1-1 0 0,-2 0 162 0 0,0-1 0 0 0,0 1 0 0 0,0 0 0 0 0,0 0 0 0 0,0 0 0 0 0,0 0 0 0 0,-4 1 0 0 0,-9 1 76 0 0,0-3 858 0 0,14 0-920 0 0,0 1 0 0 0,-1 0 1 0 0,1 0-1 0 0,-1 0 0 0 0,1 0 0 0 0,-1 0 0 0 0,1 0 0 0 0,0 1 0 0 0,-4 0 983 0 0,6 0-1032 0 0,1 0 0 0 0,-1 0-1 0 0,1 1 1 0 0,-1-1 0 0 0,1 0 0 0 0,-1 0 0 0 0,1 0-1 0 0,0 0 1 0 0,0 0 0 0 0,0 0 0 0 0,-1-1-1 0 0,1 1 1 0 0,0 0 0 0 0,0 0 0 0 0,0-1-1 0 0,0 1 1 0 0,0 0 0 0 0,0-1 0 0 0,1 1-1 0 0,-1-1 1 0 0,0 1 0 0 0,2 0 0 0 0,36 10-352 0 0,-31-9 401 0 0,0 0-215 0 0,0-1 0 0 0,1 0 0 0 0,8 0 0 0 0,16 2-51 0 0,-22-1 5 0 0,13 2 23 0 0,49 2-1 0 0,-48-4 11 0 0,-18-1-12 0 0,1-1 0 0 0,-1 0 1 0 0,14-1-1 0 0,-3 0 43 0 0,35 0 0 0 0,-4 1-23 0 0,-5 0 93 0 0,46 6-1 0 0,19 1 52 0 0,-65-6-133 0 0,-19 0 80 0 0,29-3 1 0 0,79-1 434 0 0,28-5-804 0 0,63-4 517 0 0,-151 10-112 0 0,110 2 99 0 0,113-13 380 0 0,-221 7-341 0 0,-42 3-31 0 0,42 0 0 0 0,-6 5-171 0 0,0 4 1 0 0,86 18-1 0 0,-67-9 232 0 0,-27-10 96 0 0,-18-3-62 0 0,-27-1-213 0 0,0-1 1 0 0,1-1-1 0 0,-1-1 0 0 0,31-6 0 0 0,-26 4-129 0 0,-14 3-15 0 0,0 0-1 0 0,0 0 1 0 0,13 1-1 0 0,-17 0-12 0 0,-1-1 8 0 0,0 0 3 0 0,13 3 8 0 0,-11 0-13 0 0,-4-2 42 0 0,1 0-51 0 0,-1 0 0 0 0,0 0 1 0 0,0-1-1 0 0,0 1 0 0 0,1 0 0 0 0,-1 0 0 0 0,0 0 0 0 0,0-1 0 0 0,0 1 0 0 0,1 0 1 0 0,-1 0-1 0 0,0-1 0 0 0,0 1 0 0 0,0 0 0 0 0,0-1 0 0 0,0 1 0 0 0,0 0 0 0 0,1 0 1 0 0,-1-1-1 0 0,0 1 0 0 0,0 0 0 0 0,0-1 0 0 0,0 1 0 0 0,0 0 0 0 0,0-1 0 0 0,0 1 1 0 0,0 0-1 0 0,-1 0 0 0 0,1-1 0 0 0,0 1 0 0 0,0 0 0 0 0,0-1 0 0 0,-3-10-112 0 0,-8-11-2680 0 0,8 14 1492 0 0</inkml:trace>
+</inkml:ink>
 </file>
 
 <file path=ppt/notesMasters/notesMaster1.xml><?xml version="1.0" encoding="utf-8"?>
@@ -836,7 +1959,7 @@
           <a:p>
             <a:fld id="{3A2BF66F-FEB0-48C1-A8B9-A73F54BB1A08}" type="datetimeFigureOut">
               <a:rPr lang="en-US" smtClean="0"/>
-              <a:t>2/22/2021</a:t>
+              <a:t>2/24/2021</a:t>
             </a:fld>
             <a:endParaRPr lang="en-US"/>
           </a:p>
@@ -1036,7 +2159,7 @@
           <a:p>
             <a:fld id="{3A2BF66F-FEB0-48C1-A8B9-A73F54BB1A08}" type="datetimeFigureOut">
               <a:rPr lang="en-US" smtClean="0"/>
-              <a:t>2/22/2021</a:t>
+              <a:t>2/24/2021</a:t>
             </a:fld>
             <a:endParaRPr lang="en-US"/>
           </a:p>
@@ -1246,7 +2369,7 @@
           <a:p>
             <a:fld id="{3A2BF66F-FEB0-48C1-A8B9-A73F54BB1A08}" type="datetimeFigureOut">
               <a:rPr lang="en-US" smtClean="0"/>
-              <a:t>2/22/2021</a:t>
+              <a:t>2/24/2021</a:t>
             </a:fld>
             <a:endParaRPr lang="en-US"/>
           </a:p>
@@ -1446,7 +2569,7 @@
           <a:p>
             <a:fld id="{3A2BF66F-FEB0-48C1-A8B9-A73F54BB1A08}" type="datetimeFigureOut">
               <a:rPr lang="en-US" smtClean="0"/>
-              <a:t>2/22/2021</a:t>
+              <a:t>2/24/2021</a:t>
             </a:fld>
             <a:endParaRPr lang="en-US"/>
           </a:p>
@@ -1723,7 +2846,7 @@
           <a:p>
             <a:fld id="{3A2BF66F-FEB0-48C1-A8B9-A73F54BB1A08}" type="datetimeFigureOut">
               <a:rPr lang="en-US" smtClean="0"/>
-              <a:t>2/22/2021</a:t>
+              <a:t>2/24/2021</a:t>
             </a:fld>
             <a:endParaRPr lang="en-US"/>
           </a:p>
@@ -1990,7 +3113,7 @@
           <a:p>
             <a:fld id="{3A2BF66F-FEB0-48C1-A8B9-A73F54BB1A08}" type="datetimeFigureOut">
               <a:rPr lang="en-US" smtClean="0"/>
-              <a:t>2/22/2021</a:t>
+              <a:t>2/24/2021</a:t>
             </a:fld>
             <a:endParaRPr lang="en-US"/>
           </a:p>
@@ -2404,7 +3527,7 @@
           <a:p>
             <a:fld id="{3A2BF66F-FEB0-48C1-A8B9-A73F54BB1A08}" type="datetimeFigureOut">
               <a:rPr lang="en-US" smtClean="0"/>
-              <a:t>2/22/2021</a:t>
+              <a:t>2/24/2021</a:t>
             </a:fld>
             <a:endParaRPr lang="en-US"/>
           </a:p>
@@ -2547,7 +3670,7 @@
           <a:p>
             <a:fld id="{3A2BF66F-FEB0-48C1-A8B9-A73F54BB1A08}" type="datetimeFigureOut">
               <a:rPr lang="en-US" smtClean="0"/>
-              <a:t>2/22/2021</a:t>
+              <a:t>2/24/2021</a:t>
             </a:fld>
             <a:endParaRPr lang="en-US"/>
           </a:p>
@@ -2662,7 +3785,7 @@
           <a:p>
             <a:fld id="{3A2BF66F-FEB0-48C1-A8B9-A73F54BB1A08}" type="datetimeFigureOut">
               <a:rPr lang="en-US" smtClean="0"/>
-              <a:t>2/22/2021</a:t>
+              <a:t>2/24/2021</a:t>
             </a:fld>
             <a:endParaRPr lang="en-US"/>
           </a:p>
@@ -2974,7 +4097,7 @@
           <a:p>
             <a:fld id="{3A2BF66F-FEB0-48C1-A8B9-A73F54BB1A08}" type="datetimeFigureOut">
               <a:rPr lang="en-US" smtClean="0"/>
-              <a:t>2/22/2021</a:t>
+              <a:t>2/24/2021</a:t>
             </a:fld>
             <a:endParaRPr lang="en-US"/>
           </a:p>
@@ -3264,7 +4387,7 @@
           <a:p>
             <a:fld id="{3A2BF66F-FEB0-48C1-A8B9-A73F54BB1A08}" type="datetimeFigureOut">
               <a:rPr lang="en-US" smtClean="0"/>
-              <a:t>2/22/2021</a:t>
+              <a:t>2/24/2021</a:t>
             </a:fld>
             <a:endParaRPr lang="en-US"/>
           </a:p>
@@ -3507,7 +4630,7 @@
           <a:p>
             <a:fld id="{3A2BF66F-FEB0-48C1-A8B9-A73F54BB1A08}" type="datetimeFigureOut">
               <a:rPr lang="en-US" smtClean="0"/>
-              <a:t>2/22/2021</a:t>
+              <a:t>2/24/2021</a:t>
             </a:fld>
             <a:endParaRPr lang="en-US"/>
           </a:p>
@@ -4201,6 +5324,1812 @@
           </a:p>
         </p:txBody>
       </p:sp>
+      <mc:AlternateContent xmlns:mc="http://schemas.openxmlformats.org/markup-compatibility/2006">
+        <mc:Choice xmlns:p14="http://schemas.microsoft.com/office/powerpoint/2010/main" Requires="p14">
+          <p:contentPart p14:bwMode="auto" r:id="rId2">
+            <p14:nvContentPartPr>
+              <p14:cNvPr id="4" name="Ink 3">
+                <a:extLst>
+                  <a:ext uri="{FF2B5EF4-FFF2-40B4-BE49-F238E27FC236}">
+                    <a16:creationId xmlns:a16="http://schemas.microsoft.com/office/drawing/2014/main" id="{29E7878A-DB40-4219-9818-0BF006466506}"/>
+                  </a:ext>
+                </a:extLst>
+              </p14:cNvPr>
+              <p14:cNvContentPartPr/>
+              <p14:nvPr/>
+            </p14:nvContentPartPr>
+            <p14:xfrm>
+              <a:off x="892009" y="1763899"/>
+              <a:ext cx="760320" cy="55440"/>
+            </p14:xfrm>
+          </p:contentPart>
+        </mc:Choice>
+        <mc:Fallback>
+          <p:pic>
+            <p:nvPicPr>
+              <p:cNvPr id="4" name="Ink 3">
+                <a:extLst>
+                  <a:ext uri="{FF2B5EF4-FFF2-40B4-BE49-F238E27FC236}">
+                    <a16:creationId xmlns:a16="http://schemas.microsoft.com/office/drawing/2014/main" id="{29E7878A-DB40-4219-9818-0BF006466506}"/>
+                  </a:ext>
+                </a:extLst>
+              </p:cNvPr>
+              <p:cNvPicPr/>
+              <p:nvPr/>
+            </p:nvPicPr>
+            <p:blipFill>
+              <a:blip r:embed="rId3"/>
+              <a:stretch>
+                <a:fillRect/>
+              </a:stretch>
+            </p:blipFill>
+            <p:spPr>
+              <a:xfrm>
+                <a:off x="883369" y="1754899"/>
+                <a:ext cx="777960" cy="73080"/>
+              </a:xfrm>
+              <a:prstGeom prst="rect">
+                <a:avLst/>
+              </a:prstGeom>
+            </p:spPr>
+          </p:pic>
+        </mc:Fallback>
+      </mc:AlternateContent>
+      <mc:AlternateContent xmlns:mc="http://schemas.openxmlformats.org/markup-compatibility/2006">
+        <mc:Choice xmlns:p14="http://schemas.microsoft.com/office/powerpoint/2010/main" Requires="p14">
+          <p:contentPart p14:bwMode="auto" r:id="rId4">
+            <p14:nvContentPartPr>
+              <p14:cNvPr id="5" name="Ink 4">
+                <a:extLst>
+                  <a:ext uri="{FF2B5EF4-FFF2-40B4-BE49-F238E27FC236}">
+                    <a16:creationId xmlns:a16="http://schemas.microsoft.com/office/drawing/2014/main" id="{F23ABD15-6931-4467-A6B7-5617F5D5322B}"/>
+                  </a:ext>
+                </a:extLst>
+              </p14:cNvPr>
+              <p14:cNvContentPartPr/>
+              <p14:nvPr/>
+            </p14:nvContentPartPr>
+            <p14:xfrm>
+              <a:off x="1226449" y="2047219"/>
+              <a:ext cx="793440" cy="50400"/>
+            </p14:xfrm>
+          </p:contentPart>
+        </mc:Choice>
+        <mc:Fallback>
+          <p:pic>
+            <p:nvPicPr>
+              <p:cNvPr id="5" name="Ink 4">
+                <a:extLst>
+                  <a:ext uri="{FF2B5EF4-FFF2-40B4-BE49-F238E27FC236}">
+                    <a16:creationId xmlns:a16="http://schemas.microsoft.com/office/drawing/2014/main" id="{F23ABD15-6931-4467-A6B7-5617F5D5322B}"/>
+                  </a:ext>
+                </a:extLst>
+              </p:cNvPr>
+              <p:cNvPicPr/>
+              <p:nvPr/>
+            </p:nvPicPr>
+            <p:blipFill>
+              <a:blip r:embed="rId5"/>
+              <a:stretch>
+                <a:fillRect/>
+              </a:stretch>
+            </p:blipFill>
+            <p:spPr>
+              <a:xfrm>
+                <a:off x="1217449" y="2038219"/>
+                <a:ext cx="811080" cy="68040"/>
+              </a:xfrm>
+              <a:prstGeom prst="rect">
+                <a:avLst/>
+              </a:prstGeom>
+            </p:spPr>
+          </p:pic>
+        </mc:Fallback>
+      </mc:AlternateContent>
+      <mc:AlternateContent xmlns:mc="http://schemas.openxmlformats.org/markup-compatibility/2006">
+        <mc:Choice xmlns:p14="http://schemas.microsoft.com/office/powerpoint/2010/main" Requires="p14">
+          <p:contentPart p14:bwMode="auto" r:id="rId6">
+            <p14:nvContentPartPr>
+              <p14:cNvPr id="6" name="Ink 5">
+                <a:extLst>
+                  <a:ext uri="{FF2B5EF4-FFF2-40B4-BE49-F238E27FC236}">
+                    <a16:creationId xmlns:a16="http://schemas.microsoft.com/office/drawing/2014/main" id="{F76EE950-762F-46A7-B79C-58658487C649}"/>
+                  </a:ext>
+                </a:extLst>
+              </p14:cNvPr>
+              <p14:cNvContentPartPr/>
+              <p14:nvPr/>
+            </p14:nvContentPartPr>
+            <p14:xfrm>
+              <a:off x="917569" y="2489299"/>
+              <a:ext cx="870120" cy="52920"/>
+            </p14:xfrm>
+          </p:contentPart>
+        </mc:Choice>
+        <mc:Fallback>
+          <p:pic>
+            <p:nvPicPr>
+              <p:cNvPr id="6" name="Ink 5">
+                <a:extLst>
+                  <a:ext uri="{FF2B5EF4-FFF2-40B4-BE49-F238E27FC236}">
+                    <a16:creationId xmlns:a16="http://schemas.microsoft.com/office/drawing/2014/main" id="{F76EE950-762F-46A7-B79C-58658487C649}"/>
+                  </a:ext>
+                </a:extLst>
+              </p:cNvPr>
+              <p:cNvPicPr/>
+              <p:nvPr/>
+            </p:nvPicPr>
+            <p:blipFill>
+              <a:blip r:embed="rId7"/>
+              <a:stretch>
+                <a:fillRect/>
+              </a:stretch>
+            </p:blipFill>
+            <p:spPr>
+              <a:xfrm>
+                <a:off x="908569" y="2480299"/>
+                <a:ext cx="887760" cy="70560"/>
+              </a:xfrm>
+              <a:prstGeom prst="rect">
+                <a:avLst/>
+              </a:prstGeom>
+            </p:spPr>
+          </p:pic>
+        </mc:Fallback>
+      </mc:AlternateContent>
+      <mc:AlternateContent xmlns:mc="http://schemas.openxmlformats.org/markup-compatibility/2006">
+        <mc:Choice xmlns:p14="http://schemas.microsoft.com/office/powerpoint/2010/main" Requires="p14">
+          <p:contentPart p14:bwMode="auto" r:id="rId8">
+            <p14:nvContentPartPr>
+              <p14:cNvPr id="7" name="Ink 6">
+                <a:extLst>
+                  <a:ext uri="{FF2B5EF4-FFF2-40B4-BE49-F238E27FC236}">
+                    <a16:creationId xmlns:a16="http://schemas.microsoft.com/office/drawing/2014/main" id="{5F7E5645-DB69-4649-AB2E-D57DAFBFE137}"/>
+                  </a:ext>
+                </a:extLst>
+              </p14:cNvPr>
+              <p14:cNvContentPartPr/>
+              <p14:nvPr/>
+            </p14:nvContentPartPr>
+            <p14:xfrm>
+              <a:off x="858889" y="2883139"/>
+              <a:ext cx="441000" cy="99720"/>
+            </p14:xfrm>
+          </p:contentPart>
+        </mc:Choice>
+        <mc:Fallback>
+          <p:pic>
+            <p:nvPicPr>
+              <p:cNvPr id="7" name="Ink 6">
+                <a:extLst>
+                  <a:ext uri="{FF2B5EF4-FFF2-40B4-BE49-F238E27FC236}">
+                    <a16:creationId xmlns:a16="http://schemas.microsoft.com/office/drawing/2014/main" id="{5F7E5645-DB69-4649-AB2E-D57DAFBFE137}"/>
+                  </a:ext>
+                </a:extLst>
+              </p:cNvPr>
+              <p:cNvPicPr/>
+              <p:nvPr/>
+            </p:nvPicPr>
+            <p:blipFill>
+              <a:blip r:embed="rId9"/>
+              <a:stretch>
+                <a:fillRect/>
+              </a:stretch>
+            </p:blipFill>
+            <p:spPr>
+              <a:xfrm>
+                <a:off x="850249" y="2874139"/>
+                <a:ext cx="458640" cy="117360"/>
+              </a:xfrm>
+              <a:prstGeom prst="rect">
+                <a:avLst/>
+              </a:prstGeom>
+            </p:spPr>
+          </p:pic>
+        </mc:Fallback>
+      </mc:AlternateContent>
+      <mc:AlternateContent xmlns:mc="http://schemas.openxmlformats.org/markup-compatibility/2006">
+        <mc:Choice xmlns:p14="http://schemas.microsoft.com/office/powerpoint/2010/main" Requires="p14">
+          <p:contentPart p14:bwMode="auto" r:id="rId10">
+            <p14:nvContentPartPr>
+              <p14:cNvPr id="8" name="Ink 7">
+                <a:extLst>
+                  <a:ext uri="{FF2B5EF4-FFF2-40B4-BE49-F238E27FC236}">
+                    <a16:creationId xmlns:a16="http://schemas.microsoft.com/office/drawing/2014/main" id="{62AB080E-7A87-4962-93AB-5535AE1FC2DF}"/>
+                  </a:ext>
+                </a:extLst>
+              </p14:cNvPr>
+              <p14:cNvContentPartPr/>
+              <p14:nvPr/>
+            </p14:nvContentPartPr>
+            <p14:xfrm>
+              <a:off x="928369" y="3347179"/>
+              <a:ext cx="689760" cy="38520"/>
+            </p14:xfrm>
+          </p:contentPart>
+        </mc:Choice>
+        <mc:Fallback>
+          <p:pic>
+            <p:nvPicPr>
+              <p:cNvPr id="8" name="Ink 7">
+                <a:extLst>
+                  <a:ext uri="{FF2B5EF4-FFF2-40B4-BE49-F238E27FC236}">
+                    <a16:creationId xmlns:a16="http://schemas.microsoft.com/office/drawing/2014/main" id="{62AB080E-7A87-4962-93AB-5535AE1FC2DF}"/>
+                  </a:ext>
+                </a:extLst>
+              </p:cNvPr>
+              <p:cNvPicPr/>
+              <p:nvPr/>
+            </p:nvPicPr>
+            <p:blipFill>
+              <a:blip r:embed="rId11"/>
+              <a:stretch>
+                <a:fillRect/>
+              </a:stretch>
+            </p:blipFill>
+            <p:spPr>
+              <a:xfrm>
+                <a:off x="919729" y="3338539"/>
+                <a:ext cx="707400" cy="56160"/>
+              </a:xfrm>
+              <a:prstGeom prst="rect">
+                <a:avLst/>
+              </a:prstGeom>
+            </p:spPr>
+          </p:pic>
+        </mc:Fallback>
+      </mc:AlternateContent>
+      <mc:AlternateContent xmlns:mc="http://schemas.openxmlformats.org/markup-compatibility/2006">
+        <mc:Choice xmlns:p14="http://schemas.microsoft.com/office/powerpoint/2010/main" Requires="p14">
+          <p:contentPart p14:bwMode="auto" r:id="rId12">
+            <p14:nvContentPartPr>
+              <p14:cNvPr id="9" name="Ink 8">
+                <a:extLst>
+                  <a:ext uri="{FF2B5EF4-FFF2-40B4-BE49-F238E27FC236}">
+                    <a16:creationId xmlns:a16="http://schemas.microsoft.com/office/drawing/2014/main" id="{5E4E7B31-D211-4F9E-9C4C-902A9D9BB92C}"/>
+                  </a:ext>
+                </a:extLst>
+              </p14:cNvPr>
+              <p14:cNvContentPartPr/>
+              <p14:nvPr/>
+            </p14:nvContentPartPr>
+            <p14:xfrm>
+              <a:off x="4002769" y="3341779"/>
+              <a:ext cx="408240" cy="40320"/>
+            </p14:xfrm>
+          </p:contentPart>
+        </mc:Choice>
+        <mc:Fallback>
+          <p:pic>
+            <p:nvPicPr>
+              <p:cNvPr id="9" name="Ink 8">
+                <a:extLst>
+                  <a:ext uri="{FF2B5EF4-FFF2-40B4-BE49-F238E27FC236}">
+                    <a16:creationId xmlns:a16="http://schemas.microsoft.com/office/drawing/2014/main" id="{5E4E7B31-D211-4F9E-9C4C-902A9D9BB92C}"/>
+                  </a:ext>
+                </a:extLst>
+              </p:cNvPr>
+              <p:cNvPicPr/>
+              <p:nvPr/>
+            </p:nvPicPr>
+            <p:blipFill>
+              <a:blip r:embed="rId13"/>
+              <a:stretch>
+                <a:fillRect/>
+              </a:stretch>
+            </p:blipFill>
+            <p:spPr>
+              <a:xfrm>
+                <a:off x="3993769" y="3333139"/>
+                <a:ext cx="425880" cy="57960"/>
+              </a:xfrm>
+              <a:prstGeom prst="rect">
+                <a:avLst/>
+              </a:prstGeom>
+            </p:spPr>
+          </p:pic>
+        </mc:Fallback>
+      </mc:AlternateContent>
+      <mc:AlternateContent xmlns:mc="http://schemas.openxmlformats.org/markup-compatibility/2006">
+        <mc:Choice xmlns:p14="http://schemas.microsoft.com/office/powerpoint/2010/main" Requires="p14">
+          <p:contentPart p14:bwMode="auto" r:id="rId14">
+            <p14:nvContentPartPr>
+              <p14:cNvPr id="10" name="Ink 9">
+                <a:extLst>
+                  <a:ext uri="{FF2B5EF4-FFF2-40B4-BE49-F238E27FC236}">
+                    <a16:creationId xmlns:a16="http://schemas.microsoft.com/office/drawing/2014/main" id="{757888FE-ED27-441F-BFEA-A86AAF56EE60}"/>
+                  </a:ext>
+                </a:extLst>
+              </p14:cNvPr>
+              <p14:cNvContentPartPr/>
+              <p14:nvPr/>
+            </p14:nvContentPartPr>
+            <p14:xfrm>
+              <a:off x="6373729" y="3349699"/>
+              <a:ext cx="722520" cy="33120"/>
+            </p14:xfrm>
+          </p:contentPart>
+        </mc:Choice>
+        <mc:Fallback>
+          <p:pic>
+            <p:nvPicPr>
+              <p:cNvPr id="10" name="Ink 9">
+                <a:extLst>
+                  <a:ext uri="{FF2B5EF4-FFF2-40B4-BE49-F238E27FC236}">
+                    <a16:creationId xmlns:a16="http://schemas.microsoft.com/office/drawing/2014/main" id="{757888FE-ED27-441F-BFEA-A86AAF56EE60}"/>
+                  </a:ext>
+                </a:extLst>
+              </p:cNvPr>
+              <p:cNvPicPr/>
+              <p:nvPr/>
+            </p:nvPicPr>
+            <p:blipFill>
+              <a:blip r:embed="rId15"/>
+              <a:stretch>
+                <a:fillRect/>
+              </a:stretch>
+            </p:blipFill>
+            <p:spPr>
+              <a:xfrm>
+                <a:off x="6365089" y="3341059"/>
+                <a:ext cx="740160" cy="50760"/>
+              </a:xfrm>
+              <a:prstGeom prst="rect">
+                <a:avLst/>
+              </a:prstGeom>
+            </p:spPr>
+          </p:pic>
+        </mc:Fallback>
+      </mc:AlternateContent>
+      <mc:AlternateContent xmlns:mc="http://schemas.openxmlformats.org/markup-compatibility/2006">
+        <mc:Choice xmlns:p14="http://schemas.microsoft.com/office/powerpoint/2010/main" Requires="p14">
+          <p:contentPart p14:bwMode="auto" r:id="rId16">
+            <p14:nvContentPartPr>
+              <p14:cNvPr id="11" name="Ink 10">
+                <a:extLst>
+                  <a:ext uri="{FF2B5EF4-FFF2-40B4-BE49-F238E27FC236}">
+                    <a16:creationId xmlns:a16="http://schemas.microsoft.com/office/drawing/2014/main" id="{68A9970C-62A8-40D1-80EE-58B56E3DA3F9}"/>
+                  </a:ext>
+                </a:extLst>
+              </p14:cNvPr>
+              <p14:cNvContentPartPr/>
+              <p14:nvPr/>
+            </p14:nvContentPartPr>
+            <p14:xfrm>
+              <a:off x="1235089" y="3673699"/>
+              <a:ext cx="319680" cy="25920"/>
+            </p14:xfrm>
+          </p:contentPart>
+        </mc:Choice>
+        <mc:Fallback>
+          <p:pic>
+            <p:nvPicPr>
+              <p:cNvPr id="11" name="Ink 10">
+                <a:extLst>
+                  <a:ext uri="{FF2B5EF4-FFF2-40B4-BE49-F238E27FC236}">
+                    <a16:creationId xmlns:a16="http://schemas.microsoft.com/office/drawing/2014/main" id="{68A9970C-62A8-40D1-80EE-58B56E3DA3F9}"/>
+                  </a:ext>
+                </a:extLst>
+              </p:cNvPr>
+              <p:cNvPicPr/>
+              <p:nvPr/>
+            </p:nvPicPr>
+            <p:blipFill>
+              <a:blip r:embed="rId17"/>
+              <a:stretch>
+                <a:fillRect/>
+              </a:stretch>
+            </p:blipFill>
+            <p:spPr>
+              <a:xfrm>
+                <a:off x="1226089" y="3664699"/>
+                <a:ext cx="337320" cy="43560"/>
+              </a:xfrm>
+              <a:prstGeom prst="rect">
+                <a:avLst/>
+              </a:prstGeom>
+            </p:spPr>
+          </p:pic>
+        </mc:Fallback>
+      </mc:AlternateContent>
+      <mc:AlternateContent xmlns:mc="http://schemas.openxmlformats.org/markup-compatibility/2006">
+        <mc:Choice xmlns:p14="http://schemas.microsoft.com/office/powerpoint/2010/main" Requires="p14">
+          <p:contentPart p14:bwMode="auto" r:id="rId18">
+            <p14:nvContentPartPr>
+              <p14:cNvPr id="12" name="Ink 11">
+                <a:extLst>
+                  <a:ext uri="{FF2B5EF4-FFF2-40B4-BE49-F238E27FC236}">
+                    <a16:creationId xmlns:a16="http://schemas.microsoft.com/office/drawing/2014/main" id="{D05A58D9-4F9B-4648-9A03-9D2C2E7D120F}"/>
+                  </a:ext>
+                </a:extLst>
+              </p14:cNvPr>
+              <p14:cNvContentPartPr/>
+              <p14:nvPr/>
+            </p14:nvContentPartPr>
+            <p14:xfrm>
+              <a:off x="4199329" y="3675499"/>
+              <a:ext cx="989280" cy="31680"/>
+            </p14:xfrm>
+          </p:contentPart>
+        </mc:Choice>
+        <mc:Fallback>
+          <p:pic>
+            <p:nvPicPr>
+              <p:cNvPr id="12" name="Ink 11">
+                <a:extLst>
+                  <a:ext uri="{FF2B5EF4-FFF2-40B4-BE49-F238E27FC236}">
+                    <a16:creationId xmlns:a16="http://schemas.microsoft.com/office/drawing/2014/main" id="{D05A58D9-4F9B-4648-9A03-9D2C2E7D120F}"/>
+                  </a:ext>
+                </a:extLst>
+              </p:cNvPr>
+              <p:cNvPicPr/>
+              <p:nvPr/>
+            </p:nvPicPr>
+            <p:blipFill>
+              <a:blip r:embed="rId19"/>
+              <a:stretch>
+                <a:fillRect/>
+              </a:stretch>
+            </p:blipFill>
+            <p:spPr>
+              <a:xfrm>
+                <a:off x="4190689" y="3666499"/>
+                <a:ext cx="1006920" cy="49320"/>
+              </a:xfrm>
+              <a:prstGeom prst="rect">
+                <a:avLst/>
+              </a:prstGeom>
+            </p:spPr>
+          </p:pic>
+        </mc:Fallback>
+      </mc:AlternateContent>
+      <p:grpSp>
+        <p:nvGrpSpPr>
+          <p:cNvPr id="41" name="Group 40">
+            <a:extLst>
+              <a:ext uri="{FF2B5EF4-FFF2-40B4-BE49-F238E27FC236}">
+                <a16:creationId xmlns:a16="http://schemas.microsoft.com/office/drawing/2014/main" id="{5F06A345-9913-4307-A406-891FB32A8908}"/>
+              </a:ext>
+            </a:extLst>
+          </p:cNvPr>
+          <p:cNvGrpSpPr/>
+          <p:nvPr/>
+        </p:nvGrpSpPr>
+        <p:grpSpPr>
+          <a:xfrm>
+            <a:off x="1100089" y="4188139"/>
+            <a:ext cx="3479040" cy="775440"/>
+            <a:chOff x="1100089" y="4188139"/>
+            <a:chExt cx="3479040" cy="775440"/>
+          </a:xfrm>
+        </p:grpSpPr>
+        <mc:AlternateContent xmlns:mc="http://schemas.openxmlformats.org/markup-compatibility/2006">
+          <mc:Choice xmlns:p14="http://schemas.microsoft.com/office/powerpoint/2010/main" Requires="p14">
+            <p:contentPart p14:bwMode="auto" r:id="rId20">
+              <p14:nvContentPartPr>
+                <p14:cNvPr id="13" name="Ink 12">
+                  <a:extLst>
+                    <a:ext uri="{FF2B5EF4-FFF2-40B4-BE49-F238E27FC236}">
+                      <a16:creationId xmlns:a16="http://schemas.microsoft.com/office/drawing/2014/main" id="{8E1FC668-48D4-4AF4-B580-A04ED704A15A}"/>
+                    </a:ext>
+                  </a:extLst>
+                </p14:cNvPr>
+                <p14:cNvContentPartPr/>
+                <p14:nvPr/>
+              </p14:nvContentPartPr>
+              <p14:xfrm>
+                <a:off x="1100089" y="4207939"/>
+                <a:ext cx="160200" cy="304200"/>
+              </p14:xfrm>
+            </p:contentPart>
+          </mc:Choice>
+          <mc:Fallback>
+            <p:pic>
+              <p:nvPicPr>
+                <p:cNvPr id="13" name="Ink 12">
+                  <a:extLst>
+                    <a:ext uri="{FF2B5EF4-FFF2-40B4-BE49-F238E27FC236}">
+                      <a16:creationId xmlns:a16="http://schemas.microsoft.com/office/drawing/2014/main" id="{8E1FC668-48D4-4AF4-B580-A04ED704A15A}"/>
+                    </a:ext>
+                  </a:extLst>
+                </p:cNvPr>
+                <p:cNvPicPr/>
+                <p:nvPr/>
+              </p:nvPicPr>
+              <p:blipFill>
+                <a:blip r:embed="rId21"/>
+                <a:stretch>
+                  <a:fillRect/>
+                </a:stretch>
+              </p:blipFill>
+              <p:spPr>
+                <a:xfrm>
+                  <a:off x="1091089" y="4199299"/>
+                  <a:ext cx="177840" cy="321840"/>
+                </a:xfrm>
+                <a:prstGeom prst="rect">
+                  <a:avLst/>
+                </a:prstGeom>
+              </p:spPr>
+            </p:pic>
+          </mc:Fallback>
+        </mc:AlternateContent>
+        <mc:AlternateContent xmlns:mc="http://schemas.openxmlformats.org/markup-compatibility/2006">
+          <mc:Choice xmlns:p14="http://schemas.microsoft.com/office/powerpoint/2010/main" Requires="p14">
+            <p:contentPart p14:bwMode="auto" r:id="rId22">
+              <p14:nvContentPartPr>
+                <p14:cNvPr id="14" name="Ink 13">
+                  <a:extLst>
+                    <a:ext uri="{FF2B5EF4-FFF2-40B4-BE49-F238E27FC236}">
+                      <a16:creationId xmlns:a16="http://schemas.microsoft.com/office/drawing/2014/main" id="{A49C3ACD-F525-4805-AC1D-7F09F30758AB}"/>
+                    </a:ext>
+                  </a:extLst>
+                </p14:cNvPr>
+                <p14:cNvContentPartPr/>
+                <p14:nvPr/>
+              </p14:nvContentPartPr>
+              <p14:xfrm>
+                <a:off x="1321129" y="4358419"/>
+                <a:ext cx="75240" cy="160560"/>
+              </p14:xfrm>
+            </p:contentPart>
+          </mc:Choice>
+          <mc:Fallback>
+            <p:pic>
+              <p:nvPicPr>
+                <p:cNvPr id="14" name="Ink 13">
+                  <a:extLst>
+                    <a:ext uri="{FF2B5EF4-FFF2-40B4-BE49-F238E27FC236}">
+                      <a16:creationId xmlns:a16="http://schemas.microsoft.com/office/drawing/2014/main" id="{A49C3ACD-F525-4805-AC1D-7F09F30758AB}"/>
+                    </a:ext>
+                  </a:extLst>
+                </p:cNvPr>
+                <p:cNvPicPr/>
+                <p:nvPr/>
+              </p:nvPicPr>
+              <p:blipFill>
+                <a:blip r:embed="rId23"/>
+                <a:stretch>
+                  <a:fillRect/>
+                </a:stretch>
+              </p:blipFill>
+              <p:spPr>
+                <a:xfrm>
+                  <a:off x="1312129" y="4349779"/>
+                  <a:ext cx="92880" cy="178200"/>
+                </a:xfrm>
+                <a:prstGeom prst="rect">
+                  <a:avLst/>
+                </a:prstGeom>
+              </p:spPr>
+            </p:pic>
+          </mc:Fallback>
+        </mc:AlternateContent>
+        <mc:AlternateContent xmlns:mc="http://schemas.openxmlformats.org/markup-compatibility/2006">
+          <mc:Choice xmlns:p14="http://schemas.microsoft.com/office/powerpoint/2010/main" Requires="p14">
+            <p:contentPart p14:bwMode="auto" r:id="rId24">
+              <p14:nvContentPartPr>
+                <p14:cNvPr id="15" name="Ink 14">
+                  <a:extLst>
+                    <a:ext uri="{FF2B5EF4-FFF2-40B4-BE49-F238E27FC236}">
+                      <a16:creationId xmlns:a16="http://schemas.microsoft.com/office/drawing/2014/main" id="{AC9F268F-8439-42A1-90BA-6A4479E0B9A6}"/>
+                    </a:ext>
+                  </a:extLst>
+                </p14:cNvPr>
+                <p14:cNvContentPartPr/>
+                <p14:nvPr/>
+              </p14:nvContentPartPr>
+              <p14:xfrm>
+                <a:off x="1475929" y="4341139"/>
+                <a:ext cx="90000" cy="140040"/>
+              </p14:xfrm>
+            </p:contentPart>
+          </mc:Choice>
+          <mc:Fallback>
+            <p:pic>
+              <p:nvPicPr>
+                <p:cNvPr id="15" name="Ink 14">
+                  <a:extLst>
+                    <a:ext uri="{FF2B5EF4-FFF2-40B4-BE49-F238E27FC236}">
+                      <a16:creationId xmlns:a16="http://schemas.microsoft.com/office/drawing/2014/main" id="{AC9F268F-8439-42A1-90BA-6A4479E0B9A6}"/>
+                    </a:ext>
+                  </a:extLst>
+                </p:cNvPr>
+                <p:cNvPicPr/>
+                <p:nvPr/>
+              </p:nvPicPr>
+              <p:blipFill>
+                <a:blip r:embed="rId25"/>
+                <a:stretch>
+                  <a:fillRect/>
+                </a:stretch>
+              </p:blipFill>
+              <p:spPr>
+                <a:xfrm>
+                  <a:off x="1466929" y="4332499"/>
+                  <a:ext cx="107640" cy="157680"/>
+                </a:xfrm>
+                <a:prstGeom prst="rect">
+                  <a:avLst/>
+                </a:prstGeom>
+              </p:spPr>
+            </p:pic>
+          </mc:Fallback>
+        </mc:AlternateContent>
+        <mc:AlternateContent xmlns:mc="http://schemas.openxmlformats.org/markup-compatibility/2006">
+          <mc:Choice xmlns:p14="http://schemas.microsoft.com/office/powerpoint/2010/main" Requires="p14">
+            <p:contentPart p14:bwMode="auto" r:id="rId26">
+              <p14:nvContentPartPr>
+                <p14:cNvPr id="16" name="Ink 15">
+                  <a:extLst>
+                    <a:ext uri="{FF2B5EF4-FFF2-40B4-BE49-F238E27FC236}">
+                      <a16:creationId xmlns:a16="http://schemas.microsoft.com/office/drawing/2014/main" id="{4CAA365D-24CD-4A16-BF14-7E55D8B34049}"/>
+                    </a:ext>
+                  </a:extLst>
+                </p14:cNvPr>
+                <p14:cNvContentPartPr/>
+                <p14:nvPr/>
+              </p14:nvContentPartPr>
+              <p14:xfrm>
+                <a:off x="1617049" y="4222339"/>
+                <a:ext cx="32760" cy="260640"/>
+              </p14:xfrm>
+            </p:contentPart>
+          </mc:Choice>
+          <mc:Fallback>
+            <p:pic>
+              <p:nvPicPr>
+                <p:cNvPr id="16" name="Ink 15">
+                  <a:extLst>
+                    <a:ext uri="{FF2B5EF4-FFF2-40B4-BE49-F238E27FC236}">
+                      <a16:creationId xmlns:a16="http://schemas.microsoft.com/office/drawing/2014/main" id="{4CAA365D-24CD-4A16-BF14-7E55D8B34049}"/>
+                    </a:ext>
+                  </a:extLst>
+                </p:cNvPr>
+                <p:cNvPicPr/>
+                <p:nvPr/>
+              </p:nvPicPr>
+              <p:blipFill>
+                <a:blip r:embed="rId27"/>
+                <a:stretch>
+                  <a:fillRect/>
+                </a:stretch>
+              </p:blipFill>
+              <p:spPr>
+                <a:xfrm>
+                  <a:off x="1608409" y="4213699"/>
+                  <a:ext cx="50400" cy="278280"/>
+                </a:xfrm>
+                <a:prstGeom prst="rect">
+                  <a:avLst/>
+                </a:prstGeom>
+              </p:spPr>
+            </p:pic>
+          </mc:Fallback>
+        </mc:AlternateContent>
+        <mc:AlternateContent xmlns:mc="http://schemas.openxmlformats.org/markup-compatibility/2006">
+          <mc:Choice xmlns:p14="http://schemas.microsoft.com/office/powerpoint/2010/main" Requires="p14">
+            <p:contentPart p14:bwMode="auto" r:id="rId28">
+              <p14:nvContentPartPr>
+                <p14:cNvPr id="17" name="Ink 16">
+                  <a:extLst>
+                    <a:ext uri="{FF2B5EF4-FFF2-40B4-BE49-F238E27FC236}">
+                      <a16:creationId xmlns:a16="http://schemas.microsoft.com/office/drawing/2014/main" id="{28B9E6C5-02CF-42B3-89EE-58039635C866}"/>
+                    </a:ext>
+                  </a:extLst>
+                </p14:cNvPr>
+                <p14:cNvContentPartPr/>
+                <p14:nvPr/>
+              </p14:nvContentPartPr>
+              <p14:xfrm>
+                <a:off x="1714249" y="4395139"/>
+                <a:ext cx="73440" cy="127440"/>
+              </p14:xfrm>
+            </p:contentPart>
+          </mc:Choice>
+          <mc:Fallback>
+            <p:pic>
+              <p:nvPicPr>
+                <p:cNvPr id="17" name="Ink 16">
+                  <a:extLst>
+                    <a:ext uri="{FF2B5EF4-FFF2-40B4-BE49-F238E27FC236}">
+                      <a16:creationId xmlns:a16="http://schemas.microsoft.com/office/drawing/2014/main" id="{28B9E6C5-02CF-42B3-89EE-58039635C866}"/>
+                    </a:ext>
+                  </a:extLst>
+                </p:cNvPr>
+                <p:cNvPicPr/>
+                <p:nvPr/>
+              </p:nvPicPr>
+              <p:blipFill>
+                <a:blip r:embed="rId29"/>
+                <a:stretch>
+                  <a:fillRect/>
+                </a:stretch>
+              </p:blipFill>
+              <p:spPr>
+                <a:xfrm>
+                  <a:off x="1705249" y="4386139"/>
+                  <a:ext cx="91080" cy="145080"/>
+                </a:xfrm>
+                <a:prstGeom prst="rect">
+                  <a:avLst/>
+                </a:prstGeom>
+              </p:spPr>
+            </p:pic>
+          </mc:Fallback>
+        </mc:AlternateContent>
+        <mc:AlternateContent xmlns:mc="http://schemas.openxmlformats.org/markup-compatibility/2006">
+          <mc:Choice xmlns:p14="http://schemas.microsoft.com/office/powerpoint/2010/main" Requires="p14">
+            <p:contentPart p14:bwMode="auto" r:id="rId30">
+              <p14:nvContentPartPr>
+                <p14:cNvPr id="18" name="Ink 17">
+                  <a:extLst>
+                    <a:ext uri="{FF2B5EF4-FFF2-40B4-BE49-F238E27FC236}">
+                      <a16:creationId xmlns:a16="http://schemas.microsoft.com/office/drawing/2014/main" id="{318485B4-5596-4DAF-9AA9-CD4650E7CE37}"/>
+                    </a:ext>
+                  </a:extLst>
+                </p14:cNvPr>
+                <p14:cNvContentPartPr/>
+                <p14:nvPr/>
+              </p14:nvContentPartPr>
+              <p14:xfrm>
+                <a:off x="1864369" y="4385419"/>
+                <a:ext cx="152640" cy="113040"/>
+              </p14:xfrm>
+            </p:contentPart>
+          </mc:Choice>
+          <mc:Fallback>
+            <p:pic>
+              <p:nvPicPr>
+                <p:cNvPr id="18" name="Ink 17">
+                  <a:extLst>
+                    <a:ext uri="{FF2B5EF4-FFF2-40B4-BE49-F238E27FC236}">
+                      <a16:creationId xmlns:a16="http://schemas.microsoft.com/office/drawing/2014/main" id="{318485B4-5596-4DAF-9AA9-CD4650E7CE37}"/>
+                    </a:ext>
+                  </a:extLst>
+                </p:cNvPr>
+                <p:cNvPicPr/>
+                <p:nvPr/>
+              </p:nvPicPr>
+              <p:blipFill>
+                <a:blip r:embed="rId31"/>
+                <a:stretch>
+                  <a:fillRect/>
+                </a:stretch>
+              </p:blipFill>
+              <p:spPr>
+                <a:xfrm>
+                  <a:off x="1855729" y="4376779"/>
+                  <a:ext cx="170280" cy="130680"/>
+                </a:xfrm>
+                <a:prstGeom prst="rect">
+                  <a:avLst/>
+                </a:prstGeom>
+              </p:spPr>
+            </p:pic>
+          </mc:Fallback>
+        </mc:AlternateContent>
+        <mc:AlternateContent xmlns:mc="http://schemas.openxmlformats.org/markup-compatibility/2006">
+          <mc:Choice xmlns:p14="http://schemas.microsoft.com/office/powerpoint/2010/main" Requires="p14">
+            <p:contentPart p14:bwMode="auto" r:id="rId32">
+              <p14:nvContentPartPr>
+                <p14:cNvPr id="19" name="Ink 18">
+                  <a:extLst>
+                    <a:ext uri="{FF2B5EF4-FFF2-40B4-BE49-F238E27FC236}">
+                      <a16:creationId xmlns:a16="http://schemas.microsoft.com/office/drawing/2014/main" id="{4EC338FC-80FA-4808-99C5-7F4F6C2855F3}"/>
+                    </a:ext>
+                  </a:extLst>
+                </p14:cNvPr>
+                <p14:cNvContentPartPr/>
+                <p14:nvPr/>
+              </p14:nvContentPartPr>
+              <p14:xfrm>
+                <a:off x="2313289" y="4279939"/>
+                <a:ext cx="109800" cy="214920"/>
+              </p14:xfrm>
+            </p:contentPart>
+          </mc:Choice>
+          <mc:Fallback>
+            <p:pic>
+              <p:nvPicPr>
+                <p:cNvPr id="19" name="Ink 18">
+                  <a:extLst>
+                    <a:ext uri="{FF2B5EF4-FFF2-40B4-BE49-F238E27FC236}">
+                      <a16:creationId xmlns:a16="http://schemas.microsoft.com/office/drawing/2014/main" id="{4EC338FC-80FA-4808-99C5-7F4F6C2855F3}"/>
+                    </a:ext>
+                  </a:extLst>
+                </p:cNvPr>
+                <p:cNvPicPr/>
+                <p:nvPr/>
+              </p:nvPicPr>
+              <p:blipFill>
+                <a:blip r:embed="rId33"/>
+                <a:stretch>
+                  <a:fillRect/>
+                </a:stretch>
+              </p:blipFill>
+              <p:spPr>
+                <a:xfrm>
+                  <a:off x="2304649" y="4270939"/>
+                  <a:ext cx="127440" cy="232560"/>
+                </a:xfrm>
+                <a:prstGeom prst="rect">
+                  <a:avLst/>
+                </a:prstGeom>
+              </p:spPr>
+            </p:pic>
+          </mc:Fallback>
+        </mc:AlternateContent>
+        <mc:AlternateContent xmlns:mc="http://schemas.openxmlformats.org/markup-compatibility/2006">
+          <mc:Choice xmlns:p14="http://schemas.microsoft.com/office/powerpoint/2010/main" Requires="p14">
+            <p:contentPart p14:bwMode="auto" r:id="rId34">
+              <p14:nvContentPartPr>
+                <p14:cNvPr id="20" name="Ink 19">
+                  <a:extLst>
+                    <a:ext uri="{FF2B5EF4-FFF2-40B4-BE49-F238E27FC236}">
+                      <a16:creationId xmlns:a16="http://schemas.microsoft.com/office/drawing/2014/main" id="{806671B4-6398-4671-B7A6-E1355341A5CD}"/>
+                    </a:ext>
+                  </a:extLst>
+                </p14:cNvPr>
+                <p14:cNvContentPartPr/>
+                <p14:nvPr/>
+              </p14:nvContentPartPr>
+              <p14:xfrm>
+                <a:off x="2450449" y="4382539"/>
+                <a:ext cx="65160" cy="80280"/>
+              </p14:xfrm>
+            </p:contentPart>
+          </mc:Choice>
+          <mc:Fallback>
+            <p:pic>
+              <p:nvPicPr>
+                <p:cNvPr id="20" name="Ink 19">
+                  <a:extLst>
+                    <a:ext uri="{FF2B5EF4-FFF2-40B4-BE49-F238E27FC236}">
+                      <a16:creationId xmlns:a16="http://schemas.microsoft.com/office/drawing/2014/main" id="{806671B4-6398-4671-B7A6-E1355341A5CD}"/>
+                    </a:ext>
+                  </a:extLst>
+                </p:cNvPr>
+                <p:cNvPicPr/>
+                <p:nvPr/>
+              </p:nvPicPr>
+              <p:blipFill>
+                <a:blip r:embed="rId35"/>
+                <a:stretch>
+                  <a:fillRect/>
+                </a:stretch>
+              </p:blipFill>
+              <p:spPr>
+                <a:xfrm>
+                  <a:off x="2441449" y="4373899"/>
+                  <a:ext cx="82800" cy="97920"/>
+                </a:xfrm>
+                <a:prstGeom prst="rect">
+                  <a:avLst/>
+                </a:prstGeom>
+              </p:spPr>
+            </p:pic>
+          </mc:Fallback>
+        </mc:AlternateContent>
+        <mc:AlternateContent xmlns:mc="http://schemas.openxmlformats.org/markup-compatibility/2006">
+          <mc:Choice xmlns:p14="http://schemas.microsoft.com/office/powerpoint/2010/main" Requires="p14">
+            <p:contentPart p14:bwMode="auto" r:id="rId36">
+              <p14:nvContentPartPr>
+                <p14:cNvPr id="21" name="Ink 20">
+                  <a:extLst>
+                    <a:ext uri="{FF2B5EF4-FFF2-40B4-BE49-F238E27FC236}">
+                      <a16:creationId xmlns:a16="http://schemas.microsoft.com/office/drawing/2014/main" id="{41FCB954-D87F-4E6B-B979-8971025E72B2}"/>
+                    </a:ext>
+                  </a:extLst>
+                </p14:cNvPr>
+                <p14:cNvContentPartPr/>
+                <p14:nvPr/>
+              </p14:nvContentPartPr>
+              <p14:xfrm>
+                <a:off x="2616049" y="4365619"/>
+                <a:ext cx="67680" cy="118080"/>
+              </p14:xfrm>
+            </p:contentPart>
+          </mc:Choice>
+          <mc:Fallback>
+            <p:pic>
+              <p:nvPicPr>
+                <p:cNvPr id="21" name="Ink 20">
+                  <a:extLst>
+                    <a:ext uri="{FF2B5EF4-FFF2-40B4-BE49-F238E27FC236}">
+                      <a16:creationId xmlns:a16="http://schemas.microsoft.com/office/drawing/2014/main" id="{41FCB954-D87F-4E6B-B979-8971025E72B2}"/>
+                    </a:ext>
+                  </a:extLst>
+                </p:cNvPr>
+                <p:cNvPicPr/>
+                <p:nvPr/>
+              </p:nvPicPr>
+              <p:blipFill>
+                <a:blip r:embed="rId37"/>
+                <a:stretch>
+                  <a:fillRect/>
+                </a:stretch>
+              </p:blipFill>
+              <p:spPr>
+                <a:xfrm>
+                  <a:off x="2607049" y="4356619"/>
+                  <a:ext cx="85320" cy="135720"/>
+                </a:xfrm>
+                <a:prstGeom prst="rect">
+                  <a:avLst/>
+                </a:prstGeom>
+              </p:spPr>
+            </p:pic>
+          </mc:Fallback>
+        </mc:AlternateContent>
+        <mc:AlternateContent xmlns:mc="http://schemas.openxmlformats.org/markup-compatibility/2006">
+          <mc:Choice xmlns:p14="http://schemas.microsoft.com/office/powerpoint/2010/main" Requires="p14">
+            <p:contentPart p14:bwMode="auto" r:id="rId38">
+              <p14:nvContentPartPr>
+                <p14:cNvPr id="22" name="Ink 21">
+                  <a:extLst>
+                    <a:ext uri="{FF2B5EF4-FFF2-40B4-BE49-F238E27FC236}">
+                      <a16:creationId xmlns:a16="http://schemas.microsoft.com/office/drawing/2014/main" id="{FDC956C5-4736-4756-8D99-CE003BD024EE}"/>
+                    </a:ext>
+                  </a:extLst>
+                </p14:cNvPr>
+                <p14:cNvContentPartPr/>
+                <p14:nvPr/>
+              </p14:nvContentPartPr>
+              <p14:xfrm>
+                <a:off x="2739889" y="4353379"/>
+                <a:ext cx="129600" cy="133200"/>
+              </p14:xfrm>
+            </p:contentPart>
+          </mc:Choice>
+          <mc:Fallback>
+            <p:pic>
+              <p:nvPicPr>
+                <p:cNvPr id="22" name="Ink 21">
+                  <a:extLst>
+                    <a:ext uri="{FF2B5EF4-FFF2-40B4-BE49-F238E27FC236}">
+                      <a16:creationId xmlns:a16="http://schemas.microsoft.com/office/drawing/2014/main" id="{FDC956C5-4736-4756-8D99-CE003BD024EE}"/>
+                    </a:ext>
+                  </a:extLst>
+                </p:cNvPr>
+                <p:cNvPicPr/>
+                <p:nvPr/>
+              </p:nvPicPr>
+              <p:blipFill>
+                <a:blip r:embed="rId39"/>
+                <a:stretch>
+                  <a:fillRect/>
+                </a:stretch>
+              </p:blipFill>
+              <p:spPr>
+                <a:xfrm>
+                  <a:off x="2731249" y="4344379"/>
+                  <a:ext cx="147240" cy="150840"/>
+                </a:xfrm>
+                <a:prstGeom prst="rect">
+                  <a:avLst/>
+                </a:prstGeom>
+              </p:spPr>
+            </p:pic>
+          </mc:Fallback>
+        </mc:AlternateContent>
+        <mc:AlternateContent xmlns:mc="http://schemas.openxmlformats.org/markup-compatibility/2006">
+          <mc:Choice xmlns:p14="http://schemas.microsoft.com/office/powerpoint/2010/main" Requires="p14">
+            <p:contentPart p14:bwMode="auto" r:id="rId40">
+              <p14:nvContentPartPr>
+                <p14:cNvPr id="23" name="Ink 22">
+                  <a:extLst>
+                    <a:ext uri="{FF2B5EF4-FFF2-40B4-BE49-F238E27FC236}">
+                      <a16:creationId xmlns:a16="http://schemas.microsoft.com/office/drawing/2014/main" id="{9BCCD98A-4E49-4AC4-B157-05F1361ECCC3}"/>
+                    </a:ext>
+                  </a:extLst>
+                </p14:cNvPr>
+                <p14:cNvContentPartPr/>
+                <p14:nvPr/>
+              </p14:nvContentPartPr>
+              <p14:xfrm>
+                <a:off x="2885329" y="4283539"/>
+                <a:ext cx="19440" cy="12240"/>
+              </p14:xfrm>
+            </p:contentPart>
+          </mc:Choice>
+          <mc:Fallback>
+            <p:pic>
+              <p:nvPicPr>
+                <p:cNvPr id="23" name="Ink 22">
+                  <a:extLst>
+                    <a:ext uri="{FF2B5EF4-FFF2-40B4-BE49-F238E27FC236}">
+                      <a16:creationId xmlns:a16="http://schemas.microsoft.com/office/drawing/2014/main" id="{9BCCD98A-4E49-4AC4-B157-05F1361ECCC3}"/>
+                    </a:ext>
+                  </a:extLst>
+                </p:cNvPr>
+                <p:cNvPicPr/>
+                <p:nvPr/>
+              </p:nvPicPr>
+              <p:blipFill>
+                <a:blip r:embed="rId41"/>
+                <a:stretch>
+                  <a:fillRect/>
+                </a:stretch>
+              </p:blipFill>
+              <p:spPr>
+                <a:xfrm>
+                  <a:off x="2876689" y="4274899"/>
+                  <a:ext cx="37080" cy="29880"/>
+                </a:xfrm>
+                <a:prstGeom prst="rect">
+                  <a:avLst/>
+                </a:prstGeom>
+              </p:spPr>
+            </p:pic>
+          </mc:Fallback>
+        </mc:AlternateContent>
+        <mc:AlternateContent xmlns:mc="http://schemas.openxmlformats.org/markup-compatibility/2006">
+          <mc:Choice xmlns:p14="http://schemas.microsoft.com/office/powerpoint/2010/main" Requires="p14">
+            <p:contentPart p14:bwMode="auto" r:id="rId42">
+              <p14:nvContentPartPr>
+                <p14:cNvPr id="24" name="Ink 23">
+                  <a:extLst>
+                    <a:ext uri="{FF2B5EF4-FFF2-40B4-BE49-F238E27FC236}">
+                      <a16:creationId xmlns:a16="http://schemas.microsoft.com/office/drawing/2014/main" id="{897432DA-109A-4D79-A43D-5EF7E14E4E99}"/>
+                    </a:ext>
+                  </a:extLst>
+                </p14:cNvPr>
+                <p14:cNvContentPartPr/>
+                <p14:nvPr/>
+              </p14:nvContentPartPr>
+              <p14:xfrm>
+                <a:off x="2931769" y="4416019"/>
+                <a:ext cx="96120" cy="100440"/>
+              </p14:xfrm>
+            </p:contentPart>
+          </mc:Choice>
+          <mc:Fallback>
+            <p:pic>
+              <p:nvPicPr>
+                <p:cNvPr id="24" name="Ink 23">
+                  <a:extLst>
+                    <a:ext uri="{FF2B5EF4-FFF2-40B4-BE49-F238E27FC236}">
+                      <a16:creationId xmlns:a16="http://schemas.microsoft.com/office/drawing/2014/main" id="{897432DA-109A-4D79-A43D-5EF7E14E4E99}"/>
+                    </a:ext>
+                  </a:extLst>
+                </p:cNvPr>
+                <p:cNvPicPr/>
+                <p:nvPr/>
+              </p:nvPicPr>
+              <p:blipFill>
+                <a:blip r:embed="rId43"/>
+                <a:stretch>
+                  <a:fillRect/>
+                </a:stretch>
+              </p:blipFill>
+              <p:spPr>
+                <a:xfrm>
+                  <a:off x="2922769" y="4407379"/>
+                  <a:ext cx="113760" cy="118080"/>
+                </a:xfrm>
+                <a:prstGeom prst="rect">
+                  <a:avLst/>
+                </a:prstGeom>
+              </p:spPr>
+            </p:pic>
+          </mc:Fallback>
+        </mc:AlternateContent>
+        <mc:AlternateContent xmlns:mc="http://schemas.openxmlformats.org/markup-compatibility/2006">
+          <mc:Choice xmlns:p14="http://schemas.microsoft.com/office/powerpoint/2010/main" Requires="p14">
+            <p:contentPart p14:bwMode="auto" r:id="rId44">
+              <p14:nvContentPartPr>
+                <p14:cNvPr id="25" name="Ink 24">
+                  <a:extLst>
+                    <a:ext uri="{FF2B5EF4-FFF2-40B4-BE49-F238E27FC236}">
+                      <a16:creationId xmlns:a16="http://schemas.microsoft.com/office/drawing/2014/main" id="{CD994BAC-A1F0-4F41-A864-E6E6772DA3A3}"/>
+                    </a:ext>
+                  </a:extLst>
+                </p14:cNvPr>
+                <p14:cNvContentPartPr/>
+                <p14:nvPr/>
+              </p14:nvContentPartPr>
+              <p14:xfrm>
+                <a:off x="3042649" y="4426099"/>
+                <a:ext cx="132840" cy="105840"/>
+              </p14:xfrm>
+            </p:contentPart>
+          </mc:Choice>
+          <mc:Fallback>
+            <p:pic>
+              <p:nvPicPr>
+                <p:cNvPr id="25" name="Ink 24">
+                  <a:extLst>
+                    <a:ext uri="{FF2B5EF4-FFF2-40B4-BE49-F238E27FC236}">
+                      <a16:creationId xmlns:a16="http://schemas.microsoft.com/office/drawing/2014/main" id="{CD994BAC-A1F0-4F41-A864-E6E6772DA3A3}"/>
+                    </a:ext>
+                  </a:extLst>
+                </p:cNvPr>
+                <p:cNvPicPr/>
+                <p:nvPr/>
+              </p:nvPicPr>
+              <p:blipFill>
+                <a:blip r:embed="rId45"/>
+                <a:stretch>
+                  <a:fillRect/>
+                </a:stretch>
+              </p:blipFill>
+              <p:spPr>
+                <a:xfrm>
+                  <a:off x="3034009" y="4417099"/>
+                  <a:ext cx="150480" cy="123480"/>
+                </a:xfrm>
+                <a:prstGeom prst="rect">
+                  <a:avLst/>
+                </a:prstGeom>
+              </p:spPr>
+            </p:pic>
+          </mc:Fallback>
+        </mc:AlternateContent>
+        <mc:AlternateContent xmlns:mc="http://schemas.openxmlformats.org/markup-compatibility/2006">
+          <mc:Choice xmlns:p14="http://schemas.microsoft.com/office/powerpoint/2010/main" Requires="p14">
+            <p:contentPart p14:bwMode="auto" r:id="rId46">
+              <p14:nvContentPartPr>
+                <p14:cNvPr id="27" name="Ink 26">
+                  <a:extLst>
+                    <a:ext uri="{FF2B5EF4-FFF2-40B4-BE49-F238E27FC236}">
+                      <a16:creationId xmlns:a16="http://schemas.microsoft.com/office/drawing/2014/main" id="{A02F9439-AF40-4CD7-AABC-100145FBA5BB}"/>
+                    </a:ext>
+                  </a:extLst>
+                </p14:cNvPr>
+                <p14:cNvContentPartPr/>
+                <p14:nvPr/>
+              </p14:nvContentPartPr>
+              <p14:xfrm>
+                <a:off x="3370969" y="4293619"/>
+                <a:ext cx="280080" cy="130680"/>
+              </p14:xfrm>
+            </p:contentPart>
+          </mc:Choice>
+          <mc:Fallback>
+            <p:pic>
+              <p:nvPicPr>
+                <p:cNvPr id="27" name="Ink 26">
+                  <a:extLst>
+                    <a:ext uri="{FF2B5EF4-FFF2-40B4-BE49-F238E27FC236}">
+                      <a16:creationId xmlns:a16="http://schemas.microsoft.com/office/drawing/2014/main" id="{A02F9439-AF40-4CD7-AABC-100145FBA5BB}"/>
+                    </a:ext>
+                  </a:extLst>
+                </p:cNvPr>
+                <p:cNvPicPr/>
+                <p:nvPr/>
+              </p:nvPicPr>
+              <p:blipFill>
+                <a:blip r:embed="rId47"/>
+                <a:stretch>
+                  <a:fillRect/>
+                </a:stretch>
+              </p:blipFill>
+              <p:spPr>
+                <a:xfrm>
+                  <a:off x="3362329" y="4284619"/>
+                  <a:ext cx="297720" cy="148320"/>
+                </a:xfrm>
+                <a:prstGeom prst="rect">
+                  <a:avLst/>
+                </a:prstGeom>
+              </p:spPr>
+            </p:pic>
+          </mc:Fallback>
+        </mc:AlternateContent>
+        <mc:AlternateContent xmlns:mc="http://schemas.openxmlformats.org/markup-compatibility/2006">
+          <mc:Choice xmlns:p14="http://schemas.microsoft.com/office/powerpoint/2010/main" Requires="p14">
+            <p:contentPart p14:bwMode="auto" r:id="rId48">
+              <p14:nvContentPartPr>
+                <p14:cNvPr id="28" name="Ink 27">
+                  <a:extLst>
+                    <a:ext uri="{FF2B5EF4-FFF2-40B4-BE49-F238E27FC236}">
+                      <a16:creationId xmlns:a16="http://schemas.microsoft.com/office/drawing/2014/main" id="{93DCBD49-FB54-483F-9137-6263D07C1D24}"/>
+                    </a:ext>
+                  </a:extLst>
+                </p14:cNvPr>
+                <p14:cNvContentPartPr/>
+                <p14:nvPr/>
+              </p14:nvContentPartPr>
+              <p14:xfrm>
+                <a:off x="3805849" y="4218019"/>
+                <a:ext cx="174960" cy="14760"/>
+              </p14:xfrm>
+            </p:contentPart>
+          </mc:Choice>
+          <mc:Fallback>
+            <p:pic>
+              <p:nvPicPr>
+                <p:cNvPr id="28" name="Ink 27">
+                  <a:extLst>
+                    <a:ext uri="{FF2B5EF4-FFF2-40B4-BE49-F238E27FC236}">
+                      <a16:creationId xmlns:a16="http://schemas.microsoft.com/office/drawing/2014/main" id="{93DCBD49-FB54-483F-9137-6263D07C1D24}"/>
+                    </a:ext>
+                  </a:extLst>
+                </p:cNvPr>
+                <p:cNvPicPr/>
+                <p:nvPr/>
+              </p:nvPicPr>
+              <p:blipFill>
+                <a:blip r:embed="rId49"/>
+                <a:stretch>
+                  <a:fillRect/>
+                </a:stretch>
+              </p:blipFill>
+              <p:spPr>
+                <a:xfrm>
+                  <a:off x="3797209" y="4209019"/>
+                  <a:ext cx="192600" cy="32400"/>
+                </a:xfrm>
+                <a:prstGeom prst="rect">
+                  <a:avLst/>
+                </a:prstGeom>
+              </p:spPr>
+            </p:pic>
+          </mc:Fallback>
+        </mc:AlternateContent>
+        <mc:AlternateContent xmlns:mc="http://schemas.openxmlformats.org/markup-compatibility/2006">
+          <mc:Choice xmlns:p14="http://schemas.microsoft.com/office/powerpoint/2010/main" Requires="p14">
+            <p:contentPart p14:bwMode="auto" r:id="rId50">
+              <p14:nvContentPartPr>
+                <p14:cNvPr id="29" name="Ink 28">
+                  <a:extLst>
+                    <a:ext uri="{FF2B5EF4-FFF2-40B4-BE49-F238E27FC236}">
+                      <a16:creationId xmlns:a16="http://schemas.microsoft.com/office/drawing/2014/main" id="{EA77545A-0102-40D4-95A3-8C01A3DCDCC8}"/>
+                    </a:ext>
+                  </a:extLst>
+                </p14:cNvPr>
+                <p14:cNvContentPartPr/>
+                <p14:nvPr/>
+              </p14:nvContentPartPr>
+              <p14:xfrm>
+                <a:off x="3863089" y="4232059"/>
+                <a:ext cx="55080" cy="218520"/>
+              </p14:xfrm>
+            </p:contentPart>
+          </mc:Choice>
+          <mc:Fallback>
+            <p:pic>
+              <p:nvPicPr>
+                <p:cNvPr id="29" name="Ink 28">
+                  <a:extLst>
+                    <a:ext uri="{FF2B5EF4-FFF2-40B4-BE49-F238E27FC236}">
+                      <a16:creationId xmlns:a16="http://schemas.microsoft.com/office/drawing/2014/main" id="{EA77545A-0102-40D4-95A3-8C01A3DCDCC8}"/>
+                    </a:ext>
+                  </a:extLst>
+                </p:cNvPr>
+                <p:cNvPicPr/>
+                <p:nvPr/>
+              </p:nvPicPr>
+              <p:blipFill>
+                <a:blip r:embed="rId51"/>
+                <a:stretch>
+                  <a:fillRect/>
+                </a:stretch>
+              </p:blipFill>
+              <p:spPr>
+                <a:xfrm>
+                  <a:off x="3854089" y="4223419"/>
+                  <a:ext cx="72720" cy="236160"/>
+                </a:xfrm>
+                <a:prstGeom prst="rect">
+                  <a:avLst/>
+                </a:prstGeom>
+              </p:spPr>
+            </p:pic>
+          </mc:Fallback>
+        </mc:AlternateContent>
+        <mc:AlternateContent xmlns:mc="http://schemas.openxmlformats.org/markup-compatibility/2006">
+          <mc:Choice xmlns:p14="http://schemas.microsoft.com/office/powerpoint/2010/main" Requires="p14">
+            <p:contentPart p14:bwMode="auto" r:id="rId52">
+              <p14:nvContentPartPr>
+                <p14:cNvPr id="30" name="Ink 29">
+                  <a:extLst>
+                    <a:ext uri="{FF2B5EF4-FFF2-40B4-BE49-F238E27FC236}">
+                      <a16:creationId xmlns:a16="http://schemas.microsoft.com/office/drawing/2014/main" id="{330F70E8-0238-43CE-B1AD-034515FA6267}"/>
+                    </a:ext>
+                  </a:extLst>
+                </p14:cNvPr>
+                <p14:cNvContentPartPr/>
+                <p14:nvPr/>
+              </p14:nvContentPartPr>
+              <p14:xfrm>
+                <a:off x="4077649" y="4188139"/>
+                <a:ext cx="120240" cy="255600"/>
+              </p14:xfrm>
+            </p:contentPart>
+          </mc:Choice>
+          <mc:Fallback>
+            <p:pic>
+              <p:nvPicPr>
+                <p:cNvPr id="30" name="Ink 29">
+                  <a:extLst>
+                    <a:ext uri="{FF2B5EF4-FFF2-40B4-BE49-F238E27FC236}">
+                      <a16:creationId xmlns:a16="http://schemas.microsoft.com/office/drawing/2014/main" id="{330F70E8-0238-43CE-B1AD-034515FA6267}"/>
+                    </a:ext>
+                  </a:extLst>
+                </p:cNvPr>
+                <p:cNvPicPr/>
+                <p:nvPr/>
+              </p:nvPicPr>
+              <p:blipFill>
+                <a:blip r:embed="rId53"/>
+                <a:stretch>
+                  <a:fillRect/>
+                </a:stretch>
+              </p:blipFill>
+              <p:spPr>
+                <a:xfrm>
+                  <a:off x="4069009" y="4179139"/>
+                  <a:ext cx="137880" cy="273240"/>
+                </a:xfrm>
+                <a:prstGeom prst="rect">
+                  <a:avLst/>
+                </a:prstGeom>
+              </p:spPr>
+            </p:pic>
+          </mc:Fallback>
+        </mc:AlternateContent>
+        <mc:AlternateContent xmlns:mc="http://schemas.openxmlformats.org/markup-compatibility/2006">
+          <mc:Choice xmlns:p14="http://schemas.microsoft.com/office/powerpoint/2010/main" Requires="p14">
+            <p:contentPart p14:bwMode="auto" r:id="rId54">
+              <p14:nvContentPartPr>
+                <p14:cNvPr id="31" name="Ink 30">
+                  <a:extLst>
+                    <a:ext uri="{FF2B5EF4-FFF2-40B4-BE49-F238E27FC236}">
+                      <a16:creationId xmlns:a16="http://schemas.microsoft.com/office/drawing/2014/main" id="{D8213DB1-27C3-44DA-B905-F991CA061F96}"/>
+                    </a:ext>
+                  </a:extLst>
+                </p14:cNvPr>
+                <p14:cNvContentPartPr/>
+                <p14:nvPr/>
+              </p14:nvContentPartPr>
+              <p14:xfrm>
+                <a:off x="4261249" y="4331419"/>
+                <a:ext cx="139320" cy="109440"/>
+              </p14:xfrm>
+            </p:contentPart>
+          </mc:Choice>
+          <mc:Fallback>
+            <p:pic>
+              <p:nvPicPr>
+                <p:cNvPr id="31" name="Ink 30">
+                  <a:extLst>
+                    <a:ext uri="{FF2B5EF4-FFF2-40B4-BE49-F238E27FC236}">
+                      <a16:creationId xmlns:a16="http://schemas.microsoft.com/office/drawing/2014/main" id="{D8213DB1-27C3-44DA-B905-F991CA061F96}"/>
+                    </a:ext>
+                  </a:extLst>
+                </p:cNvPr>
+                <p:cNvPicPr/>
+                <p:nvPr/>
+              </p:nvPicPr>
+              <p:blipFill>
+                <a:blip r:embed="rId55"/>
+                <a:stretch>
+                  <a:fillRect/>
+                </a:stretch>
+              </p:blipFill>
+              <p:spPr>
+                <a:xfrm>
+                  <a:off x="4252249" y="4322779"/>
+                  <a:ext cx="156960" cy="127080"/>
+                </a:xfrm>
+                <a:prstGeom prst="rect">
+                  <a:avLst/>
+                </a:prstGeom>
+              </p:spPr>
+            </p:pic>
+          </mc:Fallback>
+        </mc:AlternateContent>
+        <mc:AlternateContent xmlns:mc="http://schemas.openxmlformats.org/markup-compatibility/2006">
+          <mc:Choice xmlns:p14="http://schemas.microsoft.com/office/powerpoint/2010/main" Requires="p14">
+            <p:contentPart p14:bwMode="auto" r:id="rId56">
+              <p14:nvContentPartPr>
+                <p14:cNvPr id="32" name="Ink 31">
+                  <a:extLst>
+                    <a:ext uri="{FF2B5EF4-FFF2-40B4-BE49-F238E27FC236}">
+                      <a16:creationId xmlns:a16="http://schemas.microsoft.com/office/drawing/2014/main" id="{36C38457-6309-4DAD-BE62-1EA7B19B9155}"/>
+                    </a:ext>
+                  </a:extLst>
+                </p14:cNvPr>
+                <p14:cNvContentPartPr/>
+                <p14:nvPr/>
+              </p14:nvContentPartPr>
+              <p14:xfrm>
+                <a:off x="4450969" y="4316299"/>
+                <a:ext cx="128160" cy="145440"/>
+              </p14:xfrm>
+            </p:contentPart>
+          </mc:Choice>
+          <mc:Fallback>
+            <p:pic>
+              <p:nvPicPr>
+                <p:cNvPr id="32" name="Ink 31">
+                  <a:extLst>
+                    <a:ext uri="{FF2B5EF4-FFF2-40B4-BE49-F238E27FC236}">
+                      <a16:creationId xmlns:a16="http://schemas.microsoft.com/office/drawing/2014/main" id="{36C38457-6309-4DAD-BE62-1EA7B19B9155}"/>
+                    </a:ext>
+                  </a:extLst>
+                </p:cNvPr>
+                <p:cNvPicPr/>
+                <p:nvPr/>
+              </p:nvPicPr>
+              <p:blipFill>
+                <a:blip r:embed="rId57"/>
+                <a:stretch>
+                  <a:fillRect/>
+                </a:stretch>
+              </p:blipFill>
+              <p:spPr>
+                <a:xfrm>
+                  <a:off x="4441969" y="4307299"/>
+                  <a:ext cx="145800" cy="163080"/>
+                </a:xfrm>
+                <a:prstGeom prst="rect">
+                  <a:avLst/>
+                </a:prstGeom>
+              </p:spPr>
+            </p:pic>
+          </mc:Fallback>
+        </mc:AlternateContent>
+        <mc:AlternateContent xmlns:mc="http://schemas.openxmlformats.org/markup-compatibility/2006">
+          <mc:Choice xmlns:p14="http://schemas.microsoft.com/office/powerpoint/2010/main" Requires="p14">
+            <p:contentPart p14:bwMode="auto" r:id="rId58">
+              <p14:nvContentPartPr>
+                <p14:cNvPr id="34" name="Ink 33">
+                  <a:extLst>
+                    <a:ext uri="{FF2B5EF4-FFF2-40B4-BE49-F238E27FC236}">
+                      <a16:creationId xmlns:a16="http://schemas.microsoft.com/office/drawing/2014/main" id="{A4E0917F-019B-4C5B-B4E3-6F034CF97D4A}"/>
+                    </a:ext>
+                  </a:extLst>
+                </p14:cNvPr>
+                <p14:cNvContentPartPr/>
+                <p14:nvPr/>
+              </p14:nvContentPartPr>
+              <p14:xfrm>
+                <a:off x="2123569" y="4605379"/>
+                <a:ext cx="188280" cy="227520"/>
+              </p14:xfrm>
+            </p:contentPart>
+          </mc:Choice>
+          <mc:Fallback>
+            <p:pic>
+              <p:nvPicPr>
+                <p:cNvPr id="34" name="Ink 33">
+                  <a:extLst>
+                    <a:ext uri="{FF2B5EF4-FFF2-40B4-BE49-F238E27FC236}">
+                      <a16:creationId xmlns:a16="http://schemas.microsoft.com/office/drawing/2014/main" id="{A4E0917F-019B-4C5B-B4E3-6F034CF97D4A}"/>
+                    </a:ext>
+                  </a:extLst>
+                </p:cNvPr>
+                <p:cNvPicPr/>
+                <p:nvPr/>
+              </p:nvPicPr>
+              <p:blipFill>
+                <a:blip r:embed="rId59"/>
+                <a:stretch>
+                  <a:fillRect/>
+                </a:stretch>
+              </p:blipFill>
+              <p:spPr>
+                <a:xfrm>
+                  <a:off x="2114929" y="4596379"/>
+                  <a:ext cx="205920" cy="245160"/>
+                </a:xfrm>
+                <a:prstGeom prst="rect">
+                  <a:avLst/>
+                </a:prstGeom>
+              </p:spPr>
+            </p:pic>
+          </mc:Fallback>
+        </mc:AlternateContent>
+        <mc:AlternateContent xmlns:mc="http://schemas.openxmlformats.org/markup-compatibility/2006">
+          <mc:Choice xmlns:p14="http://schemas.microsoft.com/office/powerpoint/2010/main" Requires="p14">
+            <p:contentPart p14:bwMode="auto" r:id="rId60">
+              <p14:nvContentPartPr>
+                <p14:cNvPr id="35" name="Ink 34">
+                  <a:extLst>
+                    <a:ext uri="{FF2B5EF4-FFF2-40B4-BE49-F238E27FC236}">
+                      <a16:creationId xmlns:a16="http://schemas.microsoft.com/office/drawing/2014/main" id="{42130981-8401-4E14-B268-4C4AD34923D3}"/>
+                    </a:ext>
+                  </a:extLst>
+                </p14:cNvPr>
+                <p14:cNvContentPartPr/>
+                <p14:nvPr/>
+              </p14:nvContentPartPr>
+              <p14:xfrm>
+                <a:off x="2396809" y="4754059"/>
+                <a:ext cx="140400" cy="209520"/>
+              </p14:xfrm>
+            </p:contentPart>
+          </mc:Choice>
+          <mc:Fallback>
+            <p:pic>
+              <p:nvPicPr>
+                <p:cNvPr id="35" name="Ink 34">
+                  <a:extLst>
+                    <a:ext uri="{FF2B5EF4-FFF2-40B4-BE49-F238E27FC236}">
+                      <a16:creationId xmlns:a16="http://schemas.microsoft.com/office/drawing/2014/main" id="{42130981-8401-4E14-B268-4C4AD34923D3}"/>
+                    </a:ext>
+                  </a:extLst>
+                </p:cNvPr>
+                <p:cNvPicPr/>
+                <p:nvPr/>
+              </p:nvPicPr>
+              <p:blipFill>
+                <a:blip r:embed="rId61"/>
+                <a:stretch>
+                  <a:fillRect/>
+                </a:stretch>
+              </p:blipFill>
+              <p:spPr>
+                <a:xfrm>
+                  <a:off x="2388169" y="4745419"/>
+                  <a:ext cx="158040" cy="227160"/>
+                </a:xfrm>
+                <a:prstGeom prst="rect">
+                  <a:avLst/>
+                </a:prstGeom>
+              </p:spPr>
+            </p:pic>
+          </mc:Fallback>
+        </mc:AlternateContent>
+        <mc:AlternateContent xmlns:mc="http://schemas.openxmlformats.org/markup-compatibility/2006">
+          <mc:Choice xmlns:p14="http://schemas.microsoft.com/office/powerpoint/2010/main" Requires="p14">
+            <p:contentPart p14:bwMode="auto" r:id="rId62">
+              <p14:nvContentPartPr>
+                <p14:cNvPr id="36" name="Ink 35">
+                  <a:extLst>
+                    <a:ext uri="{FF2B5EF4-FFF2-40B4-BE49-F238E27FC236}">
+                      <a16:creationId xmlns:a16="http://schemas.microsoft.com/office/drawing/2014/main" id="{E82E1259-736E-4796-9137-553453AA13D4}"/>
+                    </a:ext>
+                  </a:extLst>
+                </p14:cNvPr>
+                <p14:cNvContentPartPr/>
+                <p14:nvPr/>
+              </p14:nvContentPartPr>
+              <p14:xfrm>
+                <a:off x="2585449" y="4661179"/>
+                <a:ext cx="54360" cy="207720"/>
+              </p14:xfrm>
+            </p:contentPart>
+          </mc:Choice>
+          <mc:Fallback>
+            <p:pic>
+              <p:nvPicPr>
+                <p:cNvPr id="36" name="Ink 35">
+                  <a:extLst>
+                    <a:ext uri="{FF2B5EF4-FFF2-40B4-BE49-F238E27FC236}">
+                      <a16:creationId xmlns:a16="http://schemas.microsoft.com/office/drawing/2014/main" id="{E82E1259-736E-4796-9137-553453AA13D4}"/>
+                    </a:ext>
+                  </a:extLst>
+                </p:cNvPr>
+                <p:cNvPicPr/>
+                <p:nvPr/>
+              </p:nvPicPr>
+              <p:blipFill>
+                <a:blip r:embed="rId63"/>
+                <a:stretch>
+                  <a:fillRect/>
+                </a:stretch>
+              </p:blipFill>
+              <p:spPr>
+                <a:xfrm>
+                  <a:off x="2576449" y="4652539"/>
+                  <a:ext cx="72000" cy="225360"/>
+                </a:xfrm>
+                <a:prstGeom prst="rect">
+                  <a:avLst/>
+                </a:prstGeom>
+              </p:spPr>
+            </p:pic>
+          </mc:Fallback>
+        </mc:AlternateContent>
+        <mc:AlternateContent xmlns:mc="http://schemas.openxmlformats.org/markup-compatibility/2006">
+          <mc:Choice xmlns:p14="http://schemas.microsoft.com/office/powerpoint/2010/main" Requires="p14">
+            <p:contentPart p14:bwMode="auto" r:id="rId64">
+              <p14:nvContentPartPr>
+                <p14:cNvPr id="37" name="Ink 36">
+                  <a:extLst>
+                    <a:ext uri="{FF2B5EF4-FFF2-40B4-BE49-F238E27FC236}">
+                      <a16:creationId xmlns:a16="http://schemas.microsoft.com/office/drawing/2014/main" id="{FBB652C8-BDAD-44C7-86F2-0C879B69DB0B}"/>
+                    </a:ext>
+                  </a:extLst>
+                </p14:cNvPr>
+                <p14:cNvContentPartPr/>
+                <p14:nvPr/>
+              </p14:nvContentPartPr>
+              <p14:xfrm>
+                <a:off x="2707849" y="4731379"/>
+                <a:ext cx="107280" cy="145440"/>
+              </p14:xfrm>
+            </p:contentPart>
+          </mc:Choice>
+          <mc:Fallback>
+            <p:pic>
+              <p:nvPicPr>
+                <p:cNvPr id="37" name="Ink 36">
+                  <a:extLst>
+                    <a:ext uri="{FF2B5EF4-FFF2-40B4-BE49-F238E27FC236}">
+                      <a16:creationId xmlns:a16="http://schemas.microsoft.com/office/drawing/2014/main" id="{FBB652C8-BDAD-44C7-86F2-0C879B69DB0B}"/>
+                    </a:ext>
+                  </a:extLst>
+                </p:cNvPr>
+                <p:cNvPicPr/>
+                <p:nvPr/>
+              </p:nvPicPr>
+              <p:blipFill>
+                <a:blip r:embed="rId65"/>
+                <a:stretch>
+                  <a:fillRect/>
+                </a:stretch>
+              </p:blipFill>
+              <p:spPr>
+                <a:xfrm>
+                  <a:off x="2698849" y="4722379"/>
+                  <a:ext cx="124920" cy="163080"/>
+                </a:xfrm>
+                <a:prstGeom prst="rect">
+                  <a:avLst/>
+                </a:prstGeom>
+              </p:spPr>
+            </p:pic>
+          </mc:Fallback>
+        </mc:AlternateContent>
+        <mc:AlternateContent xmlns:mc="http://schemas.openxmlformats.org/markup-compatibility/2006">
+          <mc:Choice xmlns:p14="http://schemas.microsoft.com/office/powerpoint/2010/main" Requires="p14">
+            <p:contentPart p14:bwMode="auto" r:id="rId66">
+              <p14:nvContentPartPr>
+                <p14:cNvPr id="38" name="Ink 37">
+                  <a:extLst>
+                    <a:ext uri="{FF2B5EF4-FFF2-40B4-BE49-F238E27FC236}">
+                      <a16:creationId xmlns:a16="http://schemas.microsoft.com/office/drawing/2014/main" id="{526EE8DE-9F92-4A21-859B-3BEDE2630CC6}"/>
+                    </a:ext>
+                  </a:extLst>
+                </p14:cNvPr>
+                <p14:cNvContentPartPr/>
+                <p14:nvPr/>
+              </p14:nvContentPartPr>
+              <p14:xfrm>
+                <a:off x="2872729" y="4737859"/>
+                <a:ext cx="142560" cy="112320"/>
+              </p14:xfrm>
+            </p:contentPart>
+          </mc:Choice>
+          <mc:Fallback>
+            <p:pic>
+              <p:nvPicPr>
+                <p:cNvPr id="38" name="Ink 37">
+                  <a:extLst>
+                    <a:ext uri="{FF2B5EF4-FFF2-40B4-BE49-F238E27FC236}">
+                      <a16:creationId xmlns:a16="http://schemas.microsoft.com/office/drawing/2014/main" id="{526EE8DE-9F92-4A21-859B-3BEDE2630CC6}"/>
+                    </a:ext>
+                  </a:extLst>
+                </p:cNvPr>
+                <p:cNvPicPr/>
+                <p:nvPr/>
+              </p:nvPicPr>
+              <p:blipFill>
+                <a:blip r:embed="rId67"/>
+                <a:stretch>
+                  <a:fillRect/>
+                </a:stretch>
+              </p:blipFill>
+              <p:spPr>
+                <a:xfrm>
+                  <a:off x="2864089" y="4729219"/>
+                  <a:ext cx="160200" cy="129960"/>
+                </a:xfrm>
+                <a:prstGeom prst="rect">
+                  <a:avLst/>
+                </a:prstGeom>
+              </p:spPr>
+            </p:pic>
+          </mc:Fallback>
+        </mc:AlternateContent>
+        <mc:AlternateContent xmlns:mc="http://schemas.openxmlformats.org/markup-compatibility/2006">
+          <mc:Choice xmlns:p14="http://schemas.microsoft.com/office/powerpoint/2010/main" Requires="p14">
+            <p:contentPart p14:bwMode="auto" r:id="rId68">
+              <p14:nvContentPartPr>
+                <p14:cNvPr id="39" name="Ink 38">
+                  <a:extLst>
+                    <a:ext uri="{FF2B5EF4-FFF2-40B4-BE49-F238E27FC236}">
+                      <a16:creationId xmlns:a16="http://schemas.microsoft.com/office/drawing/2014/main" id="{127026A7-7304-4846-AD69-FE357AD05D11}"/>
+                    </a:ext>
+                  </a:extLst>
+                </p14:cNvPr>
+                <p14:cNvContentPartPr/>
+                <p14:nvPr/>
+              </p14:nvContentPartPr>
+              <p14:xfrm>
+                <a:off x="3049489" y="4736419"/>
+                <a:ext cx="171000" cy="101880"/>
+              </p14:xfrm>
+            </p:contentPart>
+          </mc:Choice>
+          <mc:Fallback>
+            <p:pic>
+              <p:nvPicPr>
+                <p:cNvPr id="39" name="Ink 38">
+                  <a:extLst>
+                    <a:ext uri="{FF2B5EF4-FFF2-40B4-BE49-F238E27FC236}">
+                      <a16:creationId xmlns:a16="http://schemas.microsoft.com/office/drawing/2014/main" id="{127026A7-7304-4846-AD69-FE357AD05D11}"/>
+                    </a:ext>
+                  </a:extLst>
+                </p:cNvPr>
+                <p:cNvPicPr/>
+                <p:nvPr/>
+              </p:nvPicPr>
+              <p:blipFill>
+                <a:blip r:embed="rId69"/>
+                <a:stretch>
+                  <a:fillRect/>
+                </a:stretch>
+              </p:blipFill>
+              <p:spPr>
+                <a:xfrm>
+                  <a:off x="3040849" y="4727419"/>
+                  <a:ext cx="188640" cy="119520"/>
+                </a:xfrm>
+                <a:prstGeom prst="rect">
+                  <a:avLst/>
+                </a:prstGeom>
+              </p:spPr>
+            </p:pic>
+          </mc:Fallback>
+        </mc:AlternateContent>
+        <mc:AlternateContent xmlns:mc="http://schemas.openxmlformats.org/markup-compatibility/2006">
+          <mc:Choice xmlns:p14="http://schemas.microsoft.com/office/powerpoint/2010/main" Requires="p14">
+            <p:contentPart p14:bwMode="auto" r:id="rId70">
+              <p14:nvContentPartPr>
+                <p14:cNvPr id="40" name="Ink 39">
+                  <a:extLst>
+                    <a:ext uri="{FF2B5EF4-FFF2-40B4-BE49-F238E27FC236}">
+                      <a16:creationId xmlns:a16="http://schemas.microsoft.com/office/drawing/2014/main" id="{45B3C60C-CDC8-443D-BCAC-302ABDCA0371}"/>
+                    </a:ext>
+                  </a:extLst>
+                </p14:cNvPr>
+                <p14:cNvContentPartPr/>
+                <p14:nvPr/>
+              </p14:nvContentPartPr>
+              <p14:xfrm>
+                <a:off x="3232009" y="4770259"/>
+                <a:ext cx="145440" cy="92520"/>
+              </p14:xfrm>
+            </p:contentPart>
+          </mc:Choice>
+          <mc:Fallback>
+            <p:pic>
+              <p:nvPicPr>
+                <p:cNvPr id="40" name="Ink 39">
+                  <a:extLst>
+                    <a:ext uri="{FF2B5EF4-FFF2-40B4-BE49-F238E27FC236}">
+                      <a16:creationId xmlns:a16="http://schemas.microsoft.com/office/drawing/2014/main" id="{45B3C60C-CDC8-443D-BCAC-302ABDCA0371}"/>
+                    </a:ext>
+                  </a:extLst>
+                </p:cNvPr>
+                <p:cNvPicPr/>
+                <p:nvPr/>
+              </p:nvPicPr>
+              <p:blipFill>
+                <a:blip r:embed="rId71"/>
+                <a:stretch>
+                  <a:fillRect/>
+                </a:stretch>
+              </p:blipFill>
+              <p:spPr>
+                <a:xfrm>
+                  <a:off x="3223369" y="4761259"/>
+                  <a:ext cx="163080" cy="110160"/>
+                </a:xfrm>
+                <a:prstGeom prst="rect">
+                  <a:avLst/>
+                </a:prstGeom>
+              </p:spPr>
+            </p:pic>
+          </mc:Fallback>
+        </mc:AlternateContent>
+      </p:grpSp>
     </p:spTree>
     <p:extLst>
       <p:ext uri="{BB962C8B-B14F-4D97-AF65-F5344CB8AC3E}">

</xml_diff>